<commit_message>
Added slide on string operations
</commit_message>
<xml_diff>
--- a/CPlusPlus/06_essential_cpp_regex.pptx
+++ b/CPlusPlus/06_essential_cpp_regex.pptx
@@ -5,14 +5,13 @@
     <p:sldMasterId id="2147483660" r:id="rId1"/>
   </p:sldMasterIdLst>
   <p:notesMasterIdLst>
-    <p:notesMasterId r:id="rId7"/>
+    <p:notesMasterId r:id="rId6"/>
   </p:notesMasterIdLst>
   <p:sldIdLst>
     <p:sldId id="257" r:id="rId2"/>
     <p:sldId id="258" r:id="rId3"/>
     <p:sldId id="259" r:id="rId4"/>
-    <p:sldId id="261" r:id="rId5"/>
-    <p:sldId id="260" r:id="rId6"/>
+    <p:sldId id="260" r:id="rId5"/>
   </p:sldIdLst>
   <p:sldSz cx="9144000" cy="6858000" type="screen4x3"/>
   <p:notesSz cx="6858000" cy="9144000"/>
@@ -3729,6 +3728,29 @@
       </p:sp>
       <p:sp>
         <p:nvSpPr>
+          <p:cNvPr id="3" name="Content Placeholder 2"/>
+          <p:cNvSpPr>
+            <a:spLocks noGrp="1"/>
+          </p:cNvSpPr>
+          <p:nvPr>
+            <p:ph idx="1"/>
+          </p:nvPr>
+        </p:nvSpPr>
+        <p:spPr/>
+        <p:txBody>
+          <a:bodyPr/>
+          <a:lstStyle/>
+          <a:p>
+            <a:r>
+              <a:rPr lang="en-US" dirty="0" smtClean="0"/>
+              <a:t>Strings: sequences of characters</a:t>
+            </a:r>
+            <a:endParaRPr lang="en-US" dirty="0"/>
+          </a:p>
+        </p:txBody>
+      </p:sp>
+      <p:sp>
+        <p:nvSpPr>
           <p:cNvPr id="7" name="Slide Number Placeholder 6"/>
           <p:cNvSpPr>
             <a:spLocks noGrp="1"/>
@@ -3758,8 +3780,8 @@
         </p:nvSpPr>
         <p:spPr>
           <a:xfrm>
-            <a:off x="478707" y="1682819"/>
-            <a:ext cx="4093293" cy="1323439"/>
+            <a:off x="628650" y="2410408"/>
+            <a:ext cx="6617724" cy="4031873"/>
           </a:xfrm>
           <a:prstGeom prst="rect">
             <a:avLst/>
@@ -3786,20 +3808,207 @@
                 <a:latin typeface="Courier New" pitchFamily="49" charset="0"/>
                 <a:cs typeface="Courier New" pitchFamily="49" charset="0"/>
               </a:rPr>
-              <a:t>void </a:t>
+              <a:t>using namespace </a:t>
             </a:r>
             <a:r>
               <a:rPr lang="en-US" sz="1600" dirty="0" err="1" smtClean="0">
                 <a:latin typeface="Courier New" pitchFamily="49" charset="0"/>
                 <a:cs typeface="Courier New" pitchFamily="49" charset="0"/>
               </a:rPr>
-              <a:t>swap_val</a:t>
+              <a:t>std</a:t>
             </a:r>
             <a:r>
               <a:rPr lang="en-US" sz="1600" dirty="0" smtClean="0">
                 <a:latin typeface="Courier New" pitchFamily="49" charset="0"/>
                 <a:cs typeface="Courier New" pitchFamily="49" charset="0"/>
               </a:rPr>
+              <a:t>;</a:t>
+            </a:r>
+          </a:p>
+          <a:p>
+            <a:r>
+              <a:rPr lang="en-US" sz="1600" dirty="0" smtClean="0">
+                <a:latin typeface="Courier New" pitchFamily="49" charset="0"/>
+                <a:cs typeface="Courier New" pitchFamily="49" charset="0"/>
+              </a:rPr>
+              <a:t>…</a:t>
+            </a:r>
+          </a:p>
+          <a:p>
+            <a:r>
+              <a:rPr lang="en-US" sz="1600" dirty="0" smtClean="0">
+                <a:latin typeface="Courier New" pitchFamily="49" charset="0"/>
+                <a:cs typeface="Courier New" pitchFamily="49" charset="0"/>
+              </a:rPr>
+              <a:t>string </a:t>
+            </a:r>
+            <a:r>
+              <a:rPr lang="en-US" sz="1600" dirty="0" err="1" smtClean="0">
+                <a:latin typeface="Courier New" pitchFamily="49" charset="0"/>
+                <a:cs typeface="Courier New" pitchFamily="49" charset="0"/>
+              </a:rPr>
+              <a:t>str</a:t>
+            </a:r>
+            <a:r>
+              <a:rPr lang="en-US" sz="1600" dirty="0">
+                <a:latin typeface="Courier New" pitchFamily="49" charset="0"/>
+                <a:cs typeface="Courier New" pitchFamily="49" charset="0"/>
+              </a:rPr>
+              <a:t> </a:t>
+            </a:r>
+            <a:r>
+              <a:rPr lang="en-US" sz="1600" dirty="0" smtClean="0">
+                <a:latin typeface="Courier New" pitchFamily="49" charset="0"/>
+                <a:cs typeface="Courier New" pitchFamily="49" charset="0"/>
+              </a:rPr>
+              <a:t>{</a:t>
+            </a:r>
+            <a:r>
+              <a:rPr lang="en-US" sz="1600" dirty="0" smtClean="0">
+                <a:latin typeface="Courier New" pitchFamily="49" charset="0"/>
+                <a:cs typeface="Courier New" pitchFamily="49" charset="0"/>
+              </a:rPr>
+              <a:t>"hello"};</a:t>
+            </a:r>
+          </a:p>
+          <a:p>
+            <a:r>
+              <a:rPr lang="en-US" sz="1600" dirty="0" err="1" smtClean="0">
+                <a:latin typeface="Courier New" pitchFamily="49" charset="0"/>
+                <a:cs typeface="Courier New" pitchFamily="49" charset="0"/>
+              </a:rPr>
+              <a:t>str</a:t>
+            </a:r>
+            <a:r>
+              <a:rPr lang="en-US" sz="1600" dirty="0" smtClean="0">
+                <a:latin typeface="Courier New" pitchFamily="49" charset="0"/>
+                <a:cs typeface="Courier New" pitchFamily="49" charset="0"/>
+              </a:rPr>
+              <a:t> += " world!";</a:t>
+            </a:r>
+          </a:p>
+          <a:p>
+            <a:r>
+              <a:rPr lang="en-US" sz="1600" dirty="0" err="1" smtClean="0">
+                <a:latin typeface="Courier New" pitchFamily="49" charset="0"/>
+                <a:cs typeface="Courier New" pitchFamily="49" charset="0"/>
+              </a:rPr>
+              <a:t>cout</a:t>
+            </a:r>
+            <a:r>
+              <a:rPr lang="en-US" sz="1600" dirty="0" smtClean="0">
+                <a:latin typeface="Courier New" pitchFamily="49" charset="0"/>
+                <a:cs typeface="Courier New" pitchFamily="49" charset="0"/>
+              </a:rPr>
+              <a:t> &lt;&lt; </a:t>
+            </a:r>
+            <a:r>
+              <a:rPr lang="en-US" sz="1600" dirty="0" err="1" smtClean="0">
+                <a:latin typeface="Courier New" pitchFamily="49" charset="0"/>
+                <a:cs typeface="Courier New" pitchFamily="49" charset="0"/>
+              </a:rPr>
+              <a:t>str.substr</a:t>
+            </a:r>
+            <a:r>
+              <a:rPr lang="en-US" sz="1600" dirty="0" smtClean="0">
+                <a:latin typeface="Courier New" pitchFamily="49" charset="0"/>
+                <a:cs typeface="Courier New" pitchFamily="49" charset="0"/>
+              </a:rPr>
+              <a:t>(6, 5) &lt;&lt; </a:t>
+            </a:r>
+            <a:r>
+              <a:rPr lang="en-US" sz="1600" dirty="0" err="1" smtClean="0">
+                <a:latin typeface="Courier New" pitchFamily="49" charset="0"/>
+                <a:cs typeface="Courier New" pitchFamily="49" charset="0"/>
+              </a:rPr>
+              <a:t>endl</a:t>
+            </a:r>
+            <a:r>
+              <a:rPr lang="en-US" sz="1600" dirty="0" smtClean="0">
+                <a:latin typeface="Courier New" pitchFamily="49" charset="0"/>
+                <a:cs typeface="Courier New" pitchFamily="49" charset="0"/>
+              </a:rPr>
+              <a:t>;</a:t>
+            </a:r>
+          </a:p>
+          <a:p>
+            <a:r>
+              <a:rPr lang="en-US" sz="1600" dirty="0" smtClean="0">
+                <a:latin typeface="Courier New" pitchFamily="49" charset="0"/>
+                <a:cs typeface="Courier New" pitchFamily="49" charset="0"/>
+              </a:rPr>
+              <a:t>auto </a:t>
+            </a:r>
+            <a:r>
+              <a:rPr lang="en-US" sz="1600" dirty="0" err="1" smtClean="0">
+                <a:latin typeface="Courier New" pitchFamily="49" charset="0"/>
+                <a:cs typeface="Courier New" pitchFamily="49" charset="0"/>
+              </a:rPr>
+              <a:t>pos</a:t>
+            </a:r>
+            <a:r>
+              <a:rPr lang="en-US" sz="1600" dirty="0" smtClean="0">
+                <a:latin typeface="Courier New" pitchFamily="49" charset="0"/>
+                <a:cs typeface="Courier New" pitchFamily="49" charset="0"/>
+              </a:rPr>
+              <a:t> = </a:t>
+            </a:r>
+            <a:r>
+              <a:rPr lang="en-US" sz="1600" dirty="0" err="1" smtClean="0">
+                <a:latin typeface="Courier New" pitchFamily="49" charset="0"/>
+                <a:cs typeface="Courier New" pitchFamily="49" charset="0"/>
+              </a:rPr>
+              <a:t>str.find</a:t>
+            </a:r>
+            <a:r>
+              <a:rPr lang="en-US" sz="1600" dirty="0" smtClean="0">
+                <a:latin typeface="Courier New" pitchFamily="49" charset="0"/>
+                <a:cs typeface="Courier New" pitchFamily="49" charset="0"/>
+              </a:rPr>
+              <a:t>("w");</a:t>
+            </a:r>
+          </a:p>
+          <a:p>
+            <a:r>
+              <a:rPr lang="en-US" sz="1600" dirty="0" err="1" smtClean="0">
+                <a:latin typeface="Courier New" pitchFamily="49" charset="0"/>
+                <a:cs typeface="Courier New" pitchFamily="49" charset="0"/>
+              </a:rPr>
+              <a:t>str</a:t>
+            </a:r>
+            <a:r>
+              <a:rPr lang="en-US" sz="1600" dirty="0" smtClean="0">
+                <a:latin typeface="Courier New" pitchFamily="49" charset="0"/>
+                <a:cs typeface="Courier New" pitchFamily="49" charset="0"/>
+              </a:rPr>
+              <a:t>[</a:t>
+            </a:r>
+            <a:r>
+              <a:rPr lang="en-US" sz="1600" dirty="0" err="1" smtClean="0">
+                <a:latin typeface="Courier New" pitchFamily="49" charset="0"/>
+                <a:cs typeface="Courier New" pitchFamily="49" charset="0"/>
+              </a:rPr>
+              <a:t>pos</a:t>
+            </a:r>
+            <a:r>
+              <a:rPr lang="en-US" sz="1600" dirty="0" smtClean="0">
+                <a:latin typeface="Courier New" pitchFamily="49" charset="0"/>
+                <a:cs typeface="Courier New" pitchFamily="49" charset="0"/>
+              </a:rPr>
+              <a:t>] = </a:t>
+            </a:r>
+            <a:r>
+              <a:rPr lang="en-US" sz="1600" dirty="0" err="1" smtClean="0">
+                <a:latin typeface="Courier New" pitchFamily="49" charset="0"/>
+                <a:cs typeface="Courier New" pitchFamily="49" charset="0"/>
+              </a:rPr>
+              <a:t>toupper</a:t>
+            </a:r>
+            <a:r>
+              <a:rPr lang="en-US" sz="1600" dirty="0" smtClean="0">
+                <a:latin typeface="Courier New" pitchFamily="49" charset="0"/>
+                <a:cs typeface="Courier New" pitchFamily="49" charset="0"/>
+              </a:rPr>
               <a:t>(</a:t>
             </a:r>
             <a:r>
@@ -3807,28 +4016,155 @@
                 <a:latin typeface="Courier New" pitchFamily="49" charset="0"/>
                 <a:cs typeface="Courier New" pitchFamily="49" charset="0"/>
               </a:rPr>
-              <a:t>int</a:t>
+              <a:t>str</a:t>
             </a:r>
             <a:r>
               <a:rPr lang="en-US" sz="1600" dirty="0" smtClean="0">
                 <a:latin typeface="Courier New" pitchFamily="49" charset="0"/>
                 <a:cs typeface="Courier New" pitchFamily="49" charset="0"/>
               </a:rPr>
-              <a:t>&amp; x, </a:t>
+              <a:t>[</a:t>
             </a:r>
             <a:r>
               <a:rPr lang="en-US" sz="1600" dirty="0" err="1" smtClean="0">
                 <a:latin typeface="Courier New" pitchFamily="49" charset="0"/>
                 <a:cs typeface="Courier New" pitchFamily="49" charset="0"/>
               </a:rPr>
-              <a:t>int</a:t>
+              <a:t>pos</a:t>
             </a:r>
             <a:r>
               <a:rPr lang="en-US" sz="1600" dirty="0" smtClean="0">
                 <a:latin typeface="Courier New" pitchFamily="49" charset="0"/>
                 <a:cs typeface="Courier New" pitchFamily="49" charset="0"/>
               </a:rPr>
-              <a:t>&amp; y) {</a:t>
+              <a:t>]);</a:t>
+            </a:r>
+          </a:p>
+          <a:p>
+            <a:r>
+              <a:rPr lang="en-US" sz="1600" dirty="0" err="1" smtClean="0">
+                <a:latin typeface="Courier New" pitchFamily="49" charset="0"/>
+                <a:cs typeface="Courier New" pitchFamily="49" charset="0"/>
+              </a:rPr>
+              <a:t>str.replace</a:t>
+            </a:r>
+            <a:r>
+              <a:rPr lang="en-US" sz="1600" dirty="0" smtClean="0">
+                <a:latin typeface="Courier New" pitchFamily="49" charset="0"/>
+                <a:cs typeface="Courier New" pitchFamily="49" charset="0"/>
+              </a:rPr>
+              <a:t>(0, 1, "H");</a:t>
+            </a:r>
+          </a:p>
+          <a:p>
+            <a:r>
+              <a:rPr lang="en-US" sz="1600" dirty="0" err="1" smtClean="0">
+                <a:latin typeface="Courier New" pitchFamily="49" charset="0"/>
+                <a:cs typeface="Courier New" pitchFamily="49" charset="0"/>
+              </a:rPr>
+              <a:t>cout</a:t>
+            </a:r>
+            <a:r>
+              <a:rPr lang="en-US" sz="1600" dirty="0" smtClean="0">
+                <a:latin typeface="Courier New" pitchFamily="49" charset="0"/>
+                <a:cs typeface="Courier New" pitchFamily="49" charset="0"/>
+              </a:rPr>
+              <a:t> &lt;&lt; </a:t>
+            </a:r>
+            <a:r>
+              <a:rPr lang="en-US" sz="1600" dirty="0" err="1" smtClean="0">
+                <a:latin typeface="Courier New" pitchFamily="49" charset="0"/>
+                <a:cs typeface="Courier New" pitchFamily="49" charset="0"/>
+              </a:rPr>
+              <a:t>str</a:t>
+            </a:r>
+            <a:r>
+              <a:rPr lang="en-US" sz="1600" dirty="0" smtClean="0">
+                <a:latin typeface="Courier New" pitchFamily="49" charset="0"/>
+                <a:cs typeface="Courier New" pitchFamily="49" charset="0"/>
+              </a:rPr>
+              <a:t> &lt;&lt; </a:t>
+            </a:r>
+            <a:r>
+              <a:rPr lang="en-US" sz="1600" dirty="0" err="1" smtClean="0">
+                <a:latin typeface="Courier New" pitchFamily="49" charset="0"/>
+                <a:cs typeface="Courier New" pitchFamily="49" charset="0"/>
+              </a:rPr>
+              <a:t>endl</a:t>
+            </a:r>
+            <a:r>
+              <a:rPr lang="en-US" sz="1600" dirty="0" smtClean="0">
+                <a:latin typeface="Courier New" pitchFamily="49" charset="0"/>
+                <a:cs typeface="Courier New" pitchFamily="49" charset="0"/>
+              </a:rPr>
+              <a:t>;</a:t>
+            </a:r>
+          </a:p>
+          <a:p>
+            <a:r>
+              <a:rPr lang="en-US" sz="1600" dirty="0" err="1" smtClean="0">
+                <a:latin typeface="Courier New" pitchFamily="49" charset="0"/>
+                <a:cs typeface="Courier New" pitchFamily="49" charset="0"/>
+              </a:rPr>
+              <a:t>pos</a:t>
+            </a:r>
+            <a:r>
+              <a:rPr lang="en-US" sz="1600" dirty="0" smtClean="0">
+                <a:latin typeface="Courier New" pitchFamily="49" charset="0"/>
+                <a:cs typeface="Courier New" pitchFamily="49" charset="0"/>
+              </a:rPr>
+              <a:t> = 0;</a:t>
+            </a:r>
+          </a:p>
+          <a:p>
+            <a:r>
+              <a:rPr lang="en-US" sz="1600" dirty="0" smtClean="0">
+                <a:latin typeface="Courier New" pitchFamily="49" charset="0"/>
+                <a:cs typeface="Courier New" pitchFamily="49" charset="0"/>
+              </a:rPr>
+              <a:t>while ((</a:t>
+            </a:r>
+            <a:r>
+              <a:rPr lang="en-US" sz="1600" dirty="0" err="1" smtClean="0">
+                <a:latin typeface="Courier New" pitchFamily="49" charset="0"/>
+                <a:cs typeface="Courier New" pitchFamily="49" charset="0"/>
+              </a:rPr>
+              <a:t>pos</a:t>
+            </a:r>
+            <a:r>
+              <a:rPr lang="en-US" sz="1600" dirty="0" smtClean="0">
+                <a:latin typeface="Courier New" pitchFamily="49" charset="0"/>
+                <a:cs typeface="Courier New" pitchFamily="49" charset="0"/>
+              </a:rPr>
+              <a:t> = </a:t>
+            </a:r>
+            <a:r>
+              <a:rPr lang="en-US" sz="1600" dirty="0" err="1" smtClean="0">
+                <a:latin typeface="Courier New" pitchFamily="49" charset="0"/>
+                <a:cs typeface="Courier New" pitchFamily="49" charset="0"/>
+              </a:rPr>
+              <a:t>str.find</a:t>
+            </a:r>
+            <a:r>
+              <a:rPr lang="en-US" sz="1600" dirty="0" smtClean="0">
+                <a:latin typeface="Courier New" pitchFamily="49" charset="0"/>
+                <a:cs typeface="Courier New" pitchFamily="49" charset="0"/>
+              </a:rPr>
+              <a:t>("o")) != string::</a:t>
+            </a:r>
+            <a:r>
+              <a:rPr lang="en-US" sz="1600" dirty="0" err="1" smtClean="0">
+                <a:latin typeface="Courier New" pitchFamily="49" charset="0"/>
+                <a:cs typeface="Courier New" pitchFamily="49" charset="0"/>
+              </a:rPr>
+              <a:t>npos</a:t>
+            </a:r>
+            <a:r>
+              <a:rPr lang="en-US" sz="1600" dirty="0" smtClean="0">
+                <a:latin typeface="Courier New" pitchFamily="49" charset="0"/>
+                <a:cs typeface="Courier New" pitchFamily="49" charset="0"/>
+              </a:rPr>
+              <a:t>) {</a:t>
             </a:r>
           </a:p>
           <a:p>
@@ -3844,21 +4180,49 @@
                 <a:latin typeface="Courier New" pitchFamily="49" charset="0"/>
                 <a:cs typeface="Courier New" pitchFamily="49" charset="0"/>
               </a:rPr>
-              <a:t>   auto </a:t>
+              <a:t>   </a:t>
             </a:r>
             <a:r>
               <a:rPr lang="en-US" sz="1600" dirty="0" err="1" smtClean="0">
                 <a:latin typeface="Courier New" pitchFamily="49" charset="0"/>
                 <a:cs typeface="Courier New" pitchFamily="49" charset="0"/>
               </a:rPr>
-              <a:t>tmp</a:t>
+              <a:t>cout</a:t>
             </a:r>
             <a:r>
               <a:rPr lang="en-US" sz="1600" dirty="0" smtClean="0">
                 <a:latin typeface="Courier New" pitchFamily="49" charset="0"/>
                 <a:cs typeface="Courier New" pitchFamily="49" charset="0"/>
               </a:rPr>
-              <a:t> {x};</a:t>
+              <a:t> &lt;&lt; "found at " &lt;&lt; </a:t>
+            </a:r>
+            <a:r>
+              <a:rPr lang="en-US" sz="1600" dirty="0" err="1" smtClean="0">
+                <a:latin typeface="Courier New" pitchFamily="49" charset="0"/>
+                <a:cs typeface="Courier New" pitchFamily="49" charset="0"/>
+              </a:rPr>
+              <a:t>pos</a:t>
+            </a:r>
+            <a:r>
+              <a:rPr lang="en-US" sz="1600" dirty="0" smtClean="0">
+                <a:latin typeface="Courier New" pitchFamily="49" charset="0"/>
+                <a:cs typeface="Courier New" pitchFamily="49" charset="0"/>
+              </a:rPr>
+              <a:t> &lt;&lt; </a:t>
+            </a:r>
+            <a:r>
+              <a:rPr lang="en-US" sz="1600" dirty="0" err="1" smtClean="0">
+                <a:latin typeface="Courier New" pitchFamily="49" charset="0"/>
+                <a:cs typeface="Courier New" pitchFamily="49" charset="0"/>
+              </a:rPr>
+              <a:t>endl</a:t>
+            </a:r>
+            <a:r>
+              <a:rPr lang="en-US" sz="1600" dirty="0" smtClean="0">
+                <a:latin typeface="Courier New" pitchFamily="49" charset="0"/>
+                <a:cs typeface="Courier New" pitchFamily="49" charset="0"/>
+              </a:rPr>
+              <a:t>;</a:t>
             </a:r>
           </a:p>
           <a:p>
@@ -3874,10 +4238,70 @@
                 <a:latin typeface="Courier New" pitchFamily="49" charset="0"/>
                 <a:cs typeface="Courier New" pitchFamily="49" charset="0"/>
               </a:rPr>
-              <a:t>   x = y;</a:t>
-            </a:r>
-          </a:p>
-          <a:p>
+              <a:t>   </a:t>
+            </a:r>
+            <a:r>
+              <a:rPr lang="en-US" sz="1600" dirty="0" err="1" smtClean="0">
+                <a:latin typeface="Courier New" pitchFamily="49" charset="0"/>
+                <a:cs typeface="Courier New" pitchFamily="49" charset="0"/>
+              </a:rPr>
+              <a:t>pos</a:t>
+            </a:r>
+            <a:r>
+              <a:rPr lang="en-US" sz="1600" dirty="0" smtClean="0">
+                <a:latin typeface="Courier New" pitchFamily="49" charset="0"/>
+                <a:cs typeface="Courier New" pitchFamily="49" charset="0"/>
+              </a:rPr>
+              <a:t>++;</a:t>
+            </a:r>
+          </a:p>
+          <a:p>
+            <a:r>
+              <a:rPr lang="en-US" sz="1600" dirty="0" smtClean="0">
+                <a:latin typeface="Courier New" pitchFamily="49" charset="0"/>
+                <a:cs typeface="Courier New" pitchFamily="49" charset="0"/>
+              </a:rPr>
+              <a:t>}</a:t>
+            </a:r>
+          </a:p>
+          <a:p>
+            <a:r>
+              <a:rPr lang="en-US" sz="1600" dirty="0" err="1" smtClean="0">
+                <a:latin typeface="Courier New" pitchFamily="49" charset="0"/>
+                <a:cs typeface="Courier New" pitchFamily="49" charset="0"/>
+              </a:rPr>
+              <a:t>str.insert</a:t>
+            </a:r>
+            <a:r>
+              <a:rPr lang="en-US" sz="1600" dirty="0" smtClean="0">
+                <a:latin typeface="Courier New" pitchFamily="49" charset="0"/>
+                <a:cs typeface="Courier New" pitchFamily="49" charset="0"/>
+              </a:rPr>
+              <a:t>(6, "Beautiful ");</a:t>
+            </a:r>
+          </a:p>
+          <a:p>
+            <a:r>
+              <a:rPr lang="en-US" sz="1600" dirty="0" err="1" smtClean="0">
+                <a:latin typeface="Courier New" pitchFamily="49" charset="0"/>
+                <a:cs typeface="Courier New" pitchFamily="49" charset="0"/>
+              </a:rPr>
+              <a:t>cout</a:t>
+            </a:r>
+            <a:r>
+              <a:rPr lang="en-US" sz="1600" dirty="0" smtClean="0">
+                <a:latin typeface="Courier New" pitchFamily="49" charset="0"/>
+                <a:cs typeface="Courier New" pitchFamily="49" charset="0"/>
+              </a:rPr>
+              <a:t> &lt;&lt; </a:t>
+            </a:r>
+            <a:r>
+              <a:rPr lang="en-US" sz="1600" dirty="0" err="1" smtClean="0">
+                <a:latin typeface="Courier New" pitchFamily="49" charset="0"/>
+                <a:cs typeface="Courier New" pitchFamily="49" charset="0"/>
+              </a:rPr>
+              <a:t>str</a:t>
+            </a:r>
             <a:r>
               <a:rPr lang="en-US" sz="1600" dirty="0">
                 <a:latin typeface="Courier New" pitchFamily="49" charset="0"/>
@@ -3890,14 +4314,14 @@
                 <a:latin typeface="Courier New" pitchFamily="49" charset="0"/>
                 <a:cs typeface="Courier New" pitchFamily="49" charset="0"/>
               </a:rPr>
-              <a:t>   y = </a:t>
+              <a:t>&lt;&lt; </a:t>
             </a:r>
             <a:r>
               <a:rPr lang="en-US" sz="1600" dirty="0" err="1" smtClean="0">
                 <a:latin typeface="Courier New" pitchFamily="49" charset="0"/>
                 <a:cs typeface="Courier New" pitchFamily="49" charset="0"/>
               </a:rPr>
-              <a:t>tmp</a:t>
+              <a:t>endl</a:t>
             </a:r>
             <a:r>
               <a:rPr lang="en-US" sz="1600" dirty="0" smtClean="0">
@@ -3905,15 +4329,6 @@
                 <a:cs typeface="Courier New" pitchFamily="49" charset="0"/>
               </a:rPr>
               <a:t>;</a:t>
-            </a:r>
-          </a:p>
-          <a:p>
-            <a:r>
-              <a:rPr lang="en-US" sz="1600" dirty="0">
-                <a:latin typeface="Courier New" pitchFamily="49" charset="0"/>
-                <a:cs typeface="Courier New" pitchFamily="49" charset="0"/>
-              </a:rPr>
-              <a:t>}</a:t>
             </a:r>
             <a:endParaRPr lang="en-US" sz="1600" dirty="0" smtClean="0">
               <a:latin typeface="Courier New" pitchFamily="49" charset="0"/>
@@ -3922,422 +4337,39 @@
           </a:p>
         </p:txBody>
       </p:sp>
-      <p:sp>
-        <p:nvSpPr>
-          <p:cNvPr id="8" name="TextBox 7"/>
-          <p:cNvSpPr txBox="1"/>
-          <p:nvPr/>
-        </p:nvSpPr>
-        <p:spPr>
-          <a:xfrm>
-            <a:off x="3205931" y="2274020"/>
-            <a:ext cx="4798141" cy="1323439"/>
-          </a:xfrm>
-          <a:prstGeom prst="rect">
-            <a:avLst/>
-          </a:prstGeom>
-          <a:solidFill>
-            <a:schemeClr val="bg1">
-              <a:lumMod val="75000"/>
-            </a:schemeClr>
-          </a:solidFill>
-          <a:ln>
-            <a:solidFill>
-              <a:schemeClr val="tx1"/>
-            </a:solidFill>
-          </a:ln>
-        </p:spPr>
-        <p:txBody>
-          <a:bodyPr wrap="square" rtlCol="0">
-            <a:spAutoFit/>
-          </a:bodyPr>
-          <a:lstStyle/>
-          <a:p>
-            <a:r>
-              <a:rPr lang="en-US" sz="1600" dirty="0" smtClean="0">
-                <a:latin typeface="Courier New" pitchFamily="49" charset="0"/>
-                <a:cs typeface="Courier New" pitchFamily="49" charset="0"/>
-              </a:rPr>
-              <a:t>void </a:t>
-            </a:r>
-            <a:r>
-              <a:rPr lang="en-US" sz="1600" dirty="0" err="1" smtClean="0">
-                <a:latin typeface="Courier New" pitchFamily="49" charset="0"/>
-                <a:cs typeface="Courier New" pitchFamily="49" charset="0"/>
-              </a:rPr>
-              <a:t>swap_val</a:t>
-            </a:r>
-            <a:r>
-              <a:rPr lang="en-US" sz="1600" dirty="0" smtClean="0">
-                <a:latin typeface="Courier New" pitchFamily="49" charset="0"/>
-                <a:cs typeface="Courier New" pitchFamily="49" charset="0"/>
-              </a:rPr>
-              <a:t>(double&amp; x, double&amp; y) {</a:t>
-            </a:r>
-          </a:p>
-          <a:p>
-            <a:r>
-              <a:rPr lang="en-US" sz="1600" dirty="0">
-                <a:latin typeface="Courier New" pitchFamily="49" charset="0"/>
-                <a:cs typeface="Courier New" pitchFamily="49" charset="0"/>
-              </a:rPr>
-              <a:t> </a:t>
-            </a:r>
-            <a:r>
-              <a:rPr lang="en-US" sz="1600" dirty="0" smtClean="0">
-                <a:latin typeface="Courier New" pitchFamily="49" charset="0"/>
-                <a:cs typeface="Courier New" pitchFamily="49" charset="0"/>
-              </a:rPr>
-              <a:t>   auto </a:t>
-            </a:r>
-            <a:r>
-              <a:rPr lang="en-US" sz="1600" dirty="0" err="1" smtClean="0">
-                <a:latin typeface="Courier New" pitchFamily="49" charset="0"/>
-                <a:cs typeface="Courier New" pitchFamily="49" charset="0"/>
-              </a:rPr>
-              <a:t>tmp</a:t>
-            </a:r>
-            <a:r>
-              <a:rPr lang="en-US" sz="1600" dirty="0" smtClean="0">
-                <a:latin typeface="Courier New" pitchFamily="49" charset="0"/>
-                <a:cs typeface="Courier New" pitchFamily="49" charset="0"/>
-              </a:rPr>
-              <a:t> {x};</a:t>
-            </a:r>
-          </a:p>
-          <a:p>
-            <a:r>
-              <a:rPr lang="en-US" sz="1600" dirty="0">
-                <a:latin typeface="Courier New" pitchFamily="49" charset="0"/>
-                <a:cs typeface="Courier New" pitchFamily="49" charset="0"/>
-              </a:rPr>
-              <a:t> </a:t>
-            </a:r>
-            <a:r>
-              <a:rPr lang="en-US" sz="1600" dirty="0" smtClean="0">
-                <a:latin typeface="Courier New" pitchFamily="49" charset="0"/>
-                <a:cs typeface="Courier New" pitchFamily="49" charset="0"/>
-              </a:rPr>
-              <a:t>   x = y;</a:t>
-            </a:r>
-          </a:p>
-          <a:p>
-            <a:r>
-              <a:rPr lang="en-US" sz="1600" dirty="0">
-                <a:latin typeface="Courier New" pitchFamily="49" charset="0"/>
-                <a:cs typeface="Courier New" pitchFamily="49" charset="0"/>
-              </a:rPr>
-              <a:t> </a:t>
-            </a:r>
-            <a:r>
-              <a:rPr lang="en-US" sz="1600" dirty="0" smtClean="0">
-                <a:latin typeface="Courier New" pitchFamily="49" charset="0"/>
-                <a:cs typeface="Courier New" pitchFamily="49" charset="0"/>
-              </a:rPr>
-              <a:t>   y = </a:t>
-            </a:r>
-            <a:r>
-              <a:rPr lang="en-US" sz="1600" dirty="0" err="1" smtClean="0">
-                <a:latin typeface="Courier New" pitchFamily="49" charset="0"/>
-                <a:cs typeface="Courier New" pitchFamily="49" charset="0"/>
-              </a:rPr>
-              <a:t>tmp</a:t>
-            </a:r>
-            <a:r>
-              <a:rPr lang="en-US" sz="1600" dirty="0" smtClean="0">
-                <a:latin typeface="Courier New" pitchFamily="49" charset="0"/>
-                <a:cs typeface="Courier New" pitchFamily="49" charset="0"/>
-              </a:rPr>
-              <a:t>;</a:t>
-            </a:r>
-          </a:p>
-          <a:p>
-            <a:r>
-              <a:rPr lang="en-US" sz="1600" dirty="0">
-                <a:latin typeface="Courier New" pitchFamily="49" charset="0"/>
-                <a:cs typeface="Courier New" pitchFamily="49" charset="0"/>
-              </a:rPr>
-              <a:t>}</a:t>
-            </a:r>
-            <a:endParaRPr lang="en-US" sz="1600" dirty="0" smtClean="0">
-              <a:latin typeface="Courier New" pitchFamily="49" charset="0"/>
-              <a:cs typeface="Courier New" pitchFamily="49" charset="0"/>
-            </a:endParaRPr>
-          </a:p>
-        </p:txBody>
-      </p:sp>
       <p:grpSp>
         <p:nvGrpSpPr>
-          <p:cNvPr id="16" name="Group 15"/>
+          <p:cNvPr id="21" name="Group 20"/>
           <p:cNvGrpSpPr/>
           <p:nvPr/>
         </p:nvGrpSpPr>
         <p:grpSpPr>
           <a:xfrm>
-            <a:off x="7399042" y="2942583"/>
-            <a:ext cx="1682980" cy="979878"/>
-            <a:chOff x="6457950" y="2819376"/>
-            <a:chExt cx="1682980" cy="979878"/>
+            <a:off x="5784256" y="3346200"/>
+            <a:ext cx="3178823" cy="369332"/>
+            <a:chOff x="6184490" y="365126"/>
+            <a:chExt cx="3178823" cy="369332"/>
           </a:xfrm>
         </p:grpSpPr>
-        <p:grpSp>
-          <p:nvGrpSpPr>
-            <p:cNvPr id="11" name="Group 10"/>
-            <p:cNvGrpSpPr/>
-            <p:nvPr/>
-          </p:nvGrpSpPr>
-          <p:grpSpPr>
-            <a:xfrm>
-              <a:off x="6457950" y="2819376"/>
-              <a:ext cx="786581" cy="923330"/>
-              <a:chOff x="393290" y="3303639"/>
-              <a:chExt cx="786581" cy="923330"/>
-            </a:xfrm>
-          </p:grpSpPr>
-          <p:sp>
-            <p:nvSpPr>
-              <p:cNvPr id="9" name="Rounded Rectangle 8"/>
-              <p:cNvSpPr/>
-              <p:nvPr/>
-            </p:nvSpPr>
-            <p:spPr>
-              <a:xfrm>
-                <a:off x="393290" y="3716594"/>
-                <a:ext cx="786581" cy="432619"/>
-              </a:xfrm>
-              <a:prstGeom prst="roundRect">
-                <a:avLst/>
-              </a:prstGeom>
-              <a:solidFill>
-                <a:schemeClr val="bg1"/>
-              </a:solidFill>
-              <a:ln w="28575">
-                <a:solidFill>
-                  <a:srgbClr val="C00000"/>
-                </a:solidFill>
-              </a:ln>
-            </p:spPr>
-            <p:style>
-              <a:lnRef idx="2">
-                <a:schemeClr val="accent1">
-                  <a:shade val="50000"/>
-                </a:schemeClr>
-              </a:lnRef>
-              <a:fillRef idx="1">
-                <a:schemeClr val="accent1"/>
-              </a:fillRef>
-              <a:effectRef idx="0">
-                <a:schemeClr val="accent1"/>
-              </a:effectRef>
-              <a:fontRef idx="minor">
-                <a:schemeClr val="lt1"/>
-              </a:fontRef>
-            </p:style>
-            <p:txBody>
-              <a:bodyPr rtlCol="0" anchor="ctr"/>
-              <a:lstStyle/>
-              <a:p>
-                <a:pPr algn="ctr"/>
-                <a:endParaRPr lang="en-US"/>
-              </a:p>
-            </p:txBody>
-          </p:sp>
-          <p:sp>
-            <p:nvSpPr>
-              <p:cNvPr id="10" name="TextBox 9"/>
-              <p:cNvSpPr txBox="1"/>
-              <p:nvPr/>
-            </p:nvSpPr>
-            <p:spPr>
-              <a:xfrm>
-                <a:off x="468350" y="3303639"/>
-                <a:ext cx="662361" cy="923330"/>
-              </a:xfrm>
-              <a:prstGeom prst="rect">
-                <a:avLst/>
-              </a:prstGeom>
-              <a:noFill/>
-            </p:spPr>
-            <p:txBody>
-              <a:bodyPr wrap="none" rtlCol="0">
-                <a:spAutoFit/>
-              </a:bodyPr>
-              <a:lstStyle/>
-              <a:p>
-                <a:r>
-                  <a:rPr lang="en-US" sz="5400" dirty="0" smtClean="0"/>
-                  <a:t>…</a:t>
-                </a:r>
-                <a:endParaRPr lang="en-US" sz="5400" dirty="0"/>
-              </a:p>
-            </p:txBody>
-          </p:sp>
-        </p:grpSp>
-        <p:sp>
-          <p:nvSpPr>
-            <p:cNvPr id="12" name="TextBox 11"/>
-            <p:cNvSpPr txBox="1"/>
-            <p:nvPr/>
-          </p:nvSpPr>
-          <p:spPr>
-            <a:xfrm>
-              <a:off x="7244531" y="3091368"/>
-              <a:ext cx="896399" cy="707886"/>
-            </a:xfrm>
-            <a:prstGeom prst="rect">
-              <a:avLst/>
-            </a:prstGeom>
-            <a:noFill/>
-          </p:spPr>
-          <p:txBody>
-            <a:bodyPr wrap="none" rtlCol="0">
-              <a:spAutoFit/>
-            </a:bodyPr>
-            <a:lstStyle/>
-            <a:p>
-              <a:r>
-                <a:rPr lang="en-US" sz="4000" dirty="0" smtClean="0">
-                  <a:solidFill>
-                    <a:srgbClr val="C00000"/>
-                  </a:solidFill>
-                </a:rPr>
-                <a:t>???</a:t>
-              </a:r>
-              <a:endParaRPr lang="en-US" sz="4000" dirty="0">
-                <a:solidFill>
-                  <a:srgbClr val="C00000"/>
-                </a:solidFill>
-              </a:endParaRPr>
-            </a:p>
-          </p:txBody>
-        </p:sp>
-      </p:grpSp>
-      <p:grpSp>
-        <p:nvGrpSpPr>
-          <p:cNvPr id="15" name="Group 14"/>
-          <p:cNvGrpSpPr/>
-          <p:nvPr/>
-        </p:nvGrpSpPr>
-        <p:grpSpPr>
-          <a:xfrm>
-            <a:off x="1218125" y="4247463"/>
-            <a:ext cx="6500197" cy="1967852"/>
-            <a:chOff x="1060808" y="4080315"/>
-            <a:chExt cx="6500197" cy="1967852"/>
-          </a:xfrm>
-        </p:grpSpPr>
-        <p:sp>
-          <p:nvSpPr>
-            <p:cNvPr id="5" name="TextBox 4"/>
-            <p:cNvSpPr txBox="1"/>
-            <p:nvPr/>
-          </p:nvSpPr>
-          <p:spPr>
-            <a:xfrm>
-              <a:off x="1060808" y="4724728"/>
-              <a:ext cx="6500197" cy="1323439"/>
-            </a:xfrm>
-            <a:prstGeom prst="rect">
-              <a:avLst/>
-            </a:prstGeom>
-            <a:solidFill>
-              <a:schemeClr val="bg1">
-                <a:lumMod val="75000"/>
-              </a:schemeClr>
-            </a:solidFill>
-          </p:spPr>
-          <p:txBody>
-            <a:bodyPr wrap="square" rtlCol="0">
-              <a:spAutoFit/>
-            </a:bodyPr>
-            <a:lstStyle/>
-            <a:p>
-              <a:r>
-                <a:rPr lang="nn-NO" sz="1600" dirty="0" smtClean="0">
-                  <a:latin typeface="Courier New" pitchFamily="49" charset="0"/>
-                  <a:cs typeface="Courier New" pitchFamily="49" charset="0"/>
-                </a:rPr>
-                <a:t>template&lt;typename T&gt; void swap_val(T&amp; v1, T&amp; v2) {</a:t>
-              </a:r>
-            </a:p>
-            <a:p>
-              <a:r>
-                <a:rPr lang="nn-NO" sz="1600" dirty="0">
-                  <a:latin typeface="Courier New" pitchFamily="49" charset="0"/>
-                  <a:cs typeface="Courier New" pitchFamily="49" charset="0"/>
-                </a:rPr>
-                <a:t> </a:t>
-              </a:r>
-              <a:r>
-                <a:rPr lang="nn-NO" sz="1600" dirty="0" smtClean="0">
-                  <a:latin typeface="Courier New" pitchFamily="49" charset="0"/>
-                  <a:cs typeface="Courier New" pitchFamily="49" charset="0"/>
-                </a:rPr>
-                <a:t>   auto tmp = v1;</a:t>
-              </a:r>
-            </a:p>
-            <a:p>
-              <a:r>
-                <a:rPr lang="nn-NO" sz="1600" dirty="0">
-                  <a:latin typeface="Courier New" pitchFamily="49" charset="0"/>
-                  <a:cs typeface="Courier New" pitchFamily="49" charset="0"/>
-                </a:rPr>
-                <a:t> </a:t>
-              </a:r>
-              <a:r>
-                <a:rPr lang="nn-NO" sz="1600" dirty="0" smtClean="0">
-                  <a:latin typeface="Courier New" pitchFamily="49" charset="0"/>
-                  <a:cs typeface="Courier New" pitchFamily="49" charset="0"/>
-                </a:rPr>
-                <a:t>   v1 = v2;</a:t>
-              </a:r>
-            </a:p>
-            <a:p>
-              <a:r>
-                <a:rPr lang="nn-NO" sz="1600" dirty="0">
-                  <a:latin typeface="Courier New" pitchFamily="49" charset="0"/>
-                  <a:cs typeface="Courier New" pitchFamily="49" charset="0"/>
-                </a:rPr>
-                <a:t> </a:t>
-              </a:r>
-              <a:r>
-                <a:rPr lang="nn-NO" sz="1600" dirty="0" smtClean="0">
-                  <a:latin typeface="Courier New" pitchFamily="49" charset="0"/>
-                  <a:cs typeface="Courier New" pitchFamily="49" charset="0"/>
-                </a:rPr>
-                <a:t>   v2 = tmp;</a:t>
-              </a:r>
-            </a:p>
-            <a:p>
-              <a:r>
-                <a:rPr lang="nn-NO" sz="1600" dirty="0">
-                  <a:latin typeface="Courier New" pitchFamily="49" charset="0"/>
-                  <a:cs typeface="Courier New" pitchFamily="49" charset="0"/>
-                </a:rPr>
-                <a:t>}</a:t>
-              </a:r>
-            </a:p>
-          </p:txBody>
-        </p:sp>
         <p:cxnSp>
           <p:nvCxnSpPr>
-            <p:cNvPr id="14" name="Straight Arrow Connector 13"/>
+            <p:cNvPr id="13" name="Straight Arrow Connector 12"/>
             <p:cNvCxnSpPr/>
             <p:nvPr/>
           </p:nvCxnSpPr>
           <p:spPr>
-            <a:xfrm>
-              <a:off x="4365522" y="4080315"/>
-              <a:ext cx="0" cy="556541"/>
+            <a:xfrm flipV="1">
+              <a:off x="6184490" y="549792"/>
+              <a:ext cx="727587" cy="9832"/>
             </a:xfrm>
             <a:prstGeom prst="straightConnector1">
               <a:avLst/>
             </a:prstGeom>
-            <a:ln w="57150">
+            <a:ln w="53975">
               <a:solidFill>
                 <a:schemeClr val="tx1"/>
               </a:solidFill>
-              <a:tailEnd type="stealth"/>
+              <a:tailEnd type="stealth" w="lg" len="lg"/>
             </a:ln>
           </p:spPr>
           <p:style>
@@ -4355,6 +4387,329 @@
             </a:fontRef>
           </p:style>
         </p:cxnSp>
+        <p:sp>
+          <p:nvSpPr>
+            <p:cNvPr id="20" name="TextBox 19"/>
+            <p:cNvSpPr txBox="1"/>
+            <p:nvPr/>
+          </p:nvSpPr>
+          <p:spPr>
+            <a:xfrm>
+              <a:off x="7049729" y="365126"/>
+              <a:ext cx="2313584" cy="369332"/>
+            </a:xfrm>
+            <a:prstGeom prst="rect">
+              <a:avLst/>
+            </a:prstGeom>
+            <a:solidFill>
+              <a:schemeClr val="tx1"/>
+            </a:solidFill>
+          </p:spPr>
+          <p:txBody>
+            <a:bodyPr wrap="square" rtlCol="0">
+              <a:spAutoFit/>
+            </a:bodyPr>
+            <a:lstStyle/>
+            <a:p>
+              <a:r>
+                <a:rPr lang="en-US" b="1" dirty="0" smtClean="0">
+                  <a:solidFill>
+                    <a:schemeClr val="bg2"/>
+                  </a:solidFill>
+                </a:rPr>
+                <a:t>world</a:t>
+              </a:r>
+              <a:endParaRPr lang="en-US" b="1" dirty="0">
+                <a:solidFill>
+                  <a:schemeClr val="bg2"/>
+                </a:solidFill>
+              </a:endParaRPr>
+            </a:p>
+          </p:txBody>
+        </p:sp>
+      </p:grpSp>
+      <p:grpSp>
+        <p:nvGrpSpPr>
+          <p:cNvPr id="22" name="Group 21"/>
+          <p:cNvGrpSpPr/>
+          <p:nvPr/>
+        </p:nvGrpSpPr>
+        <p:grpSpPr>
+          <a:xfrm>
+            <a:off x="5784256" y="4339636"/>
+            <a:ext cx="3178823" cy="369332"/>
+            <a:chOff x="6184490" y="365126"/>
+            <a:chExt cx="3178823" cy="369332"/>
+          </a:xfrm>
+        </p:grpSpPr>
+        <p:cxnSp>
+          <p:nvCxnSpPr>
+            <p:cNvPr id="23" name="Straight Arrow Connector 22"/>
+            <p:cNvCxnSpPr/>
+            <p:nvPr/>
+          </p:nvCxnSpPr>
+          <p:spPr>
+            <a:xfrm flipV="1">
+              <a:off x="6184490" y="549792"/>
+              <a:ext cx="727587" cy="9832"/>
+            </a:xfrm>
+            <a:prstGeom prst="straightConnector1">
+              <a:avLst/>
+            </a:prstGeom>
+            <a:ln w="53975">
+              <a:solidFill>
+                <a:schemeClr val="tx1"/>
+              </a:solidFill>
+              <a:tailEnd type="stealth" w="lg" len="lg"/>
+            </a:ln>
+          </p:spPr>
+          <p:style>
+            <a:lnRef idx="1">
+              <a:schemeClr val="accent1"/>
+            </a:lnRef>
+            <a:fillRef idx="0">
+              <a:schemeClr val="accent1"/>
+            </a:fillRef>
+            <a:effectRef idx="0">
+              <a:schemeClr val="accent1"/>
+            </a:effectRef>
+            <a:fontRef idx="minor">
+              <a:schemeClr val="tx1"/>
+            </a:fontRef>
+          </p:style>
+        </p:cxnSp>
+        <p:sp>
+          <p:nvSpPr>
+            <p:cNvPr id="24" name="TextBox 23"/>
+            <p:cNvSpPr txBox="1"/>
+            <p:nvPr/>
+          </p:nvSpPr>
+          <p:spPr>
+            <a:xfrm>
+              <a:off x="7049729" y="365126"/>
+              <a:ext cx="2313584" cy="369332"/>
+            </a:xfrm>
+            <a:prstGeom prst="rect">
+              <a:avLst/>
+            </a:prstGeom>
+            <a:solidFill>
+              <a:schemeClr val="tx1"/>
+            </a:solidFill>
+          </p:spPr>
+          <p:txBody>
+            <a:bodyPr wrap="square" rtlCol="0">
+              <a:spAutoFit/>
+            </a:bodyPr>
+            <a:lstStyle/>
+            <a:p>
+              <a:r>
+                <a:rPr lang="en-US" b="1" dirty="0" smtClean="0">
+                  <a:solidFill>
+                    <a:schemeClr val="bg2"/>
+                  </a:solidFill>
+                </a:rPr>
+                <a:t>Hello World!</a:t>
+              </a:r>
+              <a:endParaRPr lang="en-US" b="1" dirty="0">
+                <a:solidFill>
+                  <a:schemeClr val="bg2"/>
+                </a:solidFill>
+              </a:endParaRPr>
+            </a:p>
+          </p:txBody>
+        </p:sp>
+      </p:grpSp>
+      <p:grpSp>
+        <p:nvGrpSpPr>
+          <p:cNvPr id="25" name="Group 24"/>
+          <p:cNvGrpSpPr/>
+          <p:nvPr/>
+        </p:nvGrpSpPr>
+        <p:grpSpPr>
+          <a:xfrm>
+            <a:off x="5774286" y="5106330"/>
+            <a:ext cx="3188793" cy="646331"/>
+            <a:chOff x="6184490" y="365126"/>
+            <a:chExt cx="3188793" cy="646331"/>
+          </a:xfrm>
+        </p:grpSpPr>
+        <p:cxnSp>
+          <p:nvCxnSpPr>
+            <p:cNvPr id="26" name="Straight Arrow Connector 25"/>
+            <p:cNvCxnSpPr/>
+            <p:nvPr/>
+          </p:nvCxnSpPr>
+          <p:spPr>
+            <a:xfrm flipV="1">
+              <a:off x="6184490" y="549792"/>
+              <a:ext cx="727587" cy="9832"/>
+            </a:xfrm>
+            <a:prstGeom prst="straightConnector1">
+              <a:avLst/>
+            </a:prstGeom>
+            <a:ln w="53975">
+              <a:solidFill>
+                <a:schemeClr val="tx1"/>
+              </a:solidFill>
+              <a:tailEnd type="stealth" w="lg" len="lg"/>
+            </a:ln>
+          </p:spPr>
+          <p:style>
+            <a:lnRef idx="1">
+              <a:schemeClr val="accent1"/>
+            </a:lnRef>
+            <a:fillRef idx="0">
+              <a:schemeClr val="accent1"/>
+            </a:fillRef>
+            <a:effectRef idx="0">
+              <a:schemeClr val="accent1"/>
+            </a:effectRef>
+            <a:fontRef idx="minor">
+              <a:schemeClr val="tx1"/>
+            </a:fontRef>
+          </p:style>
+        </p:cxnSp>
+        <p:sp>
+          <p:nvSpPr>
+            <p:cNvPr id="27" name="TextBox 26"/>
+            <p:cNvSpPr txBox="1"/>
+            <p:nvPr/>
+          </p:nvSpPr>
+          <p:spPr>
+            <a:xfrm>
+              <a:off x="7049729" y="365126"/>
+              <a:ext cx="2323554" cy="646331"/>
+            </a:xfrm>
+            <a:prstGeom prst="rect">
+              <a:avLst/>
+            </a:prstGeom>
+            <a:solidFill>
+              <a:schemeClr val="tx1"/>
+            </a:solidFill>
+          </p:spPr>
+          <p:txBody>
+            <a:bodyPr wrap="square" rtlCol="0">
+              <a:spAutoFit/>
+            </a:bodyPr>
+            <a:lstStyle/>
+            <a:p>
+              <a:r>
+                <a:rPr lang="en-US" b="1" dirty="0" smtClean="0">
+                  <a:solidFill>
+                    <a:schemeClr val="bg2"/>
+                  </a:solidFill>
+                </a:rPr>
+                <a:t>found at 4</a:t>
+              </a:r>
+            </a:p>
+            <a:p>
+              <a:r>
+                <a:rPr lang="en-US" b="1" dirty="0" smtClean="0">
+                  <a:solidFill>
+                    <a:schemeClr val="bg2"/>
+                  </a:solidFill>
+                </a:rPr>
+                <a:t>found at 7</a:t>
+              </a:r>
+              <a:endParaRPr lang="en-US" b="1" dirty="0">
+                <a:solidFill>
+                  <a:schemeClr val="bg2"/>
+                </a:solidFill>
+              </a:endParaRPr>
+            </a:p>
+          </p:txBody>
+        </p:sp>
+      </p:grpSp>
+      <p:grpSp>
+        <p:nvGrpSpPr>
+          <p:cNvPr id="28" name="Group 27"/>
+          <p:cNvGrpSpPr/>
+          <p:nvPr/>
+        </p:nvGrpSpPr>
+        <p:grpSpPr>
+          <a:xfrm>
+            <a:off x="5777397" y="6072949"/>
+            <a:ext cx="3185682" cy="369332"/>
+            <a:chOff x="6184490" y="365126"/>
+            <a:chExt cx="3185682" cy="369332"/>
+          </a:xfrm>
+        </p:grpSpPr>
+        <p:cxnSp>
+          <p:nvCxnSpPr>
+            <p:cNvPr id="29" name="Straight Arrow Connector 28"/>
+            <p:cNvCxnSpPr/>
+            <p:nvPr/>
+          </p:nvCxnSpPr>
+          <p:spPr>
+            <a:xfrm flipV="1">
+              <a:off x="6184490" y="549792"/>
+              <a:ext cx="727587" cy="9832"/>
+            </a:xfrm>
+            <a:prstGeom prst="straightConnector1">
+              <a:avLst/>
+            </a:prstGeom>
+            <a:ln w="53975">
+              <a:solidFill>
+                <a:schemeClr val="tx1"/>
+              </a:solidFill>
+              <a:tailEnd type="stealth" w="lg" len="lg"/>
+            </a:ln>
+          </p:spPr>
+          <p:style>
+            <a:lnRef idx="1">
+              <a:schemeClr val="accent1"/>
+            </a:lnRef>
+            <a:fillRef idx="0">
+              <a:schemeClr val="accent1"/>
+            </a:fillRef>
+            <a:effectRef idx="0">
+              <a:schemeClr val="accent1"/>
+            </a:effectRef>
+            <a:fontRef idx="minor">
+              <a:schemeClr val="tx1"/>
+            </a:fontRef>
+          </p:style>
+        </p:cxnSp>
+        <p:sp>
+          <p:nvSpPr>
+            <p:cNvPr id="30" name="TextBox 29"/>
+            <p:cNvSpPr txBox="1"/>
+            <p:nvPr/>
+          </p:nvSpPr>
+          <p:spPr>
+            <a:xfrm>
+              <a:off x="7049729" y="365126"/>
+              <a:ext cx="2320443" cy="369332"/>
+            </a:xfrm>
+            <a:prstGeom prst="rect">
+              <a:avLst/>
+            </a:prstGeom>
+            <a:solidFill>
+              <a:schemeClr val="tx1"/>
+            </a:solidFill>
+          </p:spPr>
+          <p:txBody>
+            <a:bodyPr wrap="none" rtlCol="0">
+              <a:spAutoFit/>
+            </a:bodyPr>
+            <a:lstStyle/>
+            <a:p>
+              <a:r>
+                <a:rPr lang="en-US" b="1" dirty="0" smtClean="0">
+                  <a:solidFill>
+                    <a:schemeClr val="bg2"/>
+                  </a:solidFill>
+                </a:rPr>
+                <a:t>Hello Beautiful World!</a:t>
+              </a:r>
+              <a:endParaRPr lang="en-US" b="1" dirty="0">
+                <a:solidFill>
+                  <a:schemeClr val="bg2"/>
+                </a:solidFill>
+              </a:endParaRPr>
+            </a:p>
+          </p:txBody>
+        </p:sp>
       </p:grpSp>
     </p:spTree>
     <p:extLst>
@@ -4387,7 +4742,7 @@
                             </p:stCondLst>
                             <p:childTnLst>
                               <p:par>
-                                <p:cTn id="5" presetID="1" presetClass="entr" presetSubtype="0" fill="hold" grpId="0" nodeType="clickEffect">
+                                <p:cTn id="5" presetID="1" presetClass="entr" presetSubtype="0" fill="hold" nodeType="clickEffect">
                                   <p:stCondLst>
                                     <p:cond delay="0"/>
                                   </p:stCondLst>
@@ -4400,7 +4755,7 @@
                                           </p:stCondLst>
                                         </p:cTn>
                                         <p:tgtEl>
-                                          <p:spTgt spid="8"/>
+                                          <p:spTgt spid="21"/>
                                         </p:tgtEl>
                                         <p:attrNameLst>
                                           <p:attrName>style.visibility</p:attrName>
@@ -4445,7 +4800,7 @@
                                           </p:stCondLst>
                                         </p:cTn>
                                         <p:tgtEl>
-                                          <p:spTgt spid="16"/>
+                                          <p:spTgt spid="22"/>
                                         </p:tgtEl>
                                         <p:attrNameLst>
                                           <p:attrName>style.visibility</p:attrName>
@@ -4490,7 +4845,52 @@
                                           </p:stCondLst>
                                         </p:cTn>
                                         <p:tgtEl>
-                                          <p:spTgt spid="15"/>
+                                          <p:spTgt spid="25"/>
+                                        </p:tgtEl>
+                                        <p:attrNameLst>
+                                          <p:attrName>style.visibility</p:attrName>
+                                        </p:attrNameLst>
+                                      </p:cBhvr>
+                                      <p:to>
+                                        <p:strVal val="visible"/>
+                                      </p:to>
+                                    </p:set>
+                                  </p:childTnLst>
+                                </p:cTn>
+                              </p:par>
+                            </p:childTnLst>
+                          </p:cTn>
+                        </p:par>
+                      </p:childTnLst>
+                    </p:cTn>
+                  </p:par>
+                  <p:par>
+                    <p:cTn id="15" fill="hold">
+                      <p:stCondLst>
+                        <p:cond delay="indefinite"/>
+                      </p:stCondLst>
+                      <p:childTnLst>
+                        <p:par>
+                          <p:cTn id="16" fill="hold">
+                            <p:stCondLst>
+                              <p:cond delay="0"/>
+                            </p:stCondLst>
+                            <p:childTnLst>
+                              <p:par>
+                                <p:cTn id="17" presetID="1" presetClass="entr" presetSubtype="0" fill="hold" nodeType="clickEffect">
+                                  <p:stCondLst>
+                                    <p:cond delay="0"/>
+                                  </p:stCondLst>
+                                  <p:childTnLst>
+                                    <p:set>
+                                      <p:cBhvr>
+                                        <p:cTn id="18" dur="1" fill="hold">
+                                          <p:stCondLst>
+                                            <p:cond delay="0"/>
+                                          </p:stCondLst>
+                                        </p:cTn>
+                                        <p:tgtEl>
+                                          <p:spTgt spid="28"/>
                                         </p:tgtEl>
                                         <p:attrNameLst>
                                           <p:attrName>style.visibility</p:attrName>
@@ -4530,9 +4930,6 @@
         </p:cTn>
       </p:par>
     </p:tnLst>
-    <p:bldLst>
-      <p:bldP spid="8" grpId="0" animBg="1"/>
-    </p:bldLst>
   </p:timing>
 </p:sld>
 </file>
@@ -4570,763 +4967,6 @@
           <a:lstStyle/>
           <a:p>
             <a:r>
-              <a:rPr lang="en-US" dirty="0" err="1" smtClean="0"/>
-              <a:t>Variadic</a:t>
-            </a:r>
-            <a:r>
-              <a:rPr lang="en-US" dirty="0" smtClean="0"/>
-              <a:t> templates</a:t>
-            </a:r>
-            <a:endParaRPr lang="en-US" dirty="0"/>
-          </a:p>
-        </p:txBody>
-      </p:sp>
-      <p:sp>
-        <p:nvSpPr>
-          <p:cNvPr id="5" name="Content Placeholder 4"/>
-          <p:cNvSpPr>
-            <a:spLocks noGrp="1"/>
-          </p:cNvSpPr>
-          <p:nvPr>
-            <p:ph idx="1"/>
-          </p:nvPr>
-        </p:nvSpPr>
-        <p:spPr/>
-        <p:txBody>
-          <a:bodyPr/>
-          <a:lstStyle/>
-          <a:p>
-            <a:r>
-              <a:rPr lang="en-US" dirty="0" smtClean="0"/>
-              <a:t>Implementing function with arbitrary number of arguments</a:t>
-            </a:r>
-            <a:endParaRPr lang="en-US" dirty="0"/>
-          </a:p>
-        </p:txBody>
-      </p:sp>
-      <p:sp>
-        <p:nvSpPr>
-          <p:cNvPr id="3" name="Slide Number Placeholder 2"/>
-          <p:cNvSpPr>
-            <a:spLocks noGrp="1"/>
-          </p:cNvSpPr>
-          <p:nvPr>
-            <p:ph type="sldNum" sz="quarter" idx="12"/>
-          </p:nvPr>
-        </p:nvSpPr>
-        <p:spPr/>
-        <p:txBody>
-          <a:bodyPr/>
-          <a:lstStyle/>
-          <a:p>
-            <a:fld id="{9CEF4966-5219-4577-B301-14467D565841}" type="slidenum">
-              <a:rPr lang="en-US" smtClean="0"/>
-              <a:t>4</a:t>
-            </a:fld>
-            <a:endParaRPr lang="en-US"/>
-          </a:p>
-        </p:txBody>
-      </p:sp>
-      <p:sp>
-        <p:nvSpPr>
-          <p:cNvPr id="4" name="TextBox 3"/>
-          <p:cNvSpPr txBox="1"/>
-          <p:nvPr/>
-        </p:nvSpPr>
-        <p:spPr>
-          <a:xfrm>
-            <a:off x="1029314" y="2833194"/>
-            <a:ext cx="6787332" cy="2062103"/>
-          </a:xfrm>
-          <a:prstGeom prst="rect">
-            <a:avLst/>
-          </a:prstGeom>
-          <a:solidFill>
-            <a:schemeClr val="bg1">
-              <a:lumMod val="75000"/>
-            </a:schemeClr>
-          </a:solidFill>
-          <a:ln>
-            <a:solidFill>
-              <a:schemeClr val="tx1"/>
-            </a:solidFill>
-          </a:ln>
-        </p:spPr>
-        <p:txBody>
-          <a:bodyPr wrap="square" rtlCol="0">
-            <a:spAutoFit/>
-          </a:bodyPr>
-          <a:lstStyle/>
-          <a:p>
-            <a:r>
-              <a:rPr lang="en-US" sz="1600" dirty="0" smtClean="0">
-                <a:latin typeface="Courier New" pitchFamily="49" charset="0"/>
-                <a:cs typeface="Courier New" pitchFamily="49" charset="0"/>
-              </a:rPr>
-              <a:t>double sum() { return 0.0; }</a:t>
-            </a:r>
-          </a:p>
-          <a:p>
-            <a:r>
-              <a:rPr lang="en-US" sz="1600" dirty="0" smtClean="0">
-                <a:latin typeface="Courier New" pitchFamily="49" charset="0"/>
-                <a:cs typeface="Courier New" pitchFamily="49" charset="0"/>
-              </a:rPr>
-              <a:t>template&lt;</a:t>
-            </a:r>
-            <a:r>
-              <a:rPr lang="en-US" sz="1600" dirty="0" err="1" smtClean="0">
-                <a:latin typeface="Courier New" pitchFamily="49" charset="0"/>
-                <a:cs typeface="Courier New" pitchFamily="49" charset="0"/>
-              </a:rPr>
-              <a:t>typename</a:t>
-            </a:r>
-            <a:r>
-              <a:rPr lang="en-US" sz="1600" dirty="0" smtClean="0">
-                <a:latin typeface="Courier New" pitchFamily="49" charset="0"/>
-                <a:cs typeface="Courier New" pitchFamily="49" charset="0"/>
-              </a:rPr>
-              <a:t> T, </a:t>
-            </a:r>
-            <a:r>
-              <a:rPr lang="en-US" sz="1600" dirty="0" err="1" smtClean="0">
-                <a:latin typeface="Courier New" pitchFamily="49" charset="0"/>
-                <a:cs typeface="Courier New" pitchFamily="49" charset="0"/>
-              </a:rPr>
-              <a:t>typename</a:t>
-            </a:r>
-            <a:r>
-              <a:rPr lang="en-US" sz="1600" dirty="0" smtClean="0">
-                <a:latin typeface="Courier New" pitchFamily="49" charset="0"/>
-                <a:cs typeface="Courier New" pitchFamily="49" charset="0"/>
-              </a:rPr>
-              <a:t>... Tail&gt;</a:t>
-            </a:r>
-          </a:p>
-          <a:p>
-            <a:r>
-              <a:rPr lang="en-US" sz="1600" dirty="0" smtClean="0">
-                <a:latin typeface="Courier New" pitchFamily="49" charset="0"/>
-                <a:cs typeface="Courier New" pitchFamily="49" charset="0"/>
-              </a:rPr>
-              <a:t>double sum(T head, Tail... tail) {</a:t>
-            </a:r>
-          </a:p>
-          <a:p>
-            <a:r>
-              <a:rPr lang="en-US" sz="1600" dirty="0">
-                <a:latin typeface="Courier New" pitchFamily="49" charset="0"/>
-                <a:cs typeface="Courier New" pitchFamily="49" charset="0"/>
-              </a:rPr>
-              <a:t> </a:t>
-            </a:r>
-            <a:r>
-              <a:rPr lang="en-US" sz="1600" dirty="0" smtClean="0">
-                <a:latin typeface="Courier New" pitchFamily="49" charset="0"/>
-                <a:cs typeface="Courier New" pitchFamily="49" charset="0"/>
-              </a:rPr>
-              <a:t>   return head + sum(tail...);</a:t>
-            </a:r>
-          </a:p>
-          <a:p>
-            <a:r>
-              <a:rPr lang="en-US" sz="1600" dirty="0" smtClean="0">
-                <a:latin typeface="Courier New" pitchFamily="49" charset="0"/>
-                <a:cs typeface="Courier New" pitchFamily="49" charset="0"/>
-              </a:rPr>
-              <a:t>}</a:t>
-            </a:r>
-          </a:p>
-          <a:p>
-            <a:r>
-              <a:rPr lang="en-US" sz="1600" dirty="0" smtClean="0">
-                <a:latin typeface="Courier New" pitchFamily="49" charset="0"/>
-                <a:cs typeface="Courier New" pitchFamily="49" charset="0"/>
-              </a:rPr>
-              <a:t>…</a:t>
-            </a:r>
-          </a:p>
-          <a:p>
-            <a:r>
-              <a:rPr lang="en-US" sz="1600" dirty="0" err="1" smtClean="0">
-                <a:latin typeface="Courier New" pitchFamily="49" charset="0"/>
-                <a:cs typeface="Courier New" pitchFamily="49" charset="0"/>
-              </a:rPr>
-              <a:t>std</a:t>
-            </a:r>
-            <a:r>
-              <a:rPr lang="en-US" sz="1600" dirty="0" smtClean="0">
-                <a:latin typeface="Courier New" pitchFamily="49" charset="0"/>
-                <a:cs typeface="Courier New" pitchFamily="49" charset="0"/>
-              </a:rPr>
-              <a:t>::</a:t>
-            </a:r>
-            <a:r>
-              <a:rPr lang="en-US" sz="1600" dirty="0" err="1" smtClean="0">
-                <a:latin typeface="Courier New" pitchFamily="49" charset="0"/>
-                <a:cs typeface="Courier New" pitchFamily="49" charset="0"/>
-              </a:rPr>
-              <a:t>cout</a:t>
-            </a:r>
-            <a:r>
-              <a:rPr lang="en-US" sz="1600" dirty="0" smtClean="0">
-                <a:latin typeface="Courier New" pitchFamily="49" charset="0"/>
-                <a:cs typeface="Courier New" pitchFamily="49" charset="0"/>
-              </a:rPr>
-              <a:t> &lt;&lt; sum(1.2, 2.3, 3.4) &lt;&lt; </a:t>
-            </a:r>
-            <a:r>
-              <a:rPr lang="en-US" sz="1600" dirty="0" err="1" smtClean="0">
-                <a:latin typeface="Courier New" pitchFamily="49" charset="0"/>
-                <a:cs typeface="Courier New" pitchFamily="49" charset="0"/>
-              </a:rPr>
-              <a:t>std</a:t>
-            </a:r>
-            <a:r>
-              <a:rPr lang="en-US" sz="1600" dirty="0" smtClean="0">
-                <a:latin typeface="Courier New" pitchFamily="49" charset="0"/>
-                <a:cs typeface="Courier New" pitchFamily="49" charset="0"/>
-              </a:rPr>
-              <a:t>::</a:t>
-            </a:r>
-            <a:r>
-              <a:rPr lang="en-US" sz="1600" dirty="0" err="1" smtClean="0">
-                <a:latin typeface="Courier New" pitchFamily="49" charset="0"/>
-                <a:cs typeface="Courier New" pitchFamily="49" charset="0"/>
-              </a:rPr>
-              <a:t>endl</a:t>
-            </a:r>
-            <a:r>
-              <a:rPr lang="en-US" sz="1600" dirty="0" smtClean="0">
-                <a:latin typeface="Courier New" pitchFamily="49" charset="0"/>
-                <a:cs typeface="Courier New" pitchFamily="49" charset="0"/>
-              </a:rPr>
-              <a:t>;</a:t>
-            </a:r>
-          </a:p>
-          <a:p>
-            <a:r>
-              <a:rPr lang="en-US" sz="1600" dirty="0" err="1" smtClean="0">
-                <a:latin typeface="Courier New" pitchFamily="49" charset="0"/>
-                <a:cs typeface="Courier New" pitchFamily="49" charset="0"/>
-              </a:rPr>
-              <a:t>std</a:t>
-            </a:r>
-            <a:r>
-              <a:rPr lang="en-US" sz="1600" dirty="0" smtClean="0">
-                <a:latin typeface="Courier New" pitchFamily="49" charset="0"/>
-                <a:cs typeface="Courier New" pitchFamily="49" charset="0"/>
-              </a:rPr>
-              <a:t>::</a:t>
-            </a:r>
-            <a:r>
-              <a:rPr lang="en-US" sz="1600" dirty="0" err="1" smtClean="0">
-                <a:latin typeface="Courier New" pitchFamily="49" charset="0"/>
-                <a:cs typeface="Courier New" pitchFamily="49" charset="0"/>
-              </a:rPr>
-              <a:t>cout</a:t>
-            </a:r>
-            <a:r>
-              <a:rPr lang="en-US" sz="1600" dirty="0" smtClean="0">
-                <a:latin typeface="Courier New" pitchFamily="49" charset="0"/>
-                <a:cs typeface="Courier New" pitchFamily="49" charset="0"/>
-              </a:rPr>
-              <a:t> &lt;&lt; sum(1.2, 2.3, 3.4, 4.5) &lt;&lt; </a:t>
-            </a:r>
-            <a:r>
-              <a:rPr lang="en-US" sz="1600" dirty="0" err="1" smtClean="0">
-                <a:latin typeface="Courier New" pitchFamily="49" charset="0"/>
-                <a:cs typeface="Courier New" pitchFamily="49" charset="0"/>
-              </a:rPr>
-              <a:t>std</a:t>
-            </a:r>
-            <a:r>
-              <a:rPr lang="en-US" sz="1600" dirty="0" smtClean="0">
-                <a:latin typeface="Courier New" pitchFamily="49" charset="0"/>
-                <a:cs typeface="Courier New" pitchFamily="49" charset="0"/>
-              </a:rPr>
-              <a:t>::</a:t>
-            </a:r>
-            <a:r>
-              <a:rPr lang="en-US" sz="1600" dirty="0" err="1" smtClean="0">
-                <a:latin typeface="Courier New" pitchFamily="49" charset="0"/>
-                <a:cs typeface="Courier New" pitchFamily="49" charset="0"/>
-              </a:rPr>
-              <a:t>endl</a:t>
-            </a:r>
-            <a:r>
-              <a:rPr lang="en-US" sz="1600" dirty="0" smtClean="0">
-                <a:latin typeface="Courier New" pitchFamily="49" charset="0"/>
-                <a:cs typeface="Courier New" pitchFamily="49" charset="0"/>
-              </a:rPr>
-              <a:t>;</a:t>
-            </a:r>
-          </a:p>
-        </p:txBody>
-      </p:sp>
-      <p:grpSp>
-        <p:nvGrpSpPr>
-          <p:cNvPr id="9" name="Group 8"/>
-          <p:cNvGrpSpPr/>
-          <p:nvPr/>
-        </p:nvGrpSpPr>
-        <p:grpSpPr>
-          <a:xfrm>
-            <a:off x="4837473" y="2375092"/>
-            <a:ext cx="3846365" cy="646331"/>
-            <a:chOff x="4837473" y="2375092"/>
-            <a:chExt cx="3846365" cy="646331"/>
-          </a:xfrm>
-        </p:grpSpPr>
-        <p:sp>
-          <p:nvSpPr>
-            <p:cNvPr id="6" name="TextBox 5"/>
-            <p:cNvSpPr txBox="1"/>
-            <p:nvPr/>
-          </p:nvSpPr>
-          <p:spPr>
-            <a:xfrm>
-              <a:off x="7073717" y="2375092"/>
-              <a:ext cx="1610121" cy="646331"/>
-            </a:xfrm>
-            <a:prstGeom prst="rect">
-              <a:avLst/>
-            </a:prstGeom>
-            <a:solidFill>
-              <a:schemeClr val="bg1"/>
-            </a:solidFill>
-            <a:ln>
-              <a:solidFill>
-                <a:schemeClr val="tx1"/>
-              </a:solidFill>
-            </a:ln>
-          </p:spPr>
-          <p:txBody>
-            <a:bodyPr wrap="square" rtlCol="0">
-              <a:spAutoFit/>
-            </a:bodyPr>
-            <a:lstStyle/>
-            <a:p>
-              <a:r>
-                <a:rPr lang="en-US" dirty="0" smtClean="0"/>
-                <a:t>base case:</a:t>
-              </a:r>
-              <a:br>
-                <a:rPr lang="en-US" dirty="0" smtClean="0"/>
-              </a:br>
-              <a:r>
-                <a:rPr lang="en-US" dirty="0" smtClean="0"/>
-                <a:t>no arguments</a:t>
-              </a:r>
-              <a:endParaRPr lang="en-US" dirty="0"/>
-            </a:p>
-          </p:txBody>
-        </p:sp>
-        <p:cxnSp>
-          <p:nvCxnSpPr>
-            <p:cNvPr id="8" name="Straight Arrow Connector 7"/>
-            <p:cNvCxnSpPr>
-              <a:stCxn id="6" idx="1"/>
-            </p:cNvCxnSpPr>
-            <p:nvPr/>
-          </p:nvCxnSpPr>
-          <p:spPr>
-            <a:xfrm flipH="1">
-              <a:off x="4837473" y="2698258"/>
-              <a:ext cx="2236244" cy="300581"/>
-            </a:xfrm>
-            <a:prstGeom prst="straightConnector1">
-              <a:avLst/>
-            </a:prstGeom>
-            <a:ln>
-              <a:solidFill>
-                <a:schemeClr val="tx1"/>
-              </a:solidFill>
-              <a:tailEnd type="stealth" w="lg" len="lg"/>
-            </a:ln>
-          </p:spPr>
-          <p:style>
-            <a:lnRef idx="1">
-              <a:schemeClr val="accent1"/>
-            </a:lnRef>
-            <a:fillRef idx="0">
-              <a:schemeClr val="accent1"/>
-            </a:fillRef>
-            <a:effectRef idx="0">
-              <a:schemeClr val="accent1"/>
-            </a:effectRef>
-            <a:fontRef idx="minor">
-              <a:schemeClr val="tx1"/>
-            </a:fontRef>
-          </p:style>
-        </p:cxnSp>
-      </p:grpSp>
-      <p:grpSp>
-        <p:nvGrpSpPr>
-          <p:cNvPr id="10" name="Group 9"/>
-          <p:cNvGrpSpPr/>
-          <p:nvPr/>
-        </p:nvGrpSpPr>
-        <p:grpSpPr>
-          <a:xfrm>
-            <a:off x="5083277" y="3243175"/>
-            <a:ext cx="3600562" cy="923330"/>
-            <a:chOff x="5083277" y="2375092"/>
-            <a:chExt cx="3600562" cy="923330"/>
-          </a:xfrm>
-        </p:grpSpPr>
-        <p:sp>
-          <p:nvSpPr>
-            <p:cNvPr id="11" name="TextBox 10"/>
-            <p:cNvSpPr txBox="1"/>
-            <p:nvPr/>
-          </p:nvSpPr>
-          <p:spPr>
-            <a:xfrm>
-              <a:off x="7073718" y="2375092"/>
-              <a:ext cx="1610121" cy="923330"/>
-            </a:xfrm>
-            <a:prstGeom prst="rect">
-              <a:avLst/>
-            </a:prstGeom>
-            <a:solidFill>
-              <a:schemeClr val="bg1"/>
-            </a:solidFill>
-            <a:ln>
-              <a:solidFill>
-                <a:schemeClr val="tx1"/>
-              </a:solidFill>
-            </a:ln>
-          </p:spPr>
-          <p:txBody>
-            <a:bodyPr wrap="none" rtlCol="0">
-              <a:spAutoFit/>
-            </a:bodyPr>
-            <a:lstStyle/>
-            <a:p>
-              <a:r>
-                <a:rPr lang="en-US" dirty="0" smtClean="0"/>
-                <a:t>tail recursion:</a:t>
-              </a:r>
-              <a:br>
-                <a:rPr lang="en-US" dirty="0" smtClean="0"/>
-              </a:br>
-              <a:r>
-                <a:rPr lang="en-US" dirty="0" smtClean="0"/>
-                <a:t>first element +</a:t>
-              </a:r>
-              <a:br>
-                <a:rPr lang="en-US" dirty="0" smtClean="0"/>
-              </a:br>
-              <a:r>
-                <a:rPr lang="en-US" dirty="0" smtClean="0"/>
-                <a:t>function on tail</a:t>
-              </a:r>
-              <a:endParaRPr lang="en-US" dirty="0"/>
-            </a:p>
-          </p:txBody>
-        </p:sp>
-        <p:cxnSp>
-          <p:nvCxnSpPr>
-            <p:cNvPr id="12" name="Straight Arrow Connector 11"/>
-            <p:cNvCxnSpPr>
-              <a:stCxn id="11" idx="1"/>
-            </p:cNvCxnSpPr>
-            <p:nvPr/>
-          </p:nvCxnSpPr>
-          <p:spPr>
-            <a:xfrm flipH="1">
-              <a:off x="5083277" y="2836757"/>
-              <a:ext cx="1990441" cy="70747"/>
-            </a:xfrm>
-            <a:prstGeom prst="straightConnector1">
-              <a:avLst/>
-            </a:prstGeom>
-            <a:ln>
-              <a:solidFill>
-                <a:schemeClr val="tx1"/>
-              </a:solidFill>
-              <a:tailEnd type="stealth" w="lg" len="lg"/>
-            </a:ln>
-          </p:spPr>
-          <p:style>
-            <a:lnRef idx="1">
-              <a:schemeClr val="accent1"/>
-            </a:lnRef>
-            <a:fillRef idx="0">
-              <a:schemeClr val="accent1"/>
-            </a:fillRef>
-            <a:effectRef idx="0">
-              <a:schemeClr val="accent1"/>
-            </a:effectRef>
-            <a:fontRef idx="minor">
-              <a:schemeClr val="tx1"/>
-            </a:fontRef>
-          </p:style>
-        </p:cxnSp>
-      </p:grpSp>
-      <p:sp>
-        <p:nvSpPr>
-          <p:cNvPr id="15" name="TextBox 14"/>
-          <p:cNvSpPr txBox="1"/>
-          <p:nvPr/>
-        </p:nvSpPr>
-        <p:spPr>
-          <a:xfrm>
-            <a:off x="3155811" y="5353399"/>
-            <a:ext cx="2832378" cy="400110"/>
-          </a:xfrm>
-          <a:prstGeom prst="rect">
-            <a:avLst/>
-          </a:prstGeom>
-          <a:solidFill>
-            <a:schemeClr val="bg1"/>
-          </a:solidFill>
-          <a:ln>
-            <a:solidFill>
-              <a:schemeClr val="tx1"/>
-            </a:solidFill>
-          </a:ln>
-        </p:spPr>
-        <p:txBody>
-          <a:bodyPr wrap="none" rtlCol="0">
-            <a:spAutoFit/>
-          </a:bodyPr>
-          <a:lstStyle/>
-          <a:p>
-            <a:r>
-              <a:rPr lang="en-US" sz="2000" dirty="0" smtClean="0"/>
-              <a:t>Function </a:t>
-            </a:r>
-            <a:r>
-              <a:rPr lang="en-US" sz="2000" dirty="0" smtClean="0">
-                <a:latin typeface="Courier New" panose="02070309020205020404" pitchFamily="49" charset="0"/>
-                <a:cs typeface="Courier New" panose="02070309020205020404" pitchFamily="49" charset="0"/>
-              </a:rPr>
-              <a:t>sum</a:t>
-            </a:r>
-            <a:r>
-              <a:rPr lang="en-US" sz="2000" dirty="0" smtClean="0"/>
-              <a:t> overloaded</a:t>
-            </a:r>
-            <a:endParaRPr lang="en-US" sz="2000" dirty="0"/>
-          </a:p>
-        </p:txBody>
-      </p:sp>
-    </p:spTree>
-    <p:extLst>
-      <p:ext uri="{BB962C8B-B14F-4D97-AF65-F5344CB8AC3E}">
-        <p14:creationId xmlns:p14="http://schemas.microsoft.com/office/powerpoint/2010/main" val="2544394708"/>
-      </p:ext>
-    </p:extLst>
-  </p:cSld>
-  <p:clrMapOvr>
-    <a:masterClrMapping/>
-  </p:clrMapOvr>
-  <p:timing>
-    <p:tnLst>
-      <p:par>
-        <p:cTn id="1" dur="indefinite" restart="never" nodeType="tmRoot">
-          <p:childTnLst>
-            <p:seq concurrent="1" nextAc="seek">
-              <p:cTn id="2" dur="indefinite" nodeType="mainSeq">
-                <p:childTnLst>
-                  <p:par>
-                    <p:cTn id="3" fill="hold">
-                      <p:stCondLst>
-                        <p:cond delay="indefinite"/>
-                      </p:stCondLst>
-                      <p:childTnLst>
-                        <p:par>
-                          <p:cTn id="4" fill="hold">
-                            <p:stCondLst>
-                              <p:cond delay="0"/>
-                            </p:stCondLst>
-                            <p:childTnLst>
-                              <p:par>
-                                <p:cTn id="5" presetID="1" presetClass="entr" presetSubtype="0" fill="hold" nodeType="clickEffect">
-                                  <p:stCondLst>
-                                    <p:cond delay="0"/>
-                                  </p:stCondLst>
-                                  <p:childTnLst>
-                                    <p:set>
-                                      <p:cBhvr>
-                                        <p:cTn id="6" dur="1" fill="hold">
-                                          <p:stCondLst>
-                                            <p:cond delay="0"/>
-                                          </p:stCondLst>
-                                        </p:cTn>
-                                        <p:tgtEl>
-                                          <p:spTgt spid="9"/>
-                                        </p:tgtEl>
-                                        <p:attrNameLst>
-                                          <p:attrName>style.visibility</p:attrName>
-                                        </p:attrNameLst>
-                                      </p:cBhvr>
-                                      <p:to>
-                                        <p:strVal val="visible"/>
-                                      </p:to>
-                                    </p:set>
-                                  </p:childTnLst>
-                                </p:cTn>
-                              </p:par>
-                            </p:childTnLst>
-                          </p:cTn>
-                        </p:par>
-                      </p:childTnLst>
-                    </p:cTn>
-                  </p:par>
-                  <p:par>
-                    <p:cTn id="7" fill="hold">
-                      <p:stCondLst>
-                        <p:cond delay="indefinite"/>
-                      </p:stCondLst>
-                      <p:childTnLst>
-                        <p:par>
-                          <p:cTn id="8" fill="hold">
-                            <p:stCondLst>
-                              <p:cond delay="0"/>
-                            </p:stCondLst>
-                            <p:childTnLst>
-                              <p:par>
-                                <p:cTn id="9" presetID="1" presetClass="entr" presetSubtype="0" fill="hold" nodeType="clickEffect">
-                                  <p:stCondLst>
-                                    <p:cond delay="0"/>
-                                  </p:stCondLst>
-                                  <p:childTnLst>
-                                    <p:set>
-                                      <p:cBhvr>
-                                        <p:cTn id="10" dur="1" fill="hold">
-                                          <p:stCondLst>
-                                            <p:cond delay="0"/>
-                                          </p:stCondLst>
-                                        </p:cTn>
-                                        <p:tgtEl>
-                                          <p:spTgt spid="10"/>
-                                        </p:tgtEl>
-                                        <p:attrNameLst>
-                                          <p:attrName>style.visibility</p:attrName>
-                                        </p:attrNameLst>
-                                      </p:cBhvr>
-                                      <p:to>
-                                        <p:strVal val="visible"/>
-                                      </p:to>
-                                    </p:set>
-                                  </p:childTnLst>
-                                </p:cTn>
-                              </p:par>
-                            </p:childTnLst>
-                          </p:cTn>
-                        </p:par>
-                      </p:childTnLst>
-                    </p:cTn>
-                  </p:par>
-                  <p:par>
-                    <p:cTn id="11" fill="hold">
-                      <p:stCondLst>
-                        <p:cond delay="indefinite"/>
-                      </p:stCondLst>
-                      <p:childTnLst>
-                        <p:par>
-                          <p:cTn id="12" fill="hold">
-                            <p:stCondLst>
-                              <p:cond delay="0"/>
-                            </p:stCondLst>
-                            <p:childTnLst>
-                              <p:par>
-                                <p:cTn id="13" presetID="1" presetClass="entr" presetSubtype="0" fill="hold" grpId="0" nodeType="clickEffect">
-                                  <p:stCondLst>
-                                    <p:cond delay="0"/>
-                                  </p:stCondLst>
-                                  <p:childTnLst>
-                                    <p:set>
-                                      <p:cBhvr>
-                                        <p:cTn id="14" dur="1" fill="hold">
-                                          <p:stCondLst>
-                                            <p:cond delay="0"/>
-                                          </p:stCondLst>
-                                        </p:cTn>
-                                        <p:tgtEl>
-                                          <p:spTgt spid="15"/>
-                                        </p:tgtEl>
-                                        <p:attrNameLst>
-                                          <p:attrName>style.visibility</p:attrName>
-                                        </p:attrNameLst>
-                                      </p:cBhvr>
-                                      <p:to>
-                                        <p:strVal val="visible"/>
-                                      </p:to>
-                                    </p:set>
-                                  </p:childTnLst>
-                                </p:cTn>
-                              </p:par>
-                            </p:childTnLst>
-                          </p:cTn>
-                        </p:par>
-                      </p:childTnLst>
-                    </p:cTn>
-                  </p:par>
-                </p:childTnLst>
-              </p:cTn>
-              <p:prevCondLst>
-                <p:cond evt="onPrev" delay="0">
-                  <p:tgtEl>
-                    <p:sldTgt/>
-                  </p:tgtEl>
-                </p:cond>
-              </p:prevCondLst>
-              <p:nextCondLst>
-                <p:cond evt="onNext" delay="0">
-                  <p:tgtEl>
-                    <p:sldTgt/>
-                  </p:tgtEl>
-                </p:cond>
-              </p:nextCondLst>
-            </p:seq>
-          </p:childTnLst>
-        </p:cTn>
-      </p:par>
-    </p:tnLst>
-    <p:bldLst>
-      <p:bldP spid="15" grpId="0" animBg="1"/>
-    </p:bldLst>
-  </p:timing>
-</p:sld>
-</file>
-
-<file path=ppt/slides/slide5.xml><?xml version="1.0" encoding="utf-8"?>
-<p:sld xmlns:a="http://schemas.openxmlformats.org/drawingml/2006/main" xmlns:r="http://schemas.openxmlformats.org/officeDocument/2006/relationships" xmlns:p="http://schemas.openxmlformats.org/presentationml/2006/main">
-  <p:cSld>
-    <p:spTree>
-      <p:nvGrpSpPr>
-        <p:cNvPr id="1" name=""/>
-        <p:cNvGrpSpPr/>
-        <p:nvPr/>
-      </p:nvGrpSpPr>
-      <p:grpSpPr>
-        <a:xfrm>
-          <a:off x="0" y="0"/>
-          <a:ext cx="0" cy="0"/>
-          <a:chOff x="0" y="0"/>
-          <a:chExt cx="0" cy="0"/>
-        </a:xfrm>
-      </p:grpSpPr>
-      <p:sp>
-        <p:nvSpPr>
-          <p:cNvPr id="2" name="Title 1"/>
-          <p:cNvSpPr>
-            <a:spLocks noGrp="1"/>
-          </p:cNvSpPr>
-          <p:nvPr>
-            <p:ph type="title"/>
-          </p:nvPr>
-        </p:nvSpPr>
-        <p:spPr/>
-        <p:txBody>
-          <a:bodyPr/>
-          <a:lstStyle/>
-          <a:p>
-            <a:r>
               <a:rPr lang="en-US" dirty="0" smtClean="0"/>
               <a:t>What was left out/added?</a:t>
             </a:r>
@@ -5384,7 +5024,7 @@
           <a:p>
             <a:fld id="{9CEF4966-5219-4577-B301-14467D565841}" type="slidenum">
               <a:rPr lang="en-US" smtClean="0"/>
-              <a:t>5</a:t>
+              <a:t>4</a:t>
             </a:fld>
             <a:endParaRPr lang="en-US"/>
           </a:p>

</xml_diff>

<commit_message>
Added capturing, replacing regex slides
</commit_message>
<xml_diff>
--- a/CPlusPlus/06_essential_cpp_regex.pptx
+++ b/CPlusPlus/06_essential_cpp_regex.pptx
@@ -5,7 +5,7 @@
     <p:sldMasterId id="2147483660" r:id="rId1"/>
   </p:sldMasterIdLst>
   <p:notesMasterIdLst>
-    <p:notesMasterId r:id="rId16"/>
+    <p:notesMasterId r:id="rId19"/>
   </p:notesMasterIdLst>
   <p:sldIdLst>
     <p:sldId id="257" r:id="rId2"/>
@@ -21,7 +21,10 @@
     <p:sldId id="269" r:id="rId12"/>
     <p:sldId id="270" r:id="rId13"/>
     <p:sldId id="261" r:id="rId14"/>
-    <p:sldId id="260" r:id="rId15"/>
+    <p:sldId id="271" r:id="rId15"/>
+    <p:sldId id="272" r:id="rId16"/>
+    <p:sldId id="273" r:id="rId17"/>
+    <p:sldId id="260" r:id="rId18"/>
   </p:sldIdLst>
   <p:sldSz cx="9144000" cy="6858000" type="screen4x3"/>
   <p:notesSz cx="6858000" cy="9144000"/>
@@ -210,7 +213,7 @@
           <a:p>
             <a:fld id="{79B8B1BA-E8A9-48CD-886E-2AED8C4BE354}" type="datetimeFigureOut">
               <a:rPr lang="en-US" smtClean="0"/>
-              <a:t>2017-04-04</a:t>
+              <a:t>2017-04-05</a:t>
             </a:fld>
             <a:endParaRPr lang="en-US"/>
           </a:p>
@@ -609,7 +612,7 @@
           <a:p>
             <a:fld id="{ABE0EDF4-4C0E-4772-84AE-1357C6001391}" type="datetime1">
               <a:rPr lang="en-US" smtClean="0"/>
-              <a:t>2017-04-04</a:t>
+              <a:t>2017-04-05</a:t>
             </a:fld>
             <a:endParaRPr lang="en-US"/>
           </a:p>
@@ -779,7 +782,7 @@
           <a:p>
             <a:fld id="{88C05809-344B-440B-9F88-C5B18C79382B}" type="datetime1">
               <a:rPr lang="en-US" smtClean="0"/>
-              <a:t>2017-04-04</a:t>
+              <a:t>2017-04-05</a:t>
             </a:fld>
             <a:endParaRPr lang="en-US"/>
           </a:p>
@@ -959,7 +962,7 @@
           <a:p>
             <a:fld id="{90F74260-95EE-4CD2-908E-53F4ED138E6A}" type="datetime1">
               <a:rPr lang="en-US" smtClean="0"/>
-              <a:t>2017-04-04</a:t>
+              <a:t>2017-04-05</a:t>
             </a:fld>
             <a:endParaRPr lang="en-US"/>
           </a:p>
@@ -1129,7 +1132,7 @@
           <a:p>
             <a:fld id="{1E3FA7D4-BD38-43A8-9130-CCA4F61A0EF1}" type="datetime1">
               <a:rPr lang="en-US" smtClean="0"/>
-              <a:t>2017-04-04</a:t>
+              <a:t>2017-04-05</a:t>
             </a:fld>
             <a:endParaRPr lang="en-US"/>
           </a:p>
@@ -1373,7 +1376,7 @@
           <a:p>
             <a:fld id="{096F3732-D81D-4EEE-A6C0-1A86B50EC6E7}" type="datetime1">
               <a:rPr lang="en-US" smtClean="0"/>
-              <a:t>2017-04-04</a:t>
+              <a:t>2017-04-05</a:t>
             </a:fld>
             <a:endParaRPr lang="en-US"/>
           </a:p>
@@ -1605,7 +1608,7 @@
           <a:p>
             <a:fld id="{08790459-F51D-4E85-A354-E358228D776E}" type="datetime1">
               <a:rPr lang="en-US" smtClean="0"/>
-              <a:t>2017-04-04</a:t>
+              <a:t>2017-04-05</a:t>
             </a:fld>
             <a:endParaRPr lang="en-US"/>
           </a:p>
@@ -1972,7 +1975,7 @@
           <a:p>
             <a:fld id="{B95FD88B-5497-4442-BF08-DF52AECDDAFE}" type="datetime1">
               <a:rPr lang="en-US" smtClean="0"/>
-              <a:t>2017-04-04</a:t>
+              <a:t>2017-04-05</a:t>
             </a:fld>
             <a:endParaRPr lang="en-US"/>
           </a:p>
@@ -2090,7 +2093,7 @@
           <a:p>
             <a:fld id="{CF2C86E3-CF93-475C-AE85-C652B2D2F9B5}" type="datetime1">
               <a:rPr lang="en-US" smtClean="0"/>
-              <a:t>2017-04-04</a:t>
+              <a:t>2017-04-05</a:t>
             </a:fld>
             <a:endParaRPr lang="en-US"/>
           </a:p>
@@ -2185,7 +2188,7 @@
           <a:p>
             <a:fld id="{F7F6E503-4705-4A51-BD29-968EA406E3C8}" type="datetime1">
               <a:rPr lang="en-US" smtClean="0"/>
-              <a:t>2017-04-04</a:t>
+              <a:t>2017-04-05</a:t>
             </a:fld>
             <a:endParaRPr lang="en-US"/>
           </a:p>
@@ -2462,7 +2465,7 @@
           <a:p>
             <a:fld id="{AF0FBBBB-E740-40DF-A365-D9B13EA44EB5}" type="datetime1">
               <a:rPr lang="en-US" smtClean="0"/>
-              <a:t>2017-04-04</a:t>
+              <a:t>2017-04-05</a:t>
             </a:fld>
             <a:endParaRPr lang="en-US"/>
           </a:p>
@@ -2719,7 +2722,7 @@
           <a:p>
             <a:fld id="{72BE145B-3D39-424D-9562-97A98B9610A2}" type="datetime1">
               <a:rPr lang="en-US" smtClean="0"/>
-              <a:t>2017-04-04</a:t>
+              <a:t>2017-04-05</a:t>
             </a:fld>
             <a:endParaRPr lang="en-US"/>
           </a:p>
@@ -2932,7 +2935,7 @@
           <a:p>
             <a:fld id="{623F5BA7-E58A-4B83-91F8-3B23CADD8CED}" type="datetime1">
               <a:rPr lang="en-US" smtClean="0"/>
-              <a:t>2017-04-04</a:t>
+              <a:t>2017-04-05</a:t>
             </a:fld>
             <a:endParaRPr lang="en-US"/>
           </a:p>
@@ -6378,6 +6381,1843 @@
           <a:p>
             <a:r>
               <a:rPr lang="en-US" dirty="0" smtClean="0"/>
+              <a:t>Searching matches</a:t>
+            </a:r>
+            <a:endParaRPr lang="en-US" dirty="0"/>
+          </a:p>
+        </p:txBody>
+      </p:sp>
+      <p:sp>
+        <p:nvSpPr>
+          <p:cNvPr id="3" name="Content Placeholder 2"/>
+          <p:cNvSpPr>
+            <a:spLocks noGrp="1"/>
+          </p:cNvSpPr>
+          <p:nvPr>
+            <p:ph idx="1"/>
+          </p:nvPr>
+        </p:nvSpPr>
+        <p:spPr/>
+        <p:txBody>
+          <a:bodyPr/>
+          <a:lstStyle/>
+          <a:p>
+            <a:r>
+              <a:rPr lang="en-US" dirty="0" smtClean="0"/>
+              <a:t>Checking occurrence</a:t>
+            </a:r>
+          </a:p>
+          <a:p>
+            <a:endParaRPr lang="en-US" dirty="0"/>
+          </a:p>
+          <a:p>
+            <a:endParaRPr lang="en-US" dirty="0" smtClean="0"/>
+          </a:p>
+          <a:p>
+            <a:endParaRPr lang="en-US" dirty="0"/>
+          </a:p>
+          <a:p>
+            <a:endParaRPr lang="en-US" dirty="0" smtClean="0"/>
+          </a:p>
+          <a:p>
+            <a:r>
+              <a:rPr lang="en-US" dirty="0" smtClean="0"/>
+              <a:t>Getting matched string</a:t>
+            </a:r>
+            <a:endParaRPr lang="en-US" dirty="0"/>
+          </a:p>
+        </p:txBody>
+      </p:sp>
+      <p:sp>
+        <p:nvSpPr>
+          <p:cNvPr id="4" name="Slide Number Placeholder 3"/>
+          <p:cNvSpPr>
+            <a:spLocks noGrp="1"/>
+          </p:cNvSpPr>
+          <p:nvPr>
+            <p:ph type="sldNum" sz="quarter" idx="12"/>
+          </p:nvPr>
+        </p:nvSpPr>
+        <p:spPr/>
+        <p:txBody>
+          <a:bodyPr/>
+          <a:lstStyle/>
+          <a:p>
+            <a:fld id="{9CEF4966-5219-4577-B301-14467D565841}" type="slidenum">
+              <a:rPr lang="en-US" smtClean="0"/>
+              <a:t>14</a:t>
+            </a:fld>
+            <a:endParaRPr lang="en-US"/>
+          </a:p>
+        </p:txBody>
+      </p:sp>
+      <p:sp>
+        <p:nvSpPr>
+          <p:cNvPr id="5" name="TextBox 4"/>
+          <p:cNvSpPr txBox="1"/>
+          <p:nvPr/>
+        </p:nvSpPr>
+        <p:spPr>
+          <a:xfrm>
+            <a:off x="628650" y="2410408"/>
+            <a:ext cx="6617724" cy="1569660"/>
+          </a:xfrm>
+          <a:prstGeom prst="rect">
+            <a:avLst/>
+          </a:prstGeom>
+          <a:solidFill>
+            <a:schemeClr val="bg1">
+              <a:lumMod val="75000"/>
+            </a:schemeClr>
+          </a:solidFill>
+          <a:ln>
+            <a:solidFill>
+              <a:schemeClr val="tx1"/>
+            </a:solidFill>
+          </a:ln>
+        </p:spPr>
+        <p:txBody>
+          <a:bodyPr wrap="square" rtlCol="0">
+            <a:spAutoFit/>
+          </a:bodyPr>
+          <a:lstStyle/>
+          <a:p>
+            <a:r>
+              <a:rPr lang="en-US" sz="1600" dirty="0" smtClean="0">
+                <a:latin typeface="Courier New" pitchFamily="49" charset="0"/>
+                <a:cs typeface="Courier New" pitchFamily="49" charset="0"/>
+              </a:rPr>
+              <a:t>#include &lt;regex&gt;</a:t>
+            </a:r>
+          </a:p>
+          <a:p>
+            <a:r>
+              <a:rPr lang="en-US" sz="1600" dirty="0" smtClean="0">
+                <a:latin typeface="Courier New" pitchFamily="49" charset="0"/>
+                <a:cs typeface="Courier New" pitchFamily="49" charset="0"/>
+              </a:rPr>
+              <a:t>using </a:t>
+            </a:r>
+            <a:r>
+              <a:rPr lang="en-US" sz="1600" dirty="0" smtClean="0">
+                <a:latin typeface="Courier New" pitchFamily="49" charset="0"/>
+                <a:cs typeface="Courier New" pitchFamily="49" charset="0"/>
+              </a:rPr>
+              <a:t>namespace </a:t>
+            </a:r>
+            <a:r>
+              <a:rPr lang="en-US" sz="1600" dirty="0" err="1" smtClean="0">
+                <a:latin typeface="Courier New" pitchFamily="49" charset="0"/>
+                <a:cs typeface="Courier New" pitchFamily="49" charset="0"/>
+              </a:rPr>
+              <a:t>std</a:t>
+            </a:r>
+            <a:r>
+              <a:rPr lang="en-US" sz="1600" dirty="0" smtClean="0">
+                <a:latin typeface="Courier New" pitchFamily="49" charset="0"/>
+                <a:cs typeface="Courier New" pitchFamily="49" charset="0"/>
+              </a:rPr>
+              <a:t>;</a:t>
+            </a:r>
+          </a:p>
+          <a:p>
+            <a:r>
+              <a:rPr lang="en-US" sz="1600" dirty="0" smtClean="0">
+                <a:latin typeface="Courier New" pitchFamily="49" charset="0"/>
+                <a:cs typeface="Courier New" pitchFamily="49" charset="0"/>
+              </a:rPr>
+              <a:t>…</a:t>
+            </a:r>
+          </a:p>
+          <a:p>
+            <a:r>
+              <a:rPr lang="en-US" sz="1600" dirty="0" smtClean="0">
+                <a:latin typeface="Courier New" pitchFamily="49" charset="0"/>
+                <a:cs typeface="Courier New" pitchFamily="49" charset="0"/>
+              </a:rPr>
+              <a:t>regex expr {</a:t>
+            </a:r>
+            <a:r>
+              <a:rPr lang="en-US" sz="1600" dirty="0">
+                <a:latin typeface="Courier New" pitchFamily="49" charset="0"/>
+                <a:cs typeface="Courier New" pitchFamily="49" charset="0"/>
+              </a:rPr>
+              <a:t>R"(\w+(?:\.\w+)?@\w+(?:\.\w</a:t>
+            </a:r>
+            <a:r>
+              <a:rPr lang="en-US" sz="1600" dirty="0" smtClean="0">
+                <a:latin typeface="Courier New" pitchFamily="49" charset="0"/>
+                <a:cs typeface="Courier New" pitchFamily="49" charset="0"/>
+              </a:rPr>
+              <a:t>+)+)"};</a:t>
+            </a:r>
+          </a:p>
+          <a:p>
+            <a:r>
+              <a:rPr lang="en-US" sz="1600" dirty="0" smtClean="0">
+                <a:latin typeface="Courier New" pitchFamily="49" charset="0"/>
+                <a:cs typeface="Courier New" pitchFamily="49" charset="0"/>
+              </a:rPr>
+              <a:t>if (</a:t>
+            </a:r>
+            <a:r>
+              <a:rPr lang="en-US" sz="1600" dirty="0" err="1" smtClean="0">
+                <a:latin typeface="Courier New" pitchFamily="49" charset="0"/>
+                <a:cs typeface="Courier New" pitchFamily="49" charset="0"/>
+              </a:rPr>
+              <a:t>regex_search</a:t>
+            </a:r>
+            <a:r>
+              <a:rPr lang="en-US" sz="1600" dirty="0" smtClean="0">
+                <a:latin typeface="Courier New" pitchFamily="49" charset="0"/>
+                <a:cs typeface="Courier New" pitchFamily="49" charset="0"/>
+              </a:rPr>
+              <a:t>(</a:t>
+            </a:r>
+            <a:r>
+              <a:rPr lang="en-US" sz="1600" dirty="0" err="1" smtClean="0">
+                <a:latin typeface="Courier New" pitchFamily="49" charset="0"/>
+                <a:cs typeface="Courier New" pitchFamily="49" charset="0"/>
+              </a:rPr>
+              <a:t>str</a:t>
+            </a:r>
+            <a:r>
+              <a:rPr lang="en-US" sz="1600" dirty="0" smtClean="0">
+                <a:latin typeface="Courier New" pitchFamily="49" charset="0"/>
+                <a:cs typeface="Courier New" pitchFamily="49" charset="0"/>
+              </a:rPr>
+              <a:t>, expr))</a:t>
+            </a:r>
+          </a:p>
+          <a:p>
+            <a:r>
+              <a:rPr lang="en-US" sz="1600" dirty="0">
+                <a:latin typeface="Courier New" pitchFamily="49" charset="0"/>
+                <a:cs typeface="Courier New" pitchFamily="49" charset="0"/>
+              </a:rPr>
+              <a:t> </a:t>
+            </a:r>
+            <a:r>
+              <a:rPr lang="en-US" sz="1600" dirty="0" smtClean="0">
+                <a:latin typeface="Courier New" pitchFamily="49" charset="0"/>
+                <a:cs typeface="Courier New" pitchFamily="49" charset="0"/>
+              </a:rPr>
+              <a:t>   …</a:t>
+            </a:r>
+            <a:endParaRPr lang="en-US" sz="1600" dirty="0" smtClean="0">
+              <a:latin typeface="Courier New" pitchFamily="49" charset="0"/>
+              <a:cs typeface="Courier New" pitchFamily="49" charset="0"/>
+            </a:endParaRPr>
+          </a:p>
+        </p:txBody>
+      </p:sp>
+      <p:sp>
+        <p:nvSpPr>
+          <p:cNvPr id="6" name="TextBox 5"/>
+          <p:cNvSpPr txBox="1"/>
+          <p:nvPr/>
+        </p:nvSpPr>
+        <p:spPr>
+          <a:xfrm>
+            <a:off x="628650" y="4989744"/>
+            <a:ext cx="6617724" cy="1077218"/>
+          </a:xfrm>
+          <a:prstGeom prst="rect">
+            <a:avLst/>
+          </a:prstGeom>
+          <a:solidFill>
+            <a:schemeClr val="bg1">
+              <a:lumMod val="75000"/>
+            </a:schemeClr>
+          </a:solidFill>
+          <a:ln>
+            <a:solidFill>
+              <a:schemeClr val="tx1"/>
+            </a:solidFill>
+          </a:ln>
+        </p:spPr>
+        <p:txBody>
+          <a:bodyPr wrap="square" rtlCol="0">
+            <a:spAutoFit/>
+          </a:bodyPr>
+          <a:lstStyle/>
+          <a:p>
+            <a:r>
+              <a:rPr lang="en-US" sz="1600" dirty="0" smtClean="0">
+                <a:latin typeface="Courier New" pitchFamily="49" charset="0"/>
+                <a:cs typeface="Courier New" pitchFamily="49" charset="0"/>
+              </a:rPr>
+              <a:t>regex expr {</a:t>
+            </a:r>
+            <a:r>
+              <a:rPr lang="en-US" sz="1600" dirty="0">
+                <a:latin typeface="Courier New" pitchFamily="49" charset="0"/>
+                <a:cs typeface="Courier New" pitchFamily="49" charset="0"/>
+              </a:rPr>
+              <a:t>R"(\w+(?:\.\w+)?@\w+(?:\.\w</a:t>
+            </a:r>
+            <a:r>
+              <a:rPr lang="en-US" sz="1600" dirty="0" smtClean="0">
+                <a:latin typeface="Courier New" pitchFamily="49" charset="0"/>
+                <a:cs typeface="Courier New" pitchFamily="49" charset="0"/>
+              </a:rPr>
+              <a:t>+)+)"};</a:t>
+            </a:r>
+          </a:p>
+          <a:p>
+            <a:r>
+              <a:rPr lang="en-US" sz="1600" dirty="0" err="1" smtClean="0">
+                <a:latin typeface="Courier New" pitchFamily="49" charset="0"/>
+                <a:cs typeface="Courier New" pitchFamily="49" charset="0"/>
+              </a:rPr>
+              <a:t>smatch</a:t>
+            </a:r>
+            <a:r>
+              <a:rPr lang="en-US" sz="1600" dirty="0" smtClean="0">
+                <a:latin typeface="Courier New" pitchFamily="49" charset="0"/>
+                <a:cs typeface="Courier New" pitchFamily="49" charset="0"/>
+              </a:rPr>
+              <a:t> matchers;</a:t>
+            </a:r>
+          </a:p>
+          <a:p>
+            <a:r>
+              <a:rPr lang="en-US" sz="1600" dirty="0" smtClean="0">
+                <a:latin typeface="Courier New" pitchFamily="49" charset="0"/>
+                <a:cs typeface="Courier New" pitchFamily="49" charset="0"/>
+              </a:rPr>
+              <a:t>if (</a:t>
+            </a:r>
+            <a:r>
+              <a:rPr lang="en-US" sz="1600" dirty="0" err="1" smtClean="0">
+                <a:latin typeface="Courier New" pitchFamily="49" charset="0"/>
+                <a:cs typeface="Courier New" pitchFamily="49" charset="0"/>
+              </a:rPr>
+              <a:t>regex_search</a:t>
+            </a:r>
+            <a:r>
+              <a:rPr lang="en-US" sz="1600" dirty="0" smtClean="0">
+                <a:latin typeface="Courier New" pitchFamily="49" charset="0"/>
+                <a:cs typeface="Courier New" pitchFamily="49" charset="0"/>
+              </a:rPr>
+              <a:t>(</a:t>
+            </a:r>
+            <a:r>
+              <a:rPr lang="en-US" sz="1600" dirty="0" err="1" smtClean="0">
+                <a:latin typeface="Courier New" pitchFamily="49" charset="0"/>
+                <a:cs typeface="Courier New" pitchFamily="49" charset="0"/>
+              </a:rPr>
+              <a:t>str</a:t>
+            </a:r>
+            <a:r>
+              <a:rPr lang="en-US" sz="1600" dirty="0" smtClean="0">
+                <a:latin typeface="Courier New" pitchFamily="49" charset="0"/>
+                <a:cs typeface="Courier New" pitchFamily="49" charset="0"/>
+              </a:rPr>
+              <a:t>, matches, expr))</a:t>
+            </a:r>
+          </a:p>
+          <a:p>
+            <a:r>
+              <a:rPr lang="en-US" sz="1600" dirty="0">
+                <a:latin typeface="Courier New" pitchFamily="49" charset="0"/>
+                <a:cs typeface="Courier New" pitchFamily="49" charset="0"/>
+              </a:rPr>
+              <a:t> </a:t>
+            </a:r>
+            <a:r>
+              <a:rPr lang="en-US" sz="1600" dirty="0" smtClean="0">
+                <a:latin typeface="Courier New" pitchFamily="49" charset="0"/>
+                <a:cs typeface="Courier New" pitchFamily="49" charset="0"/>
+              </a:rPr>
+              <a:t>   </a:t>
+            </a:r>
+            <a:r>
+              <a:rPr lang="en-US" sz="1600" dirty="0" err="1" smtClean="0">
+                <a:latin typeface="Courier New" pitchFamily="49" charset="0"/>
+                <a:cs typeface="Courier New" pitchFamily="49" charset="0"/>
+              </a:rPr>
+              <a:t>cout</a:t>
+            </a:r>
+            <a:r>
+              <a:rPr lang="en-US" sz="1600" dirty="0" smtClean="0">
+                <a:latin typeface="Courier New" pitchFamily="49" charset="0"/>
+                <a:cs typeface="Courier New" pitchFamily="49" charset="0"/>
+              </a:rPr>
+              <a:t> &lt;&lt; "found: " &lt;&lt; matches[0] &lt;&lt; </a:t>
+            </a:r>
+            <a:r>
+              <a:rPr lang="en-US" sz="1600" dirty="0" err="1" smtClean="0">
+                <a:latin typeface="Courier New" pitchFamily="49" charset="0"/>
+                <a:cs typeface="Courier New" pitchFamily="49" charset="0"/>
+              </a:rPr>
+              <a:t>endl</a:t>
+            </a:r>
+            <a:r>
+              <a:rPr lang="en-US" sz="1600" dirty="0" smtClean="0">
+                <a:latin typeface="Courier New" pitchFamily="49" charset="0"/>
+                <a:cs typeface="Courier New" pitchFamily="49" charset="0"/>
+              </a:rPr>
+              <a:t>;</a:t>
+            </a:r>
+            <a:endParaRPr lang="en-US" sz="1600" dirty="0" smtClean="0">
+              <a:latin typeface="Courier New" pitchFamily="49" charset="0"/>
+              <a:cs typeface="Courier New" pitchFamily="49" charset="0"/>
+            </a:endParaRPr>
+          </a:p>
+        </p:txBody>
+      </p:sp>
+    </p:spTree>
+    <p:extLst>
+      <p:ext uri="{BB962C8B-B14F-4D97-AF65-F5344CB8AC3E}">
+        <p14:creationId xmlns:p14="http://schemas.microsoft.com/office/powerpoint/2010/main" val="929895900"/>
+      </p:ext>
+    </p:extLst>
+  </p:cSld>
+  <p:clrMapOvr>
+    <a:masterClrMapping/>
+  </p:clrMapOvr>
+  <p:timing>
+    <p:tnLst>
+      <p:par>
+        <p:cTn id="1" dur="indefinite" restart="never" nodeType="tmRoot">
+          <p:childTnLst>
+            <p:seq concurrent="1" nextAc="seek">
+              <p:cTn id="2" dur="indefinite" nodeType="mainSeq">
+                <p:childTnLst>
+                  <p:par>
+                    <p:cTn id="3" fill="hold">
+                      <p:stCondLst>
+                        <p:cond delay="indefinite"/>
+                        <p:cond evt="onBegin" delay="0">
+                          <p:tn val="2"/>
+                        </p:cond>
+                      </p:stCondLst>
+                      <p:childTnLst>
+                        <p:par>
+                          <p:cTn id="4" fill="hold">
+                            <p:stCondLst>
+                              <p:cond delay="0"/>
+                            </p:stCondLst>
+                            <p:childTnLst>
+                              <p:par>
+                                <p:cTn id="5" presetID="1" presetClass="entr" presetSubtype="0" fill="hold" grpId="0" nodeType="withEffect">
+                                  <p:stCondLst>
+                                    <p:cond delay="0"/>
+                                  </p:stCondLst>
+                                  <p:childTnLst>
+                                    <p:set>
+                                      <p:cBhvr>
+                                        <p:cTn id="6" dur="1" fill="hold">
+                                          <p:stCondLst>
+                                            <p:cond delay="0"/>
+                                          </p:stCondLst>
+                                        </p:cTn>
+                                        <p:tgtEl>
+                                          <p:spTgt spid="3">
+                                            <p:txEl>
+                                              <p:pRg st="0" end="0"/>
+                                            </p:txEl>
+                                          </p:spTgt>
+                                        </p:tgtEl>
+                                        <p:attrNameLst>
+                                          <p:attrName>style.visibility</p:attrName>
+                                        </p:attrNameLst>
+                                      </p:cBhvr>
+                                      <p:to>
+                                        <p:strVal val="visible"/>
+                                      </p:to>
+                                    </p:set>
+                                  </p:childTnLst>
+                                </p:cTn>
+                              </p:par>
+                              <p:par>
+                                <p:cTn id="7" presetID="1" presetClass="entr" presetSubtype="0" fill="hold" grpId="0" nodeType="withEffect">
+                                  <p:stCondLst>
+                                    <p:cond delay="0"/>
+                                  </p:stCondLst>
+                                  <p:childTnLst>
+                                    <p:set>
+                                      <p:cBhvr>
+                                        <p:cTn id="8" dur="1" fill="hold">
+                                          <p:stCondLst>
+                                            <p:cond delay="0"/>
+                                          </p:stCondLst>
+                                        </p:cTn>
+                                        <p:tgtEl>
+                                          <p:spTgt spid="5"/>
+                                        </p:tgtEl>
+                                        <p:attrNameLst>
+                                          <p:attrName>style.visibility</p:attrName>
+                                        </p:attrNameLst>
+                                      </p:cBhvr>
+                                      <p:to>
+                                        <p:strVal val="visible"/>
+                                      </p:to>
+                                    </p:set>
+                                  </p:childTnLst>
+                                </p:cTn>
+                              </p:par>
+                            </p:childTnLst>
+                          </p:cTn>
+                        </p:par>
+                      </p:childTnLst>
+                    </p:cTn>
+                  </p:par>
+                  <p:par>
+                    <p:cTn id="9" fill="hold">
+                      <p:stCondLst>
+                        <p:cond delay="indefinite"/>
+                      </p:stCondLst>
+                      <p:childTnLst>
+                        <p:par>
+                          <p:cTn id="10" fill="hold">
+                            <p:stCondLst>
+                              <p:cond delay="0"/>
+                            </p:stCondLst>
+                            <p:childTnLst>
+                              <p:par>
+                                <p:cTn id="11" presetID="1" presetClass="entr" presetSubtype="0" fill="hold" grpId="0" nodeType="clickEffect">
+                                  <p:stCondLst>
+                                    <p:cond delay="0"/>
+                                  </p:stCondLst>
+                                  <p:childTnLst>
+                                    <p:set>
+                                      <p:cBhvr>
+                                        <p:cTn id="12" dur="1" fill="hold">
+                                          <p:stCondLst>
+                                            <p:cond delay="0"/>
+                                          </p:stCondLst>
+                                        </p:cTn>
+                                        <p:tgtEl>
+                                          <p:spTgt spid="3">
+                                            <p:txEl>
+                                              <p:pRg st="5" end="5"/>
+                                            </p:txEl>
+                                          </p:spTgt>
+                                        </p:tgtEl>
+                                        <p:attrNameLst>
+                                          <p:attrName>style.visibility</p:attrName>
+                                        </p:attrNameLst>
+                                      </p:cBhvr>
+                                      <p:to>
+                                        <p:strVal val="visible"/>
+                                      </p:to>
+                                    </p:set>
+                                  </p:childTnLst>
+                                </p:cTn>
+                              </p:par>
+                              <p:par>
+                                <p:cTn id="13" presetID="1" presetClass="entr" presetSubtype="0" fill="hold" grpId="0" nodeType="withEffect">
+                                  <p:stCondLst>
+                                    <p:cond delay="0"/>
+                                  </p:stCondLst>
+                                  <p:childTnLst>
+                                    <p:set>
+                                      <p:cBhvr>
+                                        <p:cTn id="14" dur="1" fill="hold">
+                                          <p:stCondLst>
+                                            <p:cond delay="0"/>
+                                          </p:stCondLst>
+                                        </p:cTn>
+                                        <p:tgtEl>
+                                          <p:spTgt spid="6"/>
+                                        </p:tgtEl>
+                                        <p:attrNameLst>
+                                          <p:attrName>style.visibility</p:attrName>
+                                        </p:attrNameLst>
+                                      </p:cBhvr>
+                                      <p:to>
+                                        <p:strVal val="visible"/>
+                                      </p:to>
+                                    </p:set>
+                                  </p:childTnLst>
+                                </p:cTn>
+                              </p:par>
+                            </p:childTnLst>
+                          </p:cTn>
+                        </p:par>
+                      </p:childTnLst>
+                    </p:cTn>
+                  </p:par>
+                </p:childTnLst>
+              </p:cTn>
+              <p:prevCondLst>
+                <p:cond evt="onPrev" delay="0">
+                  <p:tgtEl>
+                    <p:sldTgt/>
+                  </p:tgtEl>
+                </p:cond>
+              </p:prevCondLst>
+              <p:nextCondLst>
+                <p:cond evt="onNext" delay="0">
+                  <p:tgtEl>
+                    <p:sldTgt/>
+                  </p:tgtEl>
+                </p:cond>
+              </p:nextCondLst>
+            </p:seq>
+          </p:childTnLst>
+        </p:cTn>
+      </p:par>
+    </p:tnLst>
+    <p:bldLst>
+      <p:bldP spid="3" grpId="0" uiExpand="1" build="p"/>
+      <p:bldP spid="5" grpId="0" animBg="1"/>
+      <p:bldP spid="6" grpId="0" animBg="1"/>
+    </p:bldLst>
+  </p:timing>
+</p:sld>
+</file>
+
+<file path=ppt/slides/slide15.xml><?xml version="1.0" encoding="utf-8"?>
+<p:sld xmlns:a="http://schemas.openxmlformats.org/drawingml/2006/main" xmlns:r="http://schemas.openxmlformats.org/officeDocument/2006/relationships" xmlns:p="http://schemas.openxmlformats.org/presentationml/2006/main">
+  <p:cSld>
+    <p:spTree>
+      <p:nvGrpSpPr>
+        <p:cNvPr id="1" name=""/>
+        <p:cNvGrpSpPr/>
+        <p:nvPr/>
+      </p:nvGrpSpPr>
+      <p:grpSpPr>
+        <a:xfrm>
+          <a:off x="0" y="0"/>
+          <a:ext cx="0" cy="0"/>
+          <a:chOff x="0" y="0"/>
+          <a:chExt cx="0" cy="0"/>
+        </a:xfrm>
+      </p:grpSpPr>
+      <p:sp>
+        <p:nvSpPr>
+          <p:cNvPr id="2" name="Title 1"/>
+          <p:cNvSpPr>
+            <a:spLocks noGrp="1"/>
+          </p:cNvSpPr>
+          <p:nvPr>
+            <p:ph type="title"/>
+          </p:nvPr>
+        </p:nvSpPr>
+        <p:spPr/>
+        <p:txBody>
+          <a:bodyPr/>
+          <a:lstStyle/>
+          <a:p>
+            <a:r>
+              <a:rPr lang="en-US" dirty="0" smtClean="0"/>
+              <a:t>Extracting matches</a:t>
+            </a:r>
+            <a:endParaRPr lang="en-US" dirty="0"/>
+          </a:p>
+        </p:txBody>
+      </p:sp>
+      <p:sp>
+        <p:nvSpPr>
+          <p:cNvPr id="3" name="Content Placeholder 2"/>
+          <p:cNvSpPr>
+            <a:spLocks noGrp="1"/>
+          </p:cNvSpPr>
+          <p:nvPr>
+            <p:ph idx="1"/>
+          </p:nvPr>
+        </p:nvSpPr>
+        <p:spPr/>
+        <p:txBody>
+          <a:bodyPr/>
+          <a:lstStyle/>
+          <a:p>
+            <a:r>
+              <a:rPr lang="en-US" dirty="0" smtClean="0"/>
+              <a:t>Grouping: </a:t>
+            </a:r>
+            <a:r>
+              <a:rPr lang="en-US" dirty="0" smtClean="0">
+                <a:latin typeface="Courier New" panose="02070309020205020404" pitchFamily="49" charset="0"/>
+                <a:cs typeface="Courier New" panose="02070309020205020404" pitchFamily="49" charset="0"/>
+              </a:rPr>
+              <a:t>(?:…)</a:t>
+            </a:r>
+          </a:p>
+          <a:p>
+            <a:r>
+              <a:rPr lang="en-US" dirty="0" smtClean="0"/>
+              <a:t>Capturing brackets: </a:t>
+            </a:r>
+            <a:r>
+              <a:rPr lang="en-US" dirty="0" smtClean="0">
+                <a:latin typeface="Courier New" panose="02070309020205020404" pitchFamily="49" charset="0"/>
+                <a:cs typeface="Courier New" panose="02070309020205020404" pitchFamily="49" charset="0"/>
+              </a:rPr>
+              <a:t>(…)</a:t>
+            </a:r>
+            <a:endParaRPr lang="en-US" dirty="0">
+              <a:latin typeface="Courier New" panose="02070309020205020404" pitchFamily="49" charset="0"/>
+              <a:cs typeface="Courier New" panose="02070309020205020404" pitchFamily="49" charset="0"/>
+            </a:endParaRPr>
+          </a:p>
+        </p:txBody>
+      </p:sp>
+      <p:sp>
+        <p:nvSpPr>
+          <p:cNvPr id="4" name="Slide Number Placeholder 3"/>
+          <p:cNvSpPr>
+            <a:spLocks noGrp="1"/>
+          </p:cNvSpPr>
+          <p:nvPr>
+            <p:ph type="sldNum" sz="quarter" idx="12"/>
+          </p:nvPr>
+        </p:nvSpPr>
+        <p:spPr/>
+        <p:txBody>
+          <a:bodyPr/>
+          <a:lstStyle/>
+          <a:p>
+            <a:fld id="{9CEF4966-5219-4577-B301-14467D565841}" type="slidenum">
+              <a:rPr lang="en-US" smtClean="0"/>
+              <a:t>15</a:t>
+            </a:fld>
+            <a:endParaRPr lang="en-US"/>
+          </a:p>
+        </p:txBody>
+      </p:sp>
+      <p:sp>
+        <p:nvSpPr>
+          <p:cNvPr id="5" name="TextBox 4"/>
+          <p:cNvSpPr txBox="1"/>
+          <p:nvPr/>
+        </p:nvSpPr>
+        <p:spPr>
+          <a:xfrm>
+            <a:off x="628650" y="2924964"/>
+            <a:ext cx="6617724" cy="1815882"/>
+          </a:xfrm>
+          <a:prstGeom prst="rect">
+            <a:avLst/>
+          </a:prstGeom>
+          <a:solidFill>
+            <a:schemeClr val="bg1">
+              <a:lumMod val="75000"/>
+            </a:schemeClr>
+          </a:solidFill>
+          <a:ln>
+            <a:solidFill>
+              <a:schemeClr val="tx1"/>
+            </a:solidFill>
+          </a:ln>
+        </p:spPr>
+        <p:txBody>
+          <a:bodyPr wrap="square" rtlCol="0">
+            <a:spAutoFit/>
+          </a:bodyPr>
+          <a:lstStyle/>
+          <a:p>
+            <a:r>
+              <a:rPr lang="en-US" sz="1600" dirty="0" smtClean="0">
+                <a:latin typeface="Courier New" pitchFamily="49" charset="0"/>
+                <a:cs typeface="Courier New" pitchFamily="49" charset="0"/>
+              </a:rPr>
+              <a:t>regex expr {</a:t>
+            </a:r>
+            <a:r>
+              <a:rPr lang="en-US" sz="1600" dirty="0">
+                <a:latin typeface="Courier New" pitchFamily="49" charset="0"/>
+                <a:cs typeface="Courier New" pitchFamily="49" charset="0"/>
+              </a:rPr>
+              <a:t>R</a:t>
+            </a:r>
+            <a:r>
+              <a:rPr lang="en-US" sz="1600" dirty="0" smtClean="0">
+                <a:latin typeface="Courier New" pitchFamily="49" charset="0"/>
+                <a:cs typeface="Courier New" pitchFamily="49" charset="0"/>
+              </a:rPr>
+              <a:t>"(</a:t>
+            </a:r>
+            <a:r>
+              <a:rPr lang="en-US" sz="1600" b="1" dirty="0" smtClean="0">
+                <a:solidFill>
+                  <a:srgbClr val="C00000"/>
+                </a:solidFill>
+                <a:latin typeface="Courier New" pitchFamily="49" charset="0"/>
+                <a:cs typeface="Courier New" pitchFamily="49" charset="0"/>
+              </a:rPr>
+              <a:t>(</a:t>
+            </a:r>
+            <a:r>
+              <a:rPr lang="en-US" sz="1600" dirty="0" smtClean="0">
+                <a:latin typeface="Courier New" pitchFamily="49" charset="0"/>
+                <a:cs typeface="Courier New" pitchFamily="49" charset="0"/>
+              </a:rPr>
+              <a:t>\</a:t>
+            </a:r>
+            <a:r>
+              <a:rPr lang="en-US" sz="1600" dirty="0">
+                <a:latin typeface="Courier New" pitchFamily="49" charset="0"/>
+                <a:cs typeface="Courier New" pitchFamily="49" charset="0"/>
+              </a:rPr>
+              <a:t>w+(?:\.\w</a:t>
+            </a:r>
+            <a:r>
+              <a:rPr lang="en-US" sz="1600" dirty="0" smtClean="0">
+                <a:latin typeface="Courier New" pitchFamily="49" charset="0"/>
+                <a:cs typeface="Courier New" pitchFamily="49" charset="0"/>
+              </a:rPr>
+              <a:t>+)?</a:t>
+            </a:r>
+            <a:r>
+              <a:rPr lang="en-US" sz="1600" b="1" dirty="0" smtClean="0">
+                <a:solidFill>
+                  <a:srgbClr val="C00000"/>
+                </a:solidFill>
+                <a:latin typeface="Courier New" pitchFamily="49" charset="0"/>
+                <a:cs typeface="Courier New" pitchFamily="49" charset="0"/>
+              </a:rPr>
+              <a:t>)</a:t>
+            </a:r>
+            <a:r>
+              <a:rPr lang="en-US" sz="1600" dirty="0" smtClean="0">
+                <a:latin typeface="Courier New" pitchFamily="49" charset="0"/>
+                <a:cs typeface="Courier New" pitchFamily="49" charset="0"/>
+              </a:rPr>
+              <a:t>@</a:t>
+            </a:r>
+            <a:r>
+              <a:rPr lang="en-US" sz="1600" b="1" dirty="0" smtClean="0">
+                <a:solidFill>
+                  <a:srgbClr val="C00000"/>
+                </a:solidFill>
+                <a:latin typeface="Courier New" pitchFamily="49" charset="0"/>
+                <a:cs typeface="Courier New" pitchFamily="49" charset="0"/>
+              </a:rPr>
+              <a:t>(</a:t>
+            </a:r>
+            <a:r>
+              <a:rPr lang="en-US" sz="1600" dirty="0" smtClean="0">
+                <a:latin typeface="Courier New" pitchFamily="49" charset="0"/>
+                <a:cs typeface="Courier New" pitchFamily="49" charset="0"/>
+              </a:rPr>
+              <a:t>\</a:t>
+            </a:r>
+            <a:r>
+              <a:rPr lang="en-US" sz="1600" dirty="0">
+                <a:latin typeface="Courier New" pitchFamily="49" charset="0"/>
+                <a:cs typeface="Courier New" pitchFamily="49" charset="0"/>
+              </a:rPr>
+              <a:t>w+(?:\.\w</a:t>
+            </a:r>
+            <a:r>
+              <a:rPr lang="en-US" sz="1600" dirty="0" smtClean="0">
+                <a:latin typeface="Courier New" pitchFamily="49" charset="0"/>
+                <a:cs typeface="Courier New" pitchFamily="49" charset="0"/>
+              </a:rPr>
+              <a:t>+)+</a:t>
+            </a:r>
+            <a:r>
+              <a:rPr lang="en-US" sz="1600" b="1" dirty="0" smtClean="0">
+                <a:solidFill>
+                  <a:srgbClr val="C00000"/>
+                </a:solidFill>
+                <a:latin typeface="Courier New" pitchFamily="49" charset="0"/>
+                <a:cs typeface="Courier New" pitchFamily="49" charset="0"/>
+              </a:rPr>
+              <a:t>)</a:t>
+            </a:r>
+            <a:r>
+              <a:rPr lang="en-US" sz="1600" dirty="0" smtClean="0">
+                <a:latin typeface="Courier New" pitchFamily="49" charset="0"/>
+                <a:cs typeface="Courier New" pitchFamily="49" charset="0"/>
+              </a:rPr>
+              <a:t>"};</a:t>
+            </a:r>
+          </a:p>
+          <a:p>
+            <a:r>
+              <a:rPr lang="en-US" sz="1600" dirty="0" err="1" smtClean="0">
+                <a:latin typeface="Courier New" pitchFamily="49" charset="0"/>
+                <a:cs typeface="Courier New" pitchFamily="49" charset="0"/>
+              </a:rPr>
+              <a:t>smatch</a:t>
+            </a:r>
+            <a:r>
+              <a:rPr lang="en-US" sz="1600" dirty="0" smtClean="0">
+                <a:latin typeface="Courier New" pitchFamily="49" charset="0"/>
+                <a:cs typeface="Courier New" pitchFamily="49" charset="0"/>
+              </a:rPr>
+              <a:t> matchers;</a:t>
+            </a:r>
+          </a:p>
+          <a:p>
+            <a:r>
+              <a:rPr lang="en-US" sz="1600" dirty="0" smtClean="0">
+                <a:latin typeface="Courier New" pitchFamily="49" charset="0"/>
+                <a:cs typeface="Courier New" pitchFamily="49" charset="0"/>
+              </a:rPr>
+              <a:t>if (</a:t>
+            </a:r>
+            <a:r>
+              <a:rPr lang="en-US" sz="1600" dirty="0" err="1" smtClean="0">
+                <a:latin typeface="Courier New" pitchFamily="49" charset="0"/>
+                <a:cs typeface="Courier New" pitchFamily="49" charset="0"/>
+              </a:rPr>
+              <a:t>regex_search</a:t>
+            </a:r>
+            <a:r>
+              <a:rPr lang="en-US" sz="1600" dirty="0" smtClean="0">
+                <a:latin typeface="Courier New" pitchFamily="49" charset="0"/>
+                <a:cs typeface="Courier New" pitchFamily="49" charset="0"/>
+              </a:rPr>
+              <a:t>(</a:t>
+            </a:r>
+            <a:r>
+              <a:rPr lang="en-US" sz="1600" dirty="0" err="1" smtClean="0">
+                <a:latin typeface="Courier New" pitchFamily="49" charset="0"/>
+                <a:cs typeface="Courier New" pitchFamily="49" charset="0"/>
+              </a:rPr>
+              <a:t>str</a:t>
+            </a:r>
+            <a:r>
+              <a:rPr lang="en-US" sz="1600" dirty="0" smtClean="0">
+                <a:latin typeface="Courier New" pitchFamily="49" charset="0"/>
+                <a:cs typeface="Courier New" pitchFamily="49" charset="0"/>
+              </a:rPr>
+              <a:t>, matches, expr)) {</a:t>
+            </a:r>
+          </a:p>
+          <a:p>
+            <a:r>
+              <a:rPr lang="en-US" sz="1600" dirty="0">
+                <a:latin typeface="Courier New" pitchFamily="49" charset="0"/>
+                <a:cs typeface="Courier New" pitchFamily="49" charset="0"/>
+              </a:rPr>
+              <a:t> </a:t>
+            </a:r>
+            <a:r>
+              <a:rPr lang="en-US" sz="1600" dirty="0" smtClean="0">
+                <a:latin typeface="Courier New" pitchFamily="49" charset="0"/>
+                <a:cs typeface="Courier New" pitchFamily="49" charset="0"/>
+              </a:rPr>
+              <a:t>   string </a:t>
+            </a:r>
+            <a:r>
+              <a:rPr lang="en-US" sz="1600" dirty="0" err="1" smtClean="0">
+                <a:latin typeface="Courier New" pitchFamily="49" charset="0"/>
+                <a:cs typeface="Courier New" pitchFamily="49" charset="0"/>
+              </a:rPr>
+              <a:t>user_name</a:t>
+            </a:r>
+            <a:r>
+              <a:rPr lang="en-US" sz="1600" dirty="0" smtClean="0">
+                <a:latin typeface="Courier New" pitchFamily="49" charset="0"/>
+                <a:cs typeface="Courier New" pitchFamily="49" charset="0"/>
+              </a:rPr>
+              <a:t> = matches[1];</a:t>
+            </a:r>
+          </a:p>
+          <a:p>
+            <a:r>
+              <a:rPr lang="en-US" sz="1600" dirty="0">
+                <a:latin typeface="Courier New" pitchFamily="49" charset="0"/>
+                <a:cs typeface="Courier New" pitchFamily="49" charset="0"/>
+              </a:rPr>
+              <a:t> </a:t>
+            </a:r>
+            <a:r>
+              <a:rPr lang="en-US" sz="1600" dirty="0" smtClean="0">
+                <a:latin typeface="Courier New" pitchFamily="49" charset="0"/>
+                <a:cs typeface="Courier New" pitchFamily="49" charset="0"/>
+              </a:rPr>
+              <a:t>   string </a:t>
+            </a:r>
+            <a:r>
+              <a:rPr lang="en-US" sz="1600" dirty="0" err="1" smtClean="0">
+                <a:latin typeface="Courier New" pitchFamily="49" charset="0"/>
+                <a:cs typeface="Courier New" pitchFamily="49" charset="0"/>
+              </a:rPr>
+              <a:t>domain_name</a:t>
+            </a:r>
+            <a:r>
+              <a:rPr lang="en-US" sz="1600" dirty="0" smtClean="0">
+                <a:latin typeface="Courier New" pitchFamily="49" charset="0"/>
+                <a:cs typeface="Courier New" pitchFamily="49" charset="0"/>
+              </a:rPr>
+              <a:t> = matches[2];</a:t>
+            </a:r>
+          </a:p>
+          <a:p>
+            <a:r>
+              <a:rPr lang="en-US" sz="1600" dirty="0">
+                <a:latin typeface="Courier New" pitchFamily="49" charset="0"/>
+                <a:cs typeface="Courier New" pitchFamily="49" charset="0"/>
+              </a:rPr>
+              <a:t> </a:t>
+            </a:r>
+            <a:r>
+              <a:rPr lang="en-US" sz="1600" dirty="0" smtClean="0">
+                <a:latin typeface="Courier New" pitchFamily="49" charset="0"/>
+                <a:cs typeface="Courier New" pitchFamily="49" charset="0"/>
+              </a:rPr>
+              <a:t>   …</a:t>
+            </a:r>
+          </a:p>
+          <a:p>
+            <a:r>
+              <a:rPr lang="en-US" sz="1600" dirty="0">
+                <a:latin typeface="Courier New" pitchFamily="49" charset="0"/>
+                <a:cs typeface="Courier New" pitchFamily="49" charset="0"/>
+              </a:rPr>
+              <a:t>}</a:t>
+            </a:r>
+            <a:endParaRPr lang="en-US" sz="1600" dirty="0" smtClean="0">
+              <a:latin typeface="Courier New" pitchFamily="49" charset="0"/>
+              <a:cs typeface="Courier New" pitchFamily="49" charset="0"/>
+            </a:endParaRPr>
+          </a:p>
+        </p:txBody>
+      </p:sp>
+      <p:sp>
+        <p:nvSpPr>
+          <p:cNvPr id="6" name="TextBox 5"/>
+          <p:cNvSpPr txBox="1"/>
+          <p:nvPr/>
+        </p:nvSpPr>
+        <p:spPr>
+          <a:xfrm>
+            <a:off x="1454640" y="5112775"/>
+            <a:ext cx="6234720" cy="400110"/>
+          </a:xfrm>
+          <a:prstGeom prst="rect">
+            <a:avLst/>
+          </a:prstGeom>
+          <a:noFill/>
+          <a:ln>
+            <a:solidFill>
+              <a:schemeClr val="tx1"/>
+            </a:solidFill>
+          </a:ln>
+        </p:spPr>
+        <p:txBody>
+          <a:bodyPr wrap="none" rtlCol="0">
+            <a:spAutoFit/>
+          </a:bodyPr>
+          <a:lstStyle/>
+          <a:p>
+            <a:r>
+              <a:rPr lang="en-US" sz="2000" dirty="0" smtClean="0"/>
+              <a:t>Note: capturing brackets also group, but lots of machinery</a:t>
+            </a:r>
+            <a:endParaRPr lang="en-US" sz="2000" dirty="0"/>
+          </a:p>
+        </p:txBody>
+      </p:sp>
+    </p:spTree>
+    <p:extLst>
+      <p:ext uri="{BB962C8B-B14F-4D97-AF65-F5344CB8AC3E}">
+        <p14:creationId xmlns:p14="http://schemas.microsoft.com/office/powerpoint/2010/main" val="1065078952"/>
+      </p:ext>
+    </p:extLst>
+  </p:cSld>
+  <p:clrMapOvr>
+    <a:masterClrMapping/>
+  </p:clrMapOvr>
+  <p:timing>
+    <p:tnLst>
+      <p:par>
+        <p:cTn id="1" dur="indefinite" restart="never" nodeType="tmRoot">
+          <p:childTnLst>
+            <p:seq concurrent="1" nextAc="seek">
+              <p:cTn id="2" dur="indefinite" nodeType="mainSeq">
+                <p:childTnLst>
+                  <p:par>
+                    <p:cTn id="3" fill="hold">
+                      <p:stCondLst>
+                        <p:cond delay="indefinite"/>
+                        <p:cond evt="onBegin" delay="0">
+                          <p:tn val="2"/>
+                        </p:cond>
+                      </p:stCondLst>
+                      <p:childTnLst>
+                        <p:par>
+                          <p:cTn id="4" fill="hold">
+                            <p:stCondLst>
+                              <p:cond delay="0"/>
+                            </p:stCondLst>
+                            <p:childTnLst>
+                              <p:par>
+                                <p:cTn id="5" presetID="1" presetClass="entr" presetSubtype="0" fill="hold" grpId="0" nodeType="withEffect">
+                                  <p:stCondLst>
+                                    <p:cond delay="0"/>
+                                  </p:stCondLst>
+                                  <p:childTnLst>
+                                    <p:set>
+                                      <p:cBhvr>
+                                        <p:cTn id="6" dur="1" fill="hold">
+                                          <p:stCondLst>
+                                            <p:cond delay="0"/>
+                                          </p:stCondLst>
+                                        </p:cTn>
+                                        <p:tgtEl>
+                                          <p:spTgt spid="3">
+                                            <p:txEl>
+                                              <p:pRg st="0" end="0"/>
+                                            </p:txEl>
+                                          </p:spTgt>
+                                        </p:tgtEl>
+                                        <p:attrNameLst>
+                                          <p:attrName>style.visibility</p:attrName>
+                                        </p:attrNameLst>
+                                      </p:cBhvr>
+                                      <p:to>
+                                        <p:strVal val="visible"/>
+                                      </p:to>
+                                    </p:set>
+                                  </p:childTnLst>
+                                </p:cTn>
+                              </p:par>
+                            </p:childTnLst>
+                          </p:cTn>
+                        </p:par>
+                      </p:childTnLst>
+                    </p:cTn>
+                  </p:par>
+                  <p:par>
+                    <p:cTn id="7" fill="hold">
+                      <p:stCondLst>
+                        <p:cond delay="indefinite"/>
+                      </p:stCondLst>
+                      <p:childTnLst>
+                        <p:par>
+                          <p:cTn id="8" fill="hold">
+                            <p:stCondLst>
+                              <p:cond delay="0"/>
+                            </p:stCondLst>
+                            <p:childTnLst>
+                              <p:par>
+                                <p:cTn id="9" presetID="1" presetClass="entr" presetSubtype="0" fill="hold" grpId="0" nodeType="clickEffect">
+                                  <p:stCondLst>
+                                    <p:cond delay="0"/>
+                                  </p:stCondLst>
+                                  <p:childTnLst>
+                                    <p:set>
+                                      <p:cBhvr>
+                                        <p:cTn id="10" dur="1" fill="hold">
+                                          <p:stCondLst>
+                                            <p:cond delay="0"/>
+                                          </p:stCondLst>
+                                        </p:cTn>
+                                        <p:tgtEl>
+                                          <p:spTgt spid="3">
+                                            <p:txEl>
+                                              <p:pRg st="1" end="1"/>
+                                            </p:txEl>
+                                          </p:spTgt>
+                                        </p:tgtEl>
+                                        <p:attrNameLst>
+                                          <p:attrName>style.visibility</p:attrName>
+                                        </p:attrNameLst>
+                                      </p:cBhvr>
+                                      <p:to>
+                                        <p:strVal val="visible"/>
+                                      </p:to>
+                                    </p:set>
+                                  </p:childTnLst>
+                                </p:cTn>
+                              </p:par>
+                              <p:par>
+                                <p:cTn id="11" presetID="1" presetClass="entr" presetSubtype="0" fill="hold" grpId="0" nodeType="withEffect">
+                                  <p:stCondLst>
+                                    <p:cond delay="0"/>
+                                  </p:stCondLst>
+                                  <p:childTnLst>
+                                    <p:set>
+                                      <p:cBhvr>
+                                        <p:cTn id="12" dur="1" fill="hold">
+                                          <p:stCondLst>
+                                            <p:cond delay="0"/>
+                                          </p:stCondLst>
+                                        </p:cTn>
+                                        <p:tgtEl>
+                                          <p:spTgt spid="5"/>
+                                        </p:tgtEl>
+                                        <p:attrNameLst>
+                                          <p:attrName>style.visibility</p:attrName>
+                                        </p:attrNameLst>
+                                      </p:cBhvr>
+                                      <p:to>
+                                        <p:strVal val="visible"/>
+                                      </p:to>
+                                    </p:set>
+                                  </p:childTnLst>
+                                </p:cTn>
+                              </p:par>
+                            </p:childTnLst>
+                          </p:cTn>
+                        </p:par>
+                      </p:childTnLst>
+                    </p:cTn>
+                  </p:par>
+                  <p:par>
+                    <p:cTn id="13" fill="hold">
+                      <p:stCondLst>
+                        <p:cond delay="indefinite"/>
+                      </p:stCondLst>
+                      <p:childTnLst>
+                        <p:par>
+                          <p:cTn id="14" fill="hold">
+                            <p:stCondLst>
+                              <p:cond delay="0"/>
+                            </p:stCondLst>
+                            <p:childTnLst>
+                              <p:par>
+                                <p:cTn id="15" presetID="1" presetClass="entr" presetSubtype="0" fill="hold" grpId="0" nodeType="clickEffect">
+                                  <p:stCondLst>
+                                    <p:cond delay="0"/>
+                                  </p:stCondLst>
+                                  <p:childTnLst>
+                                    <p:set>
+                                      <p:cBhvr>
+                                        <p:cTn id="16" dur="1" fill="hold">
+                                          <p:stCondLst>
+                                            <p:cond delay="0"/>
+                                          </p:stCondLst>
+                                        </p:cTn>
+                                        <p:tgtEl>
+                                          <p:spTgt spid="6"/>
+                                        </p:tgtEl>
+                                        <p:attrNameLst>
+                                          <p:attrName>style.visibility</p:attrName>
+                                        </p:attrNameLst>
+                                      </p:cBhvr>
+                                      <p:to>
+                                        <p:strVal val="visible"/>
+                                      </p:to>
+                                    </p:set>
+                                  </p:childTnLst>
+                                </p:cTn>
+                              </p:par>
+                            </p:childTnLst>
+                          </p:cTn>
+                        </p:par>
+                      </p:childTnLst>
+                    </p:cTn>
+                  </p:par>
+                </p:childTnLst>
+              </p:cTn>
+              <p:prevCondLst>
+                <p:cond evt="onPrev" delay="0">
+                  <p:tgtEl>
+                    <p:sldTgt/>
+                  </p:tgtEl>
+                </p:cond>
+              </p:prevCondLst>
+              <p:nextCondLst>
+                <p:cond evt="onNext" delay="0">
+                  <p:tgtEl>
+                    <p:sldTgt/>
+                  </p:tgtEl>
+                </p:cond>
+              </p:nextCondLst>
+            </p:seq>
+          </p:childTnLst>
+        </p:cTn>
+      </p:par>
+    </p:tnLst>
+    <p:bldLst>
+      <p:bldP spid="3" grpId="0" uiExpand="1" build="p"/>
+      <p:bldP spid="5" grpId="0" animBg="1"/>
+      <p:bldP spid="6" grpId="0" animBg="1"/>
+    </p:bldLst>
+  </p:timing>
+</p:sld>
+</file>
+
+<file path=ppt/slides/slide16.xml><?xml version="1.0" encoding="utf-8"?>
+<p:sld xmlns:a="http://schemas.openxmlformats.org/drawingml/2006/main" xmlns:r="http://schemas.openxmlformats.org/officeDocument/2006/relationships" xmlns:p="http://schemas.openxmlformats.org/presentationml/2006/main">
+  <p:cSld>
+    <p:spTree>
+      <p:nvGrpSpPr>
+        <p:cNvPr id="1" name=""/>
+        <p:cNvGrpSpPr/>
+        <p:nvPr/>
+      </p:nvGrpSpPr>
+      <p:grpSpPr>
+        <a:xfrm>
+          <a:off x="0" y="0"/>
+          <a:ext cx="0" cy="0"/>
+          <a:chOff x="0" y="0"/>
+          <a:chExt cx="0" cy="0"/>
+        </a:xfrm>
+      </p:grpSpPr>
+      <p:sp>
+        <p:nvSpPr>
+          <p:cNvPr id="2" name="Title 1"/>
+          <p:cNvSpPr>
+            <a:spLocks noGrp="1"/>
+          </p:cNvSpPr>
+          <p:nvPr>
+            <p:ph type="title"/>
+          </p:nvPr>
+        </p:nvSpPr>
+        <p:spPr/>
+        <p:txBody>
+          <a:bodyPr/>
+          <a:lstStyle/>
+          <a:p>
+            <a:r>
+              <a:rPr lang="en-US" dirty="0" smtClean="0"/>
+              <a:t>Replacing matches</a:t>
+            </a:r>
+            <a:endParaRPr lang="en-US" dirty="0"/>
+          </a:p>
+        </p:txBody>
+      </p:sp>
+      <p:sp>
+        <p:nvSpPr>
+          <p:cNvPr id="3" name="Content Placeholder 2"/>
+          <p:cNvSpPr>
+            <a:spLocks noGrp="1"/>
+          </p:cNvSpPr>
+          <p:nvPr>
+            <p:ph idx="1"/>
+          </p:nvPr>
+        </p:nvSpPr>
+        <p:spPr/>
+        <p:txBody>
+          <a:bodyPr/>
+          <a:lstStyle/>
+          <a:p>
+            <a:r>
+              <a:rPr lang="en-US" dirty="0" smtClean="0"/>
+              <a:t>Format string for replacement</a:t>
+            </a:r>
+          </a:p>
+          <a:p>
+            <a:pPr lvl="1"/>
+            <a:r>
+              <a:rPr lang="en-US" dirty="0" smtClean="0">
+                <a:latin typeface="Courier New" panose="02070309020205020404" pitchFamily="49" charset="0"/>
+                <a:cs typeface="Courier New" panose="02070309020205020404" pitchFamily="49" charset="0"/>
+              </a:rPr>
+              <a:t>$1</a:t>
+            </a:r>
+            <a:r>
+              <a:rPr lang="en-US" dirty="0" smtClean="0"/>
+              <a:t>: first capture</a:t>
+            </a:r>
+          </a:p>
+          <a:p>
+            <a:pPr lvl="1"/>
+            <a:r>
+              <a:rPr lang="en-US" dirty="0" smtClean="0">
+                <a:latin typeface="Courier New" panose="02070309020205020404" pitchFamily="49" charset="0"/>
+                <a:cs typeface="Courier New" panose="02070309020205020404" pitchFamily="49" charset="0"/>
+              </a:rPr>
+              <a:t>$2</a:t>
+            </a:r>
+            <a:r>
+              <a:rPr lang="en-US" dirty="0" smtClean="0"/>
+              <a:t>: second capture</a:t>
+            </a:r>
+          </a:p>
+          <a:p>
+            <a:pPr lvl="1"/>
+            <a:r>
+              <a:rPr lang="en-US" dirty="0" smtClean="0"/>
+              <a:t>…</a:t>
+            </a:r>
+          </a:p>
+          <a:p>
+            <a:pPr lvl="1"/>
+            <a:r>
+              <a:rPr lang="en-US" dirty="0" smtClean="0">
+                <a:latin typeface="Courier New" panose="02070309020205020404" pitchFamily="49" charset="0"/>
+                <a:cs typeface="Courier New" panose="02070309020205020404" pitchFamily="49" charset="0"/>
+              </a:rPr>
+              <a:t>$&amp;</a:t>
+            </a:r>
+            <a:r>
+              <a:rPr lang="en-US" dirty="0" smtClean="0"/>
+              <a:t>: complete match</a:t>
+            </a:r>
+          </a:p>
+          <a:p>
+            <a:pPr lvl="1"/>
+            <a:r>
+              <a:rPr lang="en-US" dirty="0" smtClean="0"/>
+              <a:t>literal characters</a:t>
+            </a:r>
+            <a:endParaRPr lang="en-US" dirty="0"/>
+          </a:p>
+        </p:txBody>
+      </p:sp>
+      <p:sp>
+        <p:nvSpPr>
+          <p:cNvPr id="4" name="Slide Number Placeholder 3"/>
+          <p:cNvSpPr>
+            <a:spLocks noGrp="1"/>
+          </p:cNvSpPr>
+          <p:nvPr>
+            <p:ph type="sldNum" sz="quarter" idx="12"/>
+          </p:nvPr>
+        </p:nvSpPr>
+        <p:spPr/>
+        <p:txBody>
+          <a:bodyPr/>
+          <a:lstStyle/>
+          <a:p>
+            <a:fld id="{9CEF4966-5219-4577-B301-14467D565841}" type="slidenum">
+              <a:rPr lang="en-US" smtClean="0"/>
+              <a:t>16</a:t>
+            </a:fld>
+            <a:endParaRPr lang="en-US"/>
+          </a:p>
+        </p:txBody>
+      </p:sp>
+      <p:sp>
+        <p:nvSpPr>
+          <p:cNvPr id="5" name="TextBox 4"/>
+          <p:cNvSpPr txBox="1"/>
+          <p:nvPr/>
+        </p:nvSpPr>
+        <p:spPr>
+          <a:xfrm>
+            <a:off x="628650" y="4439136"/>
+            <a:ext cx="6617724" cy="1077218"/>
+          </a:xfrm>
+          <a:prstGeom prst="rect">
+            <a:avLst/>
+          </a:prstGeom>
+          <a:solidFill>
+            <a:schemeClr val="bg1">
+              <a:lumMod val="75000"/>
+            </a:schemeClr>
+          </a:solidFill>
+          <a:ln>
+            <a:solidFill>
+              <a:schemeClr val="tx1"/>
+            </a:solidFill>
+          </a:ln>
+        </p:spPr>
+        <p:txBody>
+          <a:bodyPr wrap="square" rtlCol="0">
+            <a:spAutoFit/>
+          </a:bodyPr>
+          <a:lstStyle/>
+          <a:p>
+            <a:r>
+              <a:rPr lang="en-US" sz="1600" dirty="0" err="1" smtClean="0">
+                <a:latin typeface="Courier New" pitchFamily="49" charset="0"/>
+                <a:cs typeface="Courier New" pitchFamily="49" charset="0"/>
+              </a:rPr>
+              <a:t>const</a:t>
+            </a:r>
+            <a:r>
+              <a:rPr lang="en-US" sz="1600" dirty="0" smtClean="0">
+                <a:latin typeface="Courier New" pitchFamily="49" charset="0"/>
+                <a:cs typeface="Courier New" pitchFamily="49" charset="0"/>
+              </a:rPr>
+              <a:t> string </a:t>
+            </a:r>
+            <a:r>
+              <a:rPr lang="en-US" sz="1600" dirty="0" err="1" smtClean="0">
+                <a:latin typeface="Courier New" pitchFamily="49" charset="0"/>
+                <a:cs typeface="Courier New" pitchFamily="49" charset="0"/>
+              </a:rPr>
+              <a:t>str</a:t>
+            </a:r>
+            <a:r>
+              <a:rPr lang="en-US" sz="1600" dirty="0" smtClean="0">
+                <a:latin typeface="Courier New" pitchFamily="49" charset="0"/>
+                <a:cs typeface="Courier New" pitchFamily="49" charset="0"/>
+              </a:rPr>
+              <a:t> {"1.5, 2.3, alpha"};</a:t>
+            </a:r>
+          </a:p>
+          <a:p>
+            <a:r>
+              <a:rPr lang="en-US" sz="1600" dirty="0" smtClean="0">
+                <a:latin typeface="Courier New" pitchFamily="49" charset="0"/>
+                <a:cs typeface="Courier New" pitchFamily="49" charset="0"/>
+              </a:rPr>
+              <a:t>regex expr {</a:t>
+            </a:r>
+            <a:r>
+              <a:rPr lang="en-US" sz="1600" dirty="0">
+                <a:latin typeface="Courier New" pitchFamily="49" charset="0"/>
+                <a:cs typeface="Courier New" pitchFamily="49" charset="0"/>
+              </a:rPr>
+              <a:t>R</a:t>
+            </a:r>
+            <a:r>
+              <a:rPr lang="en-US" sz="1600" dirty="0" smtClean="0">
+                <a:latin typeface="Courier New" pitchFamily="49" charset="0"/>
+                <a:cs typeface="Courier New" pitchFamily="49" charset="0"/>
+              </a:rPr>
+              <a:t>"(([^ ,])+)"};</a:t>
+            </a:r>
+          </a:p>
+          <a:p>
+            <a:r>
+              <a:rPr lang="en-US" sz="1600" dirty="0" smtClean="0">
+                <a:latin typeface="Courier New" pitchFamily="49" charset="0"/>
+                <a:cs typeface="Courier New" pitchFamily="49" charset="0"/>
+              </a:rPr>
+              <a:t>string </a:t>
+            </a:r>
+            <a:r>
+              <a:rPr lang="en-US" sz="1600" dirty="0" err="1" smtClean="0">
+                <a:latin typeface="Courier New" pitchFamily="49" charset="0"/>
+                <a:cs typeface="Courier New" pitchFamily="49" charset="0"/>
+              </a:rPr>
+              <a:t>new_str</a:t>
+            </a:r>
+            <a:r>
+              <a:rPr lang="en-US" sz="1600" dirty="0" smtClean="0">
+                <a:latin typeface="Courier New" pitchFamily="49" charset="0"/>
+                <a:cs typeface="Courier New" pitchFamily="49" charset="0"/>
+              </a:rPr>
+              <a:t> = </a:t>
+            </a:r>
+            <a:r>
+              <a:rPr lang="en-US" sz="1600" dirty="0" err="1" smtClean="0">
+                <a:latin typeface="Courier New" pitchFamily="49" charset="0"/>
+                <a:cs typeface="Courier New" pitchFamily="49" charset="0"/>
+              </a:rPr>
+              <a:t>regex_replace</a:t>
+            </a:r>
+            <a:r>
+              <a:rPr lang="en-US" sz="1600" dirty="0" smtClean="0">
+                <a:latin typeface="Courier New" pitchFamily="49" charset="0"/>
+                <a:cs typeface="Courier New" pitchFamily="49" charset="0"/>
+              </a:rPr>
+              <a:t>(</a:t>
+            </a:r>
+            <a:r>
+              <a:rPr lang="en-US" sz="1600" dirty="0" err="1" smtClean="0">
+                <a:latin typeface="Courier New" pitchFamily="49" charset="0"/>
+                <a:cs typeface="Courier New" pitchFamily="49" charset="0"/>
+              </a:rPr>
+              <a:t>str</a:t>
+            </a:r>
+            <a:r>
+              <a:rPr lang="en-US" sz="1600" dirty="0" smtClean="0">
+                <a:latin typeface="Courier New" pitchFamily="49" charset="0"/>
+                <a:cs typeface="Courier New" pitchFamily="49" charset="0"/>
+              </a:rPr>
+              <a:t>, expr, "'$1'");</a:t>
+            </a:r>
+          </a:p>
+          <a:p>
+            <a:r>
+              <a:rPr lang="en-US" sz="1600" dirty="0" err="1" smtClean="0">
+                <a:latin typeface="Courier New" pitchFamily="49" charset="0"/>
+                <a:cs typeface="Courier New" pitchFamily="49" charset="0"/>
+              </a:rPr>
+              <a:t>cout</a:t>
+            </a:r>
+            <a:r>
+              <a:rPr lang="en-US" sz="1600" dirty="0" smtClean="0">
+                <a:latin typeface="Courier New" pitchFamily="49" charset="0"/>
+                <a:cs typeface="Courier New" pitchFamily="49" charset="0"/>
+              </a:rPr>
+              <a:t> &lt;&lt; </a:t>
+            </a:r>
+            <a:r>
+              <a:rPr lang="en-US" sz="1600" dirty="0" err="1" smtClean="0">
+                <a:latin typeface="Courier New" pitchFamily="49" charset="0"/>
+                <a:cs typeface="Courier New" pitchFamily="49" charset="0"/>
+              </a:rPr>
+              <a:t>new_str</a:t>
+            </a:r>
+            <a:r>
+              <a:rPr lang="en-US" sz="1600" dirty="0" smtClean="0">
+                <a:latin typeface="Courier New" pitchFamily="49" charset="0"/>
+                <a:cs typeface="Courier New" pitchFamily="49" charset="0"/>
+              </a:rPr>
+              <a:t> &lt;&lt; </a:t>
+            </a:r>
+            <a:r>
+              <a:rPr lang="en-US" sz="1600" dirty="0" err="1" smtClean="0">
+                <a:latin typeface="Courier New" pitchFamily="49" charset="0"/>
+                <a:cs typeface="Courier New" pitchFamily="49" charset="0"/>
+              </a:rPr>
+              <a:t>endl</a:t>
+            </a:r>
+            <a:r>
+              <a:rPr lang="en-US" sz="1600" dirty="0" smtClean="0">
+                <a:latin typeface="Courier New" pitchFamily="49" charset="0"/>
+                <a:cs typeface="Courier New" pitchFamily="49" charset="0"/>
+              </a:rPr>
+              <a:t>;</a:t>
+            </a:r>
+            <a:endParaRPr lang="en-US" sz="1600" dirty="0" smtClean="0">
+              <a:latin typeface="Courier New" pitchFamily="49" charset="0"/>
+              <a:cs typeface="Courier New" pitchFamily="49" charset="0"/>
+            </a:endParaRPr>
+          </a:p>
+        </p:txBody>
+      </p:sp>
+      <p:grpSp>
+        <p:nvGrpSpPr>
+          <p:cNvPr id="6" name="Group 5"/>
+          <p:cNvGrpSpPr/>
+          <p:nvPr/>
+        </p:nvGrpSpPr>
+        <p:grpSpPr>
+          <a:xfrm>
+            <a:off x="3736258" y="5381481"/>
+            <a:ext cx="3122713" cy="369332"/>
+            <a:chOff x="6240600" y="365126"/>
+            <a:chExt cx="3122713" cy="369332"/>
+          </a:xfrm>
+        </p:grpSpPr>
+        <p:cxnSp>
+          <p:nvCxnSpPr>
+            <p:cNvPr id="7" name="Straight Arrow Connector 6"/>
+            <p:cNvCxnSpPr/>
+            <p:nvPr/>
+          </p:nvCxnSpPr>
+          <p:spPr>
+            <a:xfrm>
+              <a:off x="6240600" y="365126"/>
+              <a:ext cx="671477" cy="184666"/>
+            </a:xfrm>
+            <a:prstGeom prst="straightConnector1">
+              <a:avLst/>
+            </a:prstGeom>
+            <a:ln w="53975">
+              <a:solidFill>
+                <a:schemeClr val="tx1"/>
+              </a:solidFill>
+              <a:tailEnd type="stealth" w="lg" len="lg"/>
+            </a:ln>
+          </p:spPr>
+          <p:style>
+            <a:lnRef idx="1">
+              <a:schemeClr val="accent1"/>
+            </a:lnRef>
+            <a:fillRef idx="0">
+              <a:schemeClr val="accent1"/>
+            </a:fillRef>
+            <a:effectRef idx="0">
+              <a:schemeClr val="accent1"/>
+            </a:effectRef>
+            <a:fontRef idx="minor">
+              <a:schemeClr val="tx1"/>
+            </a:fontRef>
+          </p:style>
+        </p:cxnSp>
+        <p:sp>
+          <p:nvSpPr>
+            <p:cNvPr id="8" name="TextBox 7"/>
+            <p:cNvSpPr txBox="1"/>
+            <p:nvPr/>
+          </p:nvSpPr>
+          <p:spPr>
+            <a:xfrm>
+              <a:off x="7049729" y="365126"/>
+              <a:ext cx="2313584" cy="369332"/>
+            </a:xfrm>
+            <a:prstGeom prst="rect">
+              <a:avLst/>
+            </a:prstGeom>
+            <a:solidFill>
+              <a:schemeClr val="tx1"/>
+            </a:solidFill>
+          </p:spPr>
+          <p:txBody>
+            <a:bodyPr wrap="square" rtlCol="0">
+              <a:spAutoFit/>
+            </a:bodyPr>
+            <a:lstStyle/>
+            <a:p>
+              <a:r>
+                <a:rPr lang="en-US" b="1" dirty="0" smtClean="0">
+                  <a:solidFill>
+                    <a:schemeClr val="bg2"/>
+                  </a:solidFill>
+                </a:rPr>
+                <a:t>'1.5', '2.3', 'alpha'</a:t>
+              </a:r>
+              <a:endParaRPr lang="en-US" b="1" dirty="0">
+                <a:solidFill>
+                  <a:schemeClr val="bg2"/>
+                </a:solidFill>
+              </a:endParaRPr>
+            </a:p>
+          </p:txBody>
+        </p:sp>
+      </p:grpSp>
+    </p:spTree>
+    <p:extLst>
+      <p:ext uri="{BB962C8B-B14F-4D97-AF65-F5344CB8AC3E}">
+        <p14:creationId xmlns:p14="http://schemas.microsoft.com/office/powerpoint/2010/main" val="1593983014"/>
+      </p:ext>
+    </p:extLst>
+  </p:cSld>
+  <p:clrMapOvr>
+    <a:masterClrMapping/>
+  </p:clrMapOvr>
+  <p:timing>
+    <p:tnLst>
+      <p:par>
+        <p:cTn id="1" dur="indefinite" restart="never" nodeType="tmRoot">
+          <p:childTnLst>
+            <p:seq concurrent="1" nextAc="seek">
+              <p:cTn id="2" dur="indefinite" nodeType="mainSeq">
+                <p:childTnLst>
+                  <p:par>
+                    <p:cTn id="3" fill="hold">
+                      <p:stCondLst>
+                        <p:cond delay="indefinite"/>
+                        <p:cond evt="onBegin" delay="0">
+                          <p:tn val="2"/>
+                        </p:cond>
+                      </p:stCondLst>
+                      <p:childTnLst>
+                        <p:par>
+                          <p:cTn id="4" fill="hold">
+                            <p:stCondLst>
+                              <p:cond delay="0"/>
+                            </p:stCondLst>
+                            <p:childTnLst>
+                              <p:par>
+                                <p:cTn id="5" presetID="1" presetClass="entr" presetSubtype="0" fill="hold" grpId="0" nodeType="withEffect">
+                                  <p:stCondLst>
+                                    <p:cond delay="0"/>
+                                  </p:stCondLst>
+                                  <p:childTnLst>
+                                    <p:set>
+                                      <p:cBhvr>
+                                        <p:cTn id="6" dur="1" fill="hold">
+                                          <p:stCondLst>
+                                            <p:cond delay="0"/>
+                                          </p:stCondLst>
+                                        </p:cTn>
+                                        <p:tgtEl>
+                                          <p:spTgt spid="5"/>
+                                        </p:tgtEl>
+                                        <p:attrNameLst>
+                                          <p:attrName>style.visibility</p:attrName>
+                                        </p:attrNameLst>
+                                      </p:cBhvr>
+                                      <p:to>
+                                        <p:strVal val="visible"/>
+                                      </p:to>
+                                    </p:set>
+                                  </p:childTnLst>
+                                </p:cTn>
+                              </p:par>
+                            </p:childTnLst>
+                          </p:cTn>
+                        </p:par>
+                      </p:childTnLst>
+                    </p:cTn>
+                  </p:par>
+                  <p:par>
+                    <p:cTn id="7" fill="hold">
+                      <p:stCondLst>
+                        <p:cond delay="indefinite"/>
+                      </p:stCondLst>
+                      <p:childTnLst>
+                        <p:par>
+                          <p:cTn id="8" fill="hold">
+                            <p:stCondLst>
+                              <p:cond delay="0"/>
+                            </p:stCondLst>
+                            <p:childTnLst>
+                              <p:par>
+                                <p:cTn id="9" presetID="1" presetClass="entr" presetSubtype="0" fill="hold" nodeType="clickEffect">
+                                  <p:stCondLst>
+                                    <p:cond delay="0"/>
+                                  </p:stCondLst>
+                                  <p:childTnLst>
+                                    <p:set>
+                                      <p:cBhvr>
+                                        <p:cTn id="10" dur="1" fill="hold">
+                                          <p:stCondLst>
+                                            <p:cond delay="0"/>
+                                          </p:stCondLst>
+                                        </p:cTn>
+                                        <p:tgtEl>
+                                          <p:spTgt spid="6"/>
+                                        </p:tgtEl>
+                                        <p:attrNameLst>
+                                          <p:attrName>style.visibility</p:attrName>
+                                        </p:attrNameLst>
+                                      </p:cBhvr>
+                                      <p:to>
+                                        <p:strVal val="visible"/>
+                                      </p:to>
+                                    </p:set>
+                                  </p:childTnLst>
+                                </p:cTn>
+                              </p:par>
+                            </p:childTnLst>
+                          </p:cTn>
+                        </p:par>
+                      </p:childTnLst>
+                    </p:cTn>
+                  </p:par>
+                </p:childTnLst>
+              </p:cTn>
+              <p:prevCondLst>
+                <p:cond evt="onPrev" delay="0">
+                  <p:tgtEl>
+                    <p:sldTgt/>
+                  </p:tgtEl>
+                </p:cond>
+              </p:prevCondLst>
+              <p:nextCondLst>
+                <p:cond evt="onNext" delay="0">
+                  <p:tgtEl>
+                    <p:sldTgt/>
+                  </p:tgtEl>
+                </p:cond>
+              </p:nextCondLst>
+            </p:seq>
+          </p:childTnLst>
+        </p:cTn>
+      </p:par>
+    </p:tnLst>
+    <p:bldLst>
+      <p:bldP spid="5" grpId="0" animBg="1"/>
+    </p:bldLst>
+  </p:timing>
+</p:sld>
+</file>
+
+<file path=ppt/slides/slide17.xml><?xml version="1.0" encoding="utf-8"?>
+<p:sld xmlns:a="http://schemas.openxmlformats.org/drawingml/2006/main" xmlns:r="http://schemas.openxmlformats.org/officeDocument/2006/relationships" xmlns:p="http://schemas.openxmlformats.org/presentationml/2006/main">
+  <p:cSld>
+    <p:spTree>
+      <p:nvGrpSpPr>
+        <p:cNvPr id="1" name=""/>
+        <p:cNvGrpSpPr/>
+        <p:nvPr/>
+      </p:nvGrpSpPr>
+      <p:grpSpPr>
+        <a:xfrm>
+          <a:off x="0" y="0"/>
+          <a:ext cx="0" cy="0"/>
+          <a:chOff x="0" y="0"/>
+          <a:chExt cx="0" cy="0"/>
+        </a:xfrm>
+      </p:grpSpPr>
+      <p:sp>
+        <p:nvSpPr>
+          <p:cNvPr id="2" name="Title 1"/>
+          <p:cNvSpPr>
+            <a:spLocks noGrp="1"/>
+          </p:cNvSpPr>
+          <p:nvPr>
+            <p:ph type="title"/>
+          </p:nvPr>
+        </p:nvSpPr>
+        <p:spPr/>
+        <p:txBody>
+          <a:bodyPr/>
+          <a:lstStyle/>
+          <a:p>
+            <a:r>
+              <a:rPr lang="en-US" dirty="0" smtClean="0"/>
               <a:t>What was left out/added?</a:t>
             </a:r>
             <a:endParaRPr lang="en-US" dirty="0"/>
@@ -6434,7 +8274,7 @@
           <a:p>
             <a:fld id="{9CEF4966-5219-4577-B301-14467D565841}" type="slidenum">
               <a:rPr lang="en-US" smtClean="0"/>
-              <a:t>14</a:t>
+              <a:t>17</a:t>
             </a:fld>
             <a:endParaRPr lang="en-US"/>
           </a:p>
@@ -6938,14 +8778,23 @@
                 <a:latin typeface="Courier New" pitchFamily="49" charset="0"/>
                 <a:cs typeface="Courier New" pitchFamily="49" charset="0"/>
               </a:rPr>
-              <a:t>{</a:t>
+              <a:t>{"hello"};</a:t>
+            </a:r>
+          </a:p>
+          <a:p>
+            <a:r>
+              <a:rPr lang="en-US" sz="1600" dirty="0" err="1" smtClean="0">
+                <a:latin typeface="Courier New" pitchFamily="49" charset="0"/>
+                <a:cs typeface="Courier New" pitchFamily="49" charset="0"/>
+              </a:rPr>
+              <a:t>str</a:t>
             </a:r>
             <a:r>
               <a:rPr lang="en-US" sz="1600" dirty="0" smtClean="0">
                 <a:latin typeface="Courier New" pitchFamily="49" charset="0"/>
                 <a:cs typeface="Courier New" pitchFamily="49" charset="0"/>
               </a:rPr>
-              <a:t>"hello"};</a:t>
+              <a:t> += " world!";</a:t>
             </a:r>
           </a:p>
           <a:p>
@@ -6954,6 +8803,87 @@
                 <a:latin typeface="Courier New" pitchFamily="49" charset="0"/>
                 <a:cs typeface="Courier New" pitchFamily="49" charset="0"/>
               </a:rPr>
+              <a:t>cout</a:t>
+            </a:r>
+            <a:r>
+              <a:rPr lang="en-US" sz="1600" dirty="0" smtClean="0">
+                <a:latin typeface="Courier New" pitchFamily="49" charset="0"/>
+                <a:cs typeface="Courier New" pitchFamily="49" charset="0"/>
+              </a:rPr>
+              <a:t> &lt;&lt; </a:t>
+            </a:r>
+            <a:r>
+              <a:rPr lang="en-US" sz="1600" dirty="0" err="1" smtClean="0">
+                <a:latin typeface="Courier New" pitchFamily="49" charset="0"/>
+                <a:cs typeface="Courier New" pitchFamily="49" charset="0"/>
+              </a:rPr>
+              <a:t>str.substr</a:t>
+            </a:r>
+            <a:r>
+              <a:rPr lang="en-US" sz="1600" dirty="0" smtClean="0">
+                <a:latin typeface="Courier New" pitchFamily="49" charset="0"/>
+                <a:cs typeface="Courier New" pitchFamily="49" charset="0"/>
+              </a:rPr>
+              <a:t>(6, 5) &lt;&lt; </a:t>
+            </a:r>
+            <a:r>
+              <a:rPr lang="en-US" sz="1600" dirty="0" err="1" smtClean="0">
+                <a:latin typeface="Courier New" pitchFamily="49" charset="0"/>
+                <a:cs typeface="Courier New" pitchFamily="49" charset="0"/>
+              </a:rPr>
+              <a:t>endl</a:t>
+            </a:r>
+            <a:r>
+              <a:rPr lang="en-US" sz="1600" dirty="0" smtClean="0">
+                <a:latin typeface="Courier New" pitchFamily="49" charset="0"/>
+                <a:cs typeface="Courier New" pitchFamily="49" charset="0"/>
+              </a:rPr>
+              <a:t>;</a:t>
+            </a:r>
+          </a:p>
+          <a:p>
+            <a:r>
+              <a:rPr lang="en-US" sz="1600" dirty="0" smtClean="0">
+                <a:latin typeface="Courier New" pitchFamily="49" charset="0"/>
+                <a:cs typeface="Courier New" pitchFamily="49" charset="0"/>
+              </a:rPr>
+              <a:t>auto </a:t>
+            </a:r>
+            <a:r>
+              <a:rPr lang="en-US" sz="1600" dirty="0" err="1" smtClean="0">
+                <a:latin typeface="Courier New" pitchFamily="49" charset="0"/>
+                <a:cs typeface="Courier New" pitchFamily="49" charset="0"/>
+              </a:rPr>
+              <a:t>pos</a:t>
+            </a:r>
+            <a:r>
+              <a:rPr lang="en-US" sz="1600" dirty="0" smtClean="0">
+                <a:latin typeface="Courier New" pitchFamily="49" charset="0"/>
+                <a:cs typeface="Courier New" pitchFamily="49" charset="0"/>
+              </a:rPr>
+              <a:t> = </a:t>
+            </a:r>
+            <a:r>
+              <a:rPr lang="en-US" sz="1600" dirty="0" err="1" smtClean="0">
+                <a:latin typeface="Courier New" pitchFamily="49" charset="0"/>
+                <a:cs typeface="Courier New" pitchFamily="49" charset="0"/>
+              </a:rPr>
+              <a:t>str.find</a:t>
+            </a:r>
+            <a:r>
+              <a:rPr lang="en-US" sz="1600" dirty="0" smtClean="0">
+                <a:latin typeface="Courier New" pitchFamily="49" charset="0"/>
+                <a:cs typeface="Courier New" pitchFamily="49" charset="0"/>
+              </a:rPr>
+              <a:t>("w");</a:t>
+            </a:r>
+          </a:p>
+          <a:p>
+            <a:r>
+              <a:rPr lang="en-US" sz="1600" dirty="0" err="1" smtClean="0">
+                <a:latin typeface="Courier New" pitchFamily="49" charset="0"/>
+                <a:cs typeface="Courier New" pitchFamily="49" charset="0"/>
+              </a:rPr>
               <a:t>str</a:t>
             </a:r>
             <a:r>
@@ -6961,15 +8891,87 @@
                 <a:latin typeface="Courier New" pitchFamily="49" charset="0"/>
                 <a:cs typeface="Courier New" pitchFamily="49" charset="0"/>
               </a:rPr>
-              <a:t> += " world!";</a:t>
-            </a:r>
-          </a:p>
-          <a:p>
+              <a:t>[</a:t>
+            </a:r>
             <a:r>
               <a:rPr lang="en-US" sz="1600" dirty="0" err="1" smtClean="0">
                 <a:latin typeface="Courier New" pitchFamily="49" charset="0"/>
                 <a:cs typeface="Courier New" pitchFamily="49" charset="0"/>
               </a:rPr>
+              <a:t>pos</a:t>
+            </a:r>
+            <a:r>
+              <a:rPr lang="en-US" sz="1600" dirty="0" smtClean="0">
+                <a:latin typeface="Courier New" pitchFamily="49" charset="0"/>
+                <a:cs typeface="Courier New" pitchFamily="49" charset="0"/>
+              </a:rPr>
+              <a:t>] = </a:t>
+            </a:r>
+            <a:r>
+              <a:rPr lang="en-US" sz="1600" dirty="0" err="1" smtClean="0">
+                <a:latin typeface="Courier New" pitchFamily="49" charset="0"/>
+                <a:cs typeface="Courier New" pitchFamily="49" charset="0"/>
+              </a:rPr>
+              <a:t>toupper</a:t>
+            </a:r>
+            <a:r>
+              <a:rPr lang="en-US" sz="1600" dirty="0" smtClean="0">
+                <a:latin typeface="Courier New" pitchFamily="49" charset="0"/>
+                <a:cs typeface="Courier New" pitchFamily="49" charset="0"/>
+              </a:rPr>
+              <a:t>(</a:t>
+            </a:r>
+            <a:r>
+              <a:rPr lang="en-US" sz="1600" dirty="0" err="1" smtClean="0">
+                <a:latin typeface="Courier New" pitchFamily="49" charset="0"/>
+                <a:cs typeface="Courier New" pitchFamily="49" charset="0"/>
+              </a:rPr>
+              <a:t>str</a:t>
+            </a:r>
+            <a:r>
+              <a:rPr lang="en-US" sz="1600" dirty="0" smtClean="0">
+                <a:latin typeface="Courier New" pitchFamily="49" charset="0"/>
+                <a:cs typeface="Courier New" pitchFamily="49" charset="0"/>
+              </a:rPr>
+              <a:t>[</a:t>
+            </a:r>
+            <a:r>
+              <a:rPr lang="en-US" sz="1600" dirty="0" err="1" smtClean="0">
+                <a:latin typeface="Courier New" pitchFamily="49" charset="0"/>
+                <a:cs typeface="Courier New" pitchFamily="49" charset="0"/>
+              </a:rPr>
+              <a:t>pos</a:t>
+            </a:r>
+            <a:r>
+              <a:rPr lang="en-US" sz="1600" dirty="0" smtClean="0">
+                <a:latin typeface="Courier New" pitchFamily="49" charset="0"/>
+                <a:cs typeface="Courier New" pitchFamily="49" charset="0"/>
+              </a:rPr>
+              <a:t>]);</a:t>
+            </a:r>
+          </a:p>
+          <a:p>
+            <a:r>
+              <a:rPr lang="en-US" sz="1600" dirty="0" err="1" smtClean="0">
+                <a:latin typeface="Courier New" pitchFamily="49" charset="0"/>
+                <a:cs typeface="Courier New" pitchFamily="49" charset="0"/>
+              </a:rPr>
+              <a:t>str.replace</a:t>
+            </a:r>
+            <a:r>
+              <a:rPr lang="en-US" sz="1600" dirty="0" smtClean="0">
+                <a:latin typeface="Courier New" pitchFamily="49" charset="0"/>
+                <a:cs typeface="Courier New" pitchFamily="49" charset="0"/>
+              </a:rPr>
+              <a:t>(0, 1, "H");</a:t>
+            </a:r>
+          </a:p>
+          <a:p>
+            <a:r>
+              <a:rPr lang="en-US" sz="1600" dirty="0" err="1" smtClean="0">
+                <a:latin typeface="Courier New" pitchFamily="49" charset="0"/>
+                <a:cs typeface="Courier New" pitchFamily="49" charset="0"/>
+              </a:rPr>
               <a:t>cout</a:t>
             </a:r>
             <a:r>
@@ -6984,14 +8986,14 @@
                 <a:latin typeface="Courier New" pitchFamily="49" charset="0"/>
                 <a:cs typeface="Courier New" pitchFamily="49" charset="0"/>
               </a:rPr>
-              <a:t>str.substr</a:t>
+              <a:t>str</a:t>
             </a:r>
             <a:r>
               <a:rPr lang="en-US" sz="1600" dirty="0" smtClean="0">
                 <a:latin typeface="Courier New" pitchFamily="49" charset="0"/>
                 <a:cs typeface="Courier New" pitchFamily="49" charset="0"/>
               </a:rPr>
-              <a:t>(6, 5) &lt;&lt; </a:t>
+              <a:t> &lt;&lt; </a:t>
             </a:r>
             <a:r>
               <a:rPr lang="en-US" sz="1600" dirty="0" err="1" smtClean="0">
@@ -7010,11 +9012,27 @@
           </a:p>
           <a:p>
             <a:r>
+              <a:rPr lang="en-US" sz="1600" dirty="0" err="1" smtClean="0">
+                <a:latin typeface="Courier New" pitchFamily="49" charset="0"/>
+                <a:cs typeface="Courier New" pitchFamily="49" charset="0"/>
+              </a:rPr>
+              <a:t>pos</a:t>
+            </a:r>
+            <a:r>
               <a:rPr lang="en-US" sz="1600" dirty="0" smtClean="0">
                 <a:latin typeface="Courier New" pitchFamily="49" charset="0"/>
                 <a:cs typeface="Courier New" pitchFamily="49" charset="0"/>
               </a:rPr>
-              <a:t>auto </a:t>
+              <a:t> = 0;</a:t>
+            </a:r>
+          </a:p>
+          <a:p>
+            <a:r>
+              <a:rPr lang="en-US" sz="1600" dirty="0" smtClean="0">
+                <a:latin typeface="Courier New" pitchFamily="49" charset="0"/>
+                <a:cs typeface="Courier New" pitchFamily="49" charset="0"/>
+              </a:rPr>
+              <a:t>while ((</a:t>
             </a:r>
             <a:r>
               <a:rPr lang="en-US" sz="1600" dirty="0" err="1" smtClean="0">
@@ -7042,375 +9060,186 @@
                 <a:latin typeface="Courier New" pitchFamily="49" charset="0"/>
                 <a:cs typeface="Courier New" pitchFamily="49" charset="0"/>
               </a:rPr>
-              <a:t>("w");</a:t>
-            </a:r>
-          </a:p>
-          <a:p>
+              <a:t>("o")) != string::</a:t>
+            </a:r>
             <a:r>
               <a:rPr lang="en-US" sz="1600" dirty="0" err="1" smtClean="0">
                 <a:latin typeface="Courier New" pitchFamily="49" charset="0"/>
                 <a:cs typeface="Courier New" pitchFamily="49" charset="0"/>
               </a:rPr>
+              <a:t>npos</a:t>
+            </a:r>
+            <a:r>
+              <a:rPr lang="en-US" sz="1600" dirty="0" smtClean="0">
+                <a:latin typeface="Courier New" pitchFamily="49" charset="0"/>
+                <a:cs typeface="Courier New" pitchFamily="49" charset="0"/>
+              </a:rPr>
+              <a:t>) {</a:t>
+            </a:r>
+          </a:p>
+          <a:p>
+            <a:r>
+              <a:rPr lang="en-US" sz="1600" dirty="0">
+                <a:latin typeface="Courier New" pitchFamily="49" charset="0"/>
+                <a:cs typeface="Courier New" pitchFamily="49" charset="0"/>
+              </a:rPr>
+              <a:t> </a:t>
+            </a:r>
+            <a:r>
+              <a:rPr lang="en-US" sz="1600" dirty="0" smtClean="0">
+                <a:latin typeface="Courier New" pitchFamily="49" charset="0"/>
+                <a:cs typeface="Courier New" pitchFamily="49" charset="0"/>
+              </a:rPr>
+              <a:t>   </a:t>
+            </a:r>
+            <a:r>
+              <a:rPr lang="en-US" sz="1600" dirty="0" err="1" smtClean="0">
+                <a:latin typeface="Courier New" pitchFamily="49" charset="0"/>
+                <a:cs typeface="Courier New" pitchFamily="49" charset="0"/>
+              </a:rPr>
+              <a:t>cout</a:t>
+            </a:r>
+            <a:r>
+              <a:rPr lang="en-US" sz="1600" dirty="0" smtClean="0">
+                <a:latin typeface="Courier New" pitchFamily="49" charset="0"/>
+                <a:cs typeface="Courier New" pitchFamily="49" charset="0"/>
+              </a:rPr>
+              <a:t> &lt;&lt; "found at " &lt;&lt; </a:t>
+            </a:r>
+            <a:r>
+              <a:rPr lang="en-US" sz="1600" dirty="0" err="1" smtClean="0">
+                <a:latin typeface="Courier New" pitchFamily="49" charset="0"/>
+                <a:cs typeface="Courier New" pitchFamily="49" charset="0"/>
+              </a:rPr>
+              <a:t>pos</a:t>
+            </a:r>
+            <a:r>
+              <a:rPr lang="en-US" sz="1600" dirty="0" smtClean="0">
+                <a:latin typeface="Courier New" pitchFamily="49" charset="0"/>
+                <a:cs typeface="Courier New" pitchFamily="49" charset="0"/>
+              </a:rPr>
+              <a:t> &lt;&lt; </a:t>
+            </a:r>
+            <a:r>
+              <a:rPr lang="en-US" sz="1600" dirty="0" err="1" smtClean="0">
+                <a:latin typeface="Courier New" pitchFamily="49" charset="0"/>
+                <a:cs typeface="Courier New" pitchFamily="49" charset="0"/>
+              </a:rPr>
+              <a:t>endl</a:t>
+            </a:r>
+            <a:r>
+              <a:rPr lang="en-US" sz="1600" dirty="0" smtClean="0">
+                <a:latin typeface="Courier New" pitchFamily="49" charset="0"/>
+                <a:cs typeface="Courier New" pitchFamily="49" charset="0"/>
+              </a:rPr>
+              <a:t>;</a:t>
+            </a:r>
+          </a:p>
+          <a:p>
+            <a:r>
+              <a:rPr lang="en-US" sz="1600" dirty="0">
+                <a:latin typeface="Courier New" pitchFamily="49" charset="0"/>
+                <a:cs typeface="Courier New" pitchFamily="49" charset="0"/>
+              </a:rPr>
+              <a:t> </a:t>
+            </a:r>
+            <a:r>
+              <a:rPr lang="en-US" sz="1600" dirty="0" smtClean="0">
+                <a:latin typeface="Courier New" pitchFamily="49" charset="0"/>
+                <a:cs typeface="Courier New" pitchFamily="49" charset="0"/>
+              </a:rPr>
+              <a:t>   </a:t>
+            </a:r>
+            <a:r>
+              <a:rPr lang="en-US" sz="1600" dirty="0" err="1" smtClean="0">
+                <a:latin typeface="Courier New" pitchFamily="49" charset="0"/>
+                <a:cs typeface="Courier New" pitchFamily="49" charset="0"/>
+              </a:rPr>
+              <a:t>pos</a:t>
+            </a:r>
+            <a:r>
+              <a:rPr lang="en-US" sz="1600" dirty="0" smtClean="0">
+                <a:latin typeface="Courier New" pitchFamily="49" charset="0"/>
+                <a:cs typeface="Courier New" pitchFamily="49" charset="0"/>
+              </a:rPr>
+              <a:t>++;</a:t>
+            </a:r>
+          </a:p>
+          <a:p>
+            <a:r>
+              <a:rPr lang="en-US" sz="1600" dirty="0" smtClean="0">
+                <a:latin typeface="Courier New" pitchFamily="49" charset="0"/>
+                <a:cs typeface="Courier New" pitchFamily="49" charset="0"/>
+              </a:rPr>
+              <a:t>}</a:t>
+            </a:r>
+          </a:p>
+          <a:p>
+            <a:r>
+              <a:rPr lang="en-US" sz="1600" dirty="0" err="1" smtClean="0">
+                <a:latin typeface="Courier New" pitchFamily="49" charset="0"/>
+                <a:cs typeface="Courier New" pitchFamily="49" charset="0"/>
+              </a:rPr>
+              <a:t>str.insert</a:t>
+            </a:r>
+            <a:r>
+              <a:rPr lang="en-US" sz="1600" dirty="0" smtClean="0">
+                <a:latin typeface="Courier New" pitchFamily="49" charset="0"/>
+                <a:cs typeface="Courier New" pitchFamily="49" charset="0"/>
+              </a:rPr>
+              <a:t>(6, "Beautiful ");</a:t>
+            </a:r>
+          </a:p>
+          <a:p>
+            <a:r>
+              <a:rPr lang="en-US" sz="1600" dirty="0" err="1" smtClean="0">
+                <a:latin typeface="Courier New" pitchFamily="49" charset="0"/>
+                <a:cs typeface="Courier New" pitchFamily="49" charset="0"/>
+              </a:rPr>
+              <a:t>cout</a:t>
+            </a:r>
+            <a:r>
+              <a:rPr lang="en-US" sz="1600" dirty="0" smtClean="0">
+                <a:latin typeface="Courier New" pitchFamily="49" charset="0"/>
+                <a:cs typeface="Courier New" pitchFamily="49" charset="0"/>
+              </a:rPr>
+              <a:t> &lt;&lt; </a:t>
+            </a:r>
+            <a:r>
+              <a:rPr lang="en-US" sz="1600" dirty="0" err="1" smtClean="0">
+                <a:latin typeface="Courier New" pitchFamily="49" charset="0"/>
+                <a:cs typeface="Courier New" pitchFamily="49" charset="0"/>
+              </a:rPr>
               <a:t>str</a:t>
             </a:r>
             <a:r>
+              <a:rPr lang="en-US" sz="1600" dirty="0">
+                <a:latin typeface="Courier New" pitchFamily="49" charset="0"/>
+                <a:cs typeface="Courier New" pitchFamily="49" charset="0"/>
+              </a:rPr>
+              <a:t> </a:t>
+            </a:r>
+            <a:r>
               <a:rPr lang="en-US" sz="1600" dirty="0" smtClean="0">
                 <a:latin typeface="Courier New" pitchFamily="49" charset="0"/>
                 <a:cs typeface="Courier New" pitchFamily="49" charset="0"/>
               </a:rPr>
-              <a:t>[</a:t>
+              <a:t>&lt;&lt; </a:t>
             </a:r>
             <a:r>
               <a:rPr lang="en-US" sz="1600" dirty="0" err="1" smtClean="0">
                 <a:latin typeface="Courier New" pitchFamily="49" charset="0"/>
                 <a:cs typeface="Courier New" pitchFamily="49" charset="0"/>
               </a:rPr>
-              <a:t>pos</a:t>
+              <a:t>endl</a:t>
             </a:r>
             <a:r>
               <a:rPr lang="en-US" sz="1600" dirty="0" smtClean="0">
                 <a:latin typeface="Courier New" pitchFamily="49" charset="0"/>
                 <a:cs typeface="Courier New" pitchFamily="49" charset="0"/>
               </a:rPr>
-              <a:t>] = </a:t>
-            </a:r>
-            <a:r>
-              <a:rPr lang="en-US" sz="1600" dirty="0" err="1" smtClean="0">
-                <a:latin typeface="Courier New" pitchFamily="49" charset="0"/>
-                <a:cs typeface="Courier New" pitchFamily="49" charset="0"/>
-              </a:rPr>
-              <a:t>toupper</a:t>
-            </a:r>
-            <a:r>
-              <a:rPr lang="en-US" sz="1600" dirty="0" smtClean="0">
-                <a:latin typeface="Courier New" pitchFamily="49" charset="0"/>
-                <a:cs typeface="Courier New" pitchFamily="49" charset="0"/>
-              </a:rPr>
-              <a:t>(</a:t>
-            </a:r>
-            <a:r>
-              <a:rPr lang="en-US" sz="1600" dirty="0" err="1" smtClean="0">
-                <a:latin typeface="Courier New" pitchFamily="49" charset="0"/>
-                <a:cs typeface="Courier New" pitchFamily="49" charset="0"/>
-              </a:rPr>
-              <a:t>str</a:t>
-            </a:r>
-            <a:r>
-              <a:rPr lang="en-US" sz="1600" dirty="0" smtClean="0">
-                <a:latin typeface="Courier New" pitchFamily="49" charset="0"/>
-                <a:cs typeface="Courier New" pitchFamily="49" charset="0"/>
-              </a:rPr>
-              <a:t>[</a:t>
-            </a:r>
-            <a:r>
-              <a:rPr lang="en-US" sz="1600" dirty="0" err="1" smtClean="0">
-                <a:latin typeface="Courier New" pitchFamily="49" charset="0"/>
-                <a:cs typeface="Courier New" pitchFamily="49" charset="0"/>
-              </a:rPr>
-              <a:t>pos</a:t>
-            </a:r>
-            <a:r>
-              <a:rPr lang="en-US" sz="1600" dirty="0" smtClean="0">
-                <a:latin typeface="Courier New" pitchFamily="49" charset="0"/>
-                <a:cs typeface="Courier New" pitchFamily="49" charset="0"/>
-              </a:rPr>
-              <a:t>]);</a:t>
-            </a:r>
-          </a:p>
-          <a:p>
-            <a:r>
-              <a:rPr lang="en-US" sz="1600" dirty="0" err="1" smtClean="0">
-                <a:latin typeface="Courier New" pitchFamily="49" charset="0"/>
-                <a:cs typeface="Courier New" pitchFamily="49" charset="0"/>
-              </a:rPr>
-              <a:t>str.replace</a:t>
-            </a:r>
-            <a:r>
-              <a:rPr lang="en-US" sz="1600" dirty="0" smtClean="0">
-                <a:latin typeface="Courier New" pitchFamily="49" charset="0"/>
-                <a:cs typeface="Courier New" pitchFamily="49" charset="0"/>
-              </a:rPr>
-              <a:t>(0, 1, "H");</a:t>
-            </a:r>
-          </a:p>
-          <a:p>
-            <a:r>
-              <a:rPr lang="en-US" sz="1600" dirty="0" err="1" smtClean="0">
-                <a:latin typeface="Courier New" pitchFamily="49" charset="0"/>
-                <a:cs typeface="Courier New" pitchFamily="49" charset="0"/>
-              </a:rPr>
-              <a:t>cout</a:t>
-            </a:r>
-            <a:r>
-              <a:rPr lang="en-US" sz="1600" dirty="0" smtClean="0">
-                <a:latin typeface="Courier New" pitchFamily="49" charset="0"/>
-                <a:cs typeface="Courier New" pitchFamily="49" charset="0"/>
-              </a:rPr>
-              <a:t> &lt;&lt; </a:t>
-            </a:r>
-            <a:r>
-              <a:rPr lang="en-US" sz="1600" dirty="0" err="1" smtClean="0">
-                <a:latin typeface="Courier New" pitchFamily="49" charset="0"/>
-                <a:cs typeface="Courier New" pitchFamily="49" charset="0"/>
-              </a:rPr>
-              <a:t>str</a:t>
-            </a:r>
-            <a:r>
-              <a:rPr lang="en-US" sz="1600" dirty="0" smtClean="0">
-                <a:latin typeface="Courier New" pitchFamily="49" charset="0"/>
-                <a:cs typeface="Courier New" pitchFamily="49" charset="0"/>
-              </a:rPr>
-              <a:t> &lt;&lt; </a:t>
-            </a:r>
-            <a:r>
-              <a:rPr lang="en-US" sz="1600" dirty="0" err="1" smtClean="0">
-                <a:latin typeface="Courier New" pitchFamily="49" charset="0"/>
-                <a:cs typeface="Courier New" pitchFamily="49" charset="0"/>
-              </a:rPr>
-              <a:t>endl</a:t>
-            </a:r>
-            <a:r>
-              <a:rPr lang="en-US" sz="1600" dirty="0" smtClean="0">
-                <a:latin typeface="Courier New" pitchFamily="49" charset="0"/>
-                <a:cs typeface="Courier New" pitchFamily="49" charset="0"/>
-              </a:rPr>
               <a:t>;</a:t>
             </a:r>
-          </a:p>
-          <a:p>
-            <a:r>
-              <a:rPr lang="en-US" sz="1600" dirty="0" err="1" smtClean="0">
-                <a:latin typeface="Courier New" pitchFamily="49" charset="0"/>
-                <a:cs typeface="Courier New" pitchFamily="49" charset="0"/>
-              </a:rPr>
-              <a:t>pos</a:t>
-            </a:r>
-            <a:r>
-              <a:rPr lang="en-US" sz="1600" dirty="0" smtClean="0">
-                <a:latin typeface="Courier New" pitchFamily="49" charset="0"/>
-                <a:cs typeface="Courier New" pitchFamily="49" charset="0"/>
-              </a:rPr>
-              <a:t> = 0;</a:t>
-            </a:r>
-          </a:p>
-          <a:p>
-            <a:r>
-              <a:rPr lang="en-US" sz="1600" dirty="0" smtClean="0">
-                <a:latin typeface="Courier New" pitchFamily="49" charset="0"/>
-                <a:cs typeface="Courier New" pitchFamily="49" charset="0"/>
-              </a:rPr>
-              <a:t>while ((</a:t>
-            </a:r>
-            <a:r>
-              <a:rPr lang="en-US" sz="1600" dirty="0" err="1" smtClean="0">
-                <a:latin typeface="Courier New" pitchFamily="49" charset="0"/>
-                <a:cs typeface="Courier New" pitchFamily="49" charset="0"/>
-              </a:rPr>
-              <a:t>pos</a:t>
-            </a:r>
-            <a:r>
-              <a:rPr lang="en-US" sz="1600" dirty="0" smtClean="0">
-                <a:latin typeface="Courier New" pitchFamily="49" charset="0"/>
-                <a:cs typeface="Courier New" pitchFamily="49" charset="0"/>
-              </a:rPr>
-              <a:t> = </a:t>
-            </a:r>
-            <a:r>
-              <a:rPr lang="en-US" sz="1600" dirty="0" err="1" smtClean="0">
-                <a:latin typeface="Courier New" pitchFamily="49" charset="0"/>
-                <a:cs typeface="Courier New" pitchFamily="49" charset="0"/>
-              </a:rPr>
-              <a:t>str.find</a:t>
-            </a:r>
-            <a:r>
-              <a:rPr lang="en-US" sz="1600" dirty="0" smtClean="0">
-                <a:latin typeface="Courier New" pitchFamily="49" charset="0"/>
-                <a:cs typeface="Courier New" pitchFamily="49" charset="0"/>
-              </a:rPr>
-              <a:t>("o")) != string::</a:t>
-            </a:r>
-            <a:r>
-              <a:rPr lang="en-US" sz="1600" dirty="0" err="1" smtClean="0">
-                <a:latin typeface="Courier New" pitchFamily="49" charset="0"/>
-                <a:cs typeface="Courier New" pitchFamily="49" charset="0"/>
-              </a:rPr>
-              <a:t>npos</a:t>
-            </a:r>
-            <a:r>
-              <a:rPr lang="en-US" sz="1600" dirty="0" smtClean="0">
-                <a:latin typeface="Courier New" pitchFamily="49" charset="0"/>
-                <a:cs typeface="Courier New" pitchFamily="49" charset="0"/>
-              </a:rPr>
-              <a:t>) {</a:t>
-            </a:r>
-          </a:p>
-          <a:p>
-            <a:r>
-              <a:rPr lang="en-US" sz="1600" dirty="0">
-                <a:latin typeface="Courier New" pitchFamily="49" charset="0"/>
-                <a:cs typeface="Courier New" pitchFamily="49" charset="0"/>
-              </a:rPr>
-              <a:t> </a:t>
-            </a:r>
-            <a:r>
-              <a:rPr lang="en-US" sz="1600" dirty="0" smtClean="0">
-                <a:latin typeface="Courier New" pitchFamily="49" charset="0"/>
-                <a:cs typeface="Courier New" pitchFamily="49" charset="0"/>
-              </a:rPr>
-              <a:t>   </a:t>
-            </a:r>
-            <a:r>
-              <a:rPr lang="en-US" sz="1600" dirty="0" err="1" smtClean="0">
-                <a:latin typeface="Courier New" pitchFamily="49" charset="0"/>
-                <a:cs typeface="Courier New" pitchFamily="49" charset="0"/>
-              </a:rPr>
-              <a:t>cout</a:t>
-            </a:r>
-            <a:r>
-              <a:rPr lang="en-US" sz="1600" dirty="0" smtClean="0">
-                <a:latin typeface="Courier New" pitchFamily="49" charset="0"/>
-                <a:cs typeface="Courier New" pitchFamily="49" charset="0"/>
-              </a:rPr>
-              <a:t> &lt;&lt; "found at " &lt;&lt; </a:t>
-            </a:r>
-            <a:r>
-              <a:rPr lang="en-US" sz="1600" dirty="0" err="1" smtClean="0">
-                <a:latin typeface="Courier New" pitchFamily="49" charset="0"/>
-                <a:cs typeface="Courier New" pitchFamily="49" charset="0"/>
-              </a:rPr>
-              <a:t>pos</a:t>
-            </a:r>
-            <a:r>
-              <a:rPr lang="en-US" sz="1600" dirty="0" smtClean="0">
-                <a:latin typeface="Courier New" pitchFamily="49" charset="0"/>
-                <a:cs typeface="Courier New" pitchFamily="49" charset="0"/>
-              </a:rPr>
-              <a:t> &lt;&lt; </a:t>
-            </a:r>
-            <a:r>
-              <a:rPr lang="en-US" sz="1600" dirty="0" err="1" smtClean="0">
-                <a:latin typeface="Courier New" pitchFamily="49" charset="0"/>
-                <a:cs typeface="Courier New" pitchFamily="49" charset="0"/>
-              </a:rPr>
-              <a:t>endl</a:t>
-            </a:r>
-            <a:r>
-              <a:rPr lang="en-US" sz="1600" dirty="0" smtClean="0">
-                <a:latin typeface="Courier New" pitchFamily="49" charset="0"/>
-                <a:cs typeface="Courier New" pitchFamily="49" charset="0"/>
-              </a:rPr>
-              <a:t>;</a:t>
-            </a:r>
-          </a:p>
-          <a:p>
-            <a:r>
-              <a:rPr lang="en-US" sz="1600" dirty="0">
-                <a:latin typeface="Courier New" pitchFamily="49" charset="0"/>
-                <a:cs typeface="Courier New" pitchFamily="49" charset="0"/>
-              </a:rPr>
-              <a:t> </a:t>
-            </a:r>
-            <a:r>
-              <a:rPr lang="en-US" sz="1600" dirty="0" smtClean="0">
-                <a:latin typeface="Courier New" pitchFamily="49" charset="0"/>
-                <a:cs typeface="Courier New" pitchFamily="49" charset="0"/>
-              </a:rPr>
-              <a:t>   </a:t>
-            </a:r>
-            <a:r>
-              <a:rPr lang="en-US" sz="1600" dirty="0" err="1" smtClean="0">
-                <a:latin typeface="Courier New" pitchFamily="49" charset="0"/>
-                <a:cs typeface="Courier New" pitchFamily="49" charset="0"/>
-              </a:rPr>
-              <a:t>pos</a:t>
-            </a:r>
-            <a:r>
-              <a:rPr lang="en-US" sz="1600" dirty="0" smtClean="0">
-                <a:latin typeface="Courier New" pitchFamily="49" charset="0"/>
-                <a:cs typeface="Courier New" pitchFamily="49" charset="0"/>
-              </a:rPr>
-              <a:t>++;</a:t>
-            </a:r>
-          </a:p>
-          <a:p>
-            <a:r>
-              <a:rPr lang="en-US" sz="1600" dirty="0" smtClean="0">
-                <a:latin typeface="Courier New" pitchFamily="49" charset="0"/>
-                <a:cs typeface="Courier New" pitchFamily="49" charset="0"/>
-              </a:rPr>
-              <a:t>}</a:t>
-            </a:r>
-          </a:p>
-          <a:p>
-            <a:r>
-              <a:rPr lang="en-US" sz="1600" dirty="0" err="1" smtClean="0">
-                <a:latin typeface="Courier New" pitchFamily="49" charset="0"/>
-                <a:cs typeface="Courier New" pitchFamily="49" charset="0"/>
-              </a:rPr>
-              <a:t>str.insert</a:t>
-            </a:r>
-            <a:r>
-              <a:rPr lang="en-US" sz="1600" dirty="0" smtClean="0">
-                <a:latin typeface="Courier New" pitchFamily="49" charset="0"/>
-                <a:cs typeface="Courier New" pitchFamily="49" charset="0"/>
-              </a:rPr>
-              <a:t>(6, "Beautiful ");</a:t>
-            </a:r>
-          </a:p>
-          <a:p>
-            <a:r>
-              <a:rPr lang="en-US" sz="1600" dirty="0" err="1" smtClean="0">
-                <a:latin typeface="Courier New" pitchFamily="49" charset="0"/>
-                <a:cs typeface="Courier New" pitchFamily="49" charset="0"/>
-              </a:rPr>
-              <a:t>cout</a:t>
-            </a:r>
-            <a:r>
-              <a:rPr lang="en-US" sz="1600" dirty="0" smtClean="0">
-                <a:latin typeface="Courier New" pitchFamily="49" charset="0"/>
-                <a:cs typeface="Courier New" pitchFamily="49" charset="0"/>
-              </a:rPr>
-              <a:t> &lt;&lt; </a:t>
-            </a:r>
-            <a:r>
-              <a:rPr lang="en-US" sz="1600" dirty="0" err="1" smtClean="0">
-                <a:latin typeface="Courier New" pitchFamily="49" charset="0"/>
-                <a:cs typeface="Courier New" pitchFamily="49" charset="0"/>
-              </a:rPr>
-              <a:t>str</a:t>
-            </a:r>
-            <a:r>
-              <a:rPr lang="en-US" sz="1600" dirty="0">
-                <a:latin typeface="Courier New" pitchFamily="49" charset="0"/>
-                <a:cs typeface="Courier New" pitchFamily="49" charset="0"/>
-              </a:rPr>
-              <a:t> </a:t>
-            </a:r>
-            <a:r>
-              <a:rPr lang="en-US" sz="1600" dirty="0" smtClean="0">
-                <a:latin typeface="Courier New" pitchFamily="49" charset="0"/>
-                <a:cs typeface="Courier New" pitchFamily="49" charset="0"/>
-              </a:rPr>
-              <a:t>&lt;&lt; </a:t>
-            </a:r>
-            <a:r>
-              <a:rPr lang="en-US" sz="1600" dirty="0" err="1" smtClean="0">
-                <a:latin typeface="Courier New" pitchFamily="49" charset="0"/>
-                <a:cs typeface="Courier New" pitchFamily="49" charset="0"/>
-              </a:rPr>
-              <a:t>endl</a:t>
-            </a:r>
-            <a:r>
-              <a:rPr lang="en-US" sz="1600" dirty="0" smtClean="0">
-                <a:latin typeface="Courier New" pitchFamily="49" charset="0"/>
-                <a:cs typeface="Courier New" pitchFamily="49" charset="0"/>
-              </a:rPr>
-              <a:t>;</a:t>
-            </a:r>
-            <a:endParaRPr lang="en-US" sz="1600" dirty="0" smtClean="0">
-              <a:latin typeface="Courier New" pitchFamily="49" charset="0"/>
-              <a:cs typeface="Courier New" pitchFamily="49" charset="0"/>
-            </a:endParaRPr>
           </a:p>
         </p:txBody>
       </p:sp>

</xml_diff>

<commit_message>
Added slide on C-style strings
</commit_message>
<xml_diff>
--- a/CPlusPlus/06_essential_cpp_regex.pptx
+++ b/CPlusPlus/06_essential_cpp_regex.pptx
@@ -5,26 +5,27 @@
     <p:sldMasterId id="2147483660" r:id="rId1"/>
   </p:sldMasterIdLst>
   <p:notesMasterIdLst>
-    <p:notesMasterId r:id="rId19"/>
+    <p:notesMasterId r:id="rId20"/>
   </p:notesMasterIdLst>
   <p:sldIdLst>
     <p:sldId id="257" r:id="rId2"/>
     <p:sldId id="258" r:id="rId3"/>
     <p:sldId id="259" r:id="rId4"/>
-    <p:sldId id="262" r:id="rId5"/>
-    <p:sldId id="263" r:id="rId6"/>
-    <p:sldId id="264" r:id="rId7"/>
-    <p:sldId id="265" r:id="rId8"/>
-    <p:sldId id="266" r:id="rId9"/>
-    <p:sldId id="267" r:id="rId10"/>
-    <p:sldId id="268" r:id="rId11"/>
-    <p:sldId id="269" r:id="rId12"/>
-    <p:sldId id="270" r:id="rId13"/>
-    <p:sldId id="261" r:id="rId14"/>
-    <p:sldId id="271" r:id="rId15"/>
-    <p:sldId id="272" r:id="rId16"/>
-    <p:sldId id="273" r:id="rId17"/>
-    <p:sldId id="260" r:id="rId18"/>
+    <p:sldId id="274" r:id="rId5"/>
+    <p:sldId id="262" r:id="rId6"/>
+    <p:sldId id="263" r:id="rId7"/>
+    <p:sldId id="264" r:id="rId8"/>
+    <p:sldId id="265" r:id="rId9"/>
+    <p:sldId id="266" r:id="rId10"/>
+    <p:sldId id="267" r:id="rId11"/>
+    <p:sldId id="268" r:id="rId12"/>
+    <p:sldId id="269" r:id="rId13"/>
+    <p:sldId id="270" r:id="rId14"/>
+    <p:sldId id="261" r:id="rId15"/>
+    <p:sldId id="271" r:id="rId16"/>
+    <p:sldId id="272" r:id="rId17"/>
+    <p:sldId id="273" r:id="rId18"/>
+    <p:sldId id="260" r:id="rId19"/>
   </p:sldIdLst>
   <p:sldSz cx="9144000" cy="6858000" type="screen4x3"/>
   <p:notesSz cx="6858000" cy="9144000"/>
@@ -3534,6 +3535,308 @@
         </p:nvSpPr>
         <p:spPr/>
         <p:txBody>
+          <a:bodyPr>
+            <a:normAutofit/>
+          </a:bodyPr>
+          <a:lstStyle/>
+          <a:p>
+            <a:r>
+              <a:rPr lang="en-US" dirty="0" smtClean="0"/>
+              <a:t>Regular expressions: character classes</a:t>
+            </a:r>
+            <a:endParaRPr lang="en-US" dirty="0"/>
+          </a:p>
+        </p:txBody>
+      </p:sp>
+      <p:sp>
+        <p:nvSpPr>
+          <p:cNvPr id="3" name="Content Placeholder 2"/>
+          <p:cNvSpPr>
+            <a:spLocks noGrp="1"/>
+          </p:cNvSpPr>
+          <p:nvPr>
+            <p:ph idx="1"/>
+          </p:nvPr>
+        </p:nvSpPr>
+        <p:spPr/>
+        <p:txBody>
+          <a:bodyPr>
+            <a:normAutofit fontScale="85000" lnSpcReduction="20000"/>
+          </a:bodyPr>
+          <a:lstStyle/>
+          <a:p>
+            <a:r>
+              <a:rPr lang="en-US">
+                <a:latin typeface="Courier New" panose="02070309020205020404" pitchFamily="49" charset="0"/>
+                <a:cs typeface="Courier New" panose="02070309020205020404" pitchFamily="49" charset="0"/>
+              </a:rPr>
+              <a:t>x</a:t>
+            </a:r>
+            <a:r>
+              <a:rPr lang="en-US" smtClean="0"/>
+              <a:t>                =  </a:t>
+            </a:r>
+            <a:r>
+              <a:rPr lang="en-US" dirty="0" smtClean="0"/>
+              <a:t>{'x'}</a:t>
+            </a:r>
+          </a:p>
+          <a:p>
+            <a:r>
+              <a:rPr lang="en-US" dirty="0" smtClean="0">
+                <a:latin typeface="Courier New" pitchFamily="49" charset="0"/>
+                <a:cs typeface="Courier New" pitchFamily="49" charset="0"/>
+              </a:rPr>
+              <a:t>[xyz]  </a:t>
+            </a:r>
+            <a:r>
+              <a:rPr lang="en-US" dirty="0" smtClean="0"/>
+              <a:t>=  {'x', 'y', 'z'}</a:t>
+            </a:r>
+            <a:endParaRPr lang="en-US" dirty="0" smtClean="0">
+              <a:latin typeface="Courier New" pitchFamily="49" charset="0"/>
+              <a:cs typeface="Courier New" pitchFamily="49" charset="0"/>
+            </a:endParaRPr>
+          </a:p>
+          <a:p>
+            <a:r>
+              <a:rPr lang="en-US" dirty="0" smtClean="0">
+                <a:latin typeface="Courier New" pitchFamily="49" charset="0"/>
+                <a:cs typeface="Courier New" pitchFamily="49" charset="0"/>
+              </a:rPr>
+              <a:t>[x-z]</a:t>
+            </a:r>
+            <a:r>
+              <a:rPr lang="en-US" dirty="0" smtClean="0"/>
+              <a:t>     =  {c | 'x' </a:t>
+            </a:r>
+            <a:r>
+              <a:rPr lang="en-US" dirty="0" smtClean="0">
+                <a:sym typeface="Symbol"/>
+              </a:rPr>
+              <a:t></a:t>
+            </a:r>
+            <a:r>
+              <a:rPr lang="en-US" dirty="0" smtClean="0"/>
+              <a:t> c </a:t>
+            </a:r>
+            <a:r>
+              <a:rPr lang="en-US" dirty="0">
+                <a:sym typeface="Symbol"/>
+              </a:rPr>
+              <a:t></a:t>
+            </a:r>
+            <a:r>
+              <a:rPr lang="en-US" dirty="0" smtClean="0"/>
+              <a:t> 'z'}</a:t>
+            </a:r>
+          </a:p>
+          <a:p>
+            <a:r>
+              <a:rPr lang="en-US" dirty="0" smtClean="0">
+                <a:latin typeface="Courier New" pitchFamily="49" charset="0"/>
+                <a:cs typeface="Courier New" pitchFamily="49" charset="0"/>
+              </a:rPr>
+              <a:t>[^xyz] </a:t>
+            </a:r>
+            <a:r>
+              <a:rPr lang="en-US" dirty="0" smtClean="0"/>
+              <a:t>=  {any} \ {'x', 'y', 'z'}</a:t>
+            </a:r>
+          </a:p>
+          <a:p>
+            <a:r>
+              <a:rPr lang="en-US" dirty="0" smtClean="0">
+                <a:latin typeface="Courier New" pitchFamily="49" charset="0"/>
+                <a:cs typeface="Courier New" pitchFamily="49" charset="0"/>
+              </a:rPr>
+              <a:t>\w</a:t>
+            </a:r>
+            <a:r>
+              <a:rPr lang="en-US" dirty="0" smtClean="0"/>
+              <a:t>             =  {'A',…,'Z', 'a',…,'z', '0',…,'9', '_'}</a:t>
+            </a:r>
+          </a:p>
+          <a:p>
+            <a:r>
+              <a:rPr lang="en-US" dirty="0" smtClean="0">
+                <a:latin typeface="Courier New" pitchFamily="49" charset="0"/>
+                <a:cs typeface="Courier New" pitchFamily="49" charset="0"/>
+              </a:rPr>
+              <a:t>\W</a:t>
+            </a:r>
+            <a:r>
+              <a:rPr lang="en-US" dirty="0" smtClean="0"/>
+              <a:t>             =  {any} \ </a:t>
+            </a:r>
+            <a:r>
+              <a:rPr lang="en-US" dirty="0"/>
+              <a:t>{'A',…,'Z', 'a',…,'z', '0',…,'9', '_'}</a:t>
+            </a:r>
+          </a:p>
+          <a:p>
+            <a:r>
+              <a:rPr lang="en-US" dirty="0" smtClean="0">
+                <a:latin typeface="Courier New" pitchFamily="49" charset="0"/>
+                <a:cs typeface="Courier New" pitchFamily="49" charset="0"/>
+              </a:rPr>
+              <a:t>\d</a:t>
+            </a:r>
+            <a:r>
+              <a:rPr lang="en-US" dirty="0" smtClean="0"/>
+              <a:t>             =  {'0',…,'9'}</a:t>
+            </a:r>
+          </a:p>
+          <a:p>
+            <a:r>
+              <a:rPr lang="en-US" dirty="0" smtClean="0">
+                <a:latin typeface="Courier New" pitchFamily="49" charset="0"/>
+                <a:cs typeface="Courier New" pitchFamily="49" charset="0"/>
+              </a:rPr>
+              <a:t>\D</a:t>
+            </a:r>
+            <a:r>
+              <a:rPr lang="en-US" dirty="0" smtClean="0"/>
+              <a:t>             =  {any} </a:t>
+            </a:r>
+            <a:r>
+              <a:rPr lang="en-US" dirty="0"/>
+              <a:t>\</a:t>
+            </a:r>
+            <a:r>
+              <a:rPr lang="en-US" dirty="0" smtClean="0"/>
+              <a:t> {'0',…,'9'}</a:t>
+            </a:r>
+          </a:p>
+          <a:p>
+            <a:r>
+              <a:rPr lang="en-US" dirty="0" smtClean="0">
+                <a:latin typeface="Courier New" pitchFamily="49" charset="0"/>
+                <a:cs typeface="Courier New" pitchFamily="49" charset="0"/>
+              </a:rPr>
+              <a:t>\s     </a:t>
+            </a:r>
+            <a:r>
+              <a:rPr lang="en-US" dirty="0" smtClean="0"/>
+              <a:t>=  {' ', '\t', '\f', '\r', '\n', '\v'}         (white space)</a:t>
+            </a:r>
+          </a:p>
+          <a:p>
+            <a:r>
+              <a:rPr lang="en-US" dirty="0" smtClean="0">
+                <a:latin typeface="Courier New" pitchFamily="49" charset="0"/>
+                <a:cs typeface="Courier New" pitchFamily="49" charset="0"/>
+              </a:rPr>
+              <a:t>\S</a:t>
+            </a:r>
+            <a:r>
+              <a:rPr lang="en-US" dirty="0" smtClean="0"/>
+              <a:t>             =  {any} </a:t>
+            </a:r>
+            <a:r>
+              <a:rPr lang="en-US" dirty="0"/>
+              <a:t>\</a:t>
+            </a:r>
+            <a:r>
+              <a:rPr lang="en-US" dirty="0" smtClean="0"/>
+              <a:t> {' </a:t>
+            </a:r>
+            <a:r>
+              <a:rPr lang="en-US" dirty="0"/>
+              <a:t>', '\t', '\f', '\r', '\</a:t>
+            </a:r>
+            <a:r>
+              <a:rPr lang="en-US" dirty="0" smtClean="0"/>
+              <a:t>n', '\v'}</a:t>
+            </a:r>
+          </a:p>
+          <a:p>
+            <a:r>
+              <a:rPr lang="en-US" dirty="0">
+                <a:latin typeface="Courier New" pitchFamily="49" charset="0"/>
+                <a:cs typeface="Courier New" pitchFamily="49" charset="0"/>
+              </a:rPr>
+              <a:t>.</a:t>
+            </a:r>
+            <a:r>
+              <a:rPr lang="en-US" dirty="0"/>
+              <a:t>                =  {any} \ {'\n'}</a:t>
+            </a:r>
+          </a:p>
+        </p:txBody>
+      </p:sp>
+      <p:sp>
+        <p:nvSpPr>
+          <p:cNvPr id="4" name="Slide Number Placeholder 3"/>
+          <p:cNvSpPr>
+            <a:spLocks noGrp="1"/>
+          </p:cNvSpPr>
+          <p:nvPr>
+            <p:ph type="sldNum" sz="quarter" idx="12"/>
+          </p:nvPr>
+        </p:nvSpPr>
+        <p:spPr/>
+        <p:txBody>
+          <a:bodyPr/>
+          <a:lstStyle/>
+          <a:p>
+            <a:fld id="{5A209D72-2E9D-49B0-8977-41DCCC66C0BB}" type="slidenum">
+              <a:rPr lang="nl-BE" smtClean="0"/>
+              <a:t>10</a:t>
+            </a:fld>
+            <a:endParaRPr lang="nl-BE"/>
+          </a:p>
+        </p:txBody>
+      </p:sp>
+    </p:spTree>
+    <p:extLst>
+      <p:ext uri="{BB962C8B-B14F-4D97-AF65-F5344CB8AC3E}">
+        <p14:creationId xmlns:p14="http://schemas.microsoft.com/office/powerpoint/2010/main" val="1467190624"/>
+      </p:ext>
+    </p:extLst>
+  </p:cSld>
+  <p:clrMapOvr>
+    <a:masterClrMapping/>
+  </p:clrMapOvr>
+  <p:timing>
+    <p:tnLst>
+      <p:par>
+        <p:cTn id="1" dur="indefinite" restart="never" nodeType="tmRoot"/>
+      </p:par>
+    </p:tnLst>
+  </p:timing>
+</p:sld>
+</file>
+
+<file path=ppt/slides/slide11.xml><?xml version="1.0" encoding="utf-8"?>
+<p:sld xmlns:a="http://schemas.openxmlformats.org/drawingml/2006/main" xmlns:r="http://schemas.openxmlformats.org/officeDocument/2006/relationships" xmlns:p="http://schemas.openxmlformats.org/presentationml/2006/main">
+  <p:cSld>
+    <p:spTree>
+      <p:nvGrpSpPr>
+        <p:cNvPr id="1" name=""/>
+        <p:cNvGrpSpPr/>
+        <p:nvPr/>
+      </p:nvGrpSpPr>
+      <p:grpSpPr>
+        <a:xfrm>
+          <a:off x="0" y="0"/>
+          <a:ext cx="0" cy="0"/>
+          <a:chOff x="0" y="0"/>
+          <a:chExt cx="0" cy="0"/>
+        </a:xfrm>
+      </p:grpSpPr>
+      <p:sp>
+        <p:nvSpPr>
+          <p:cNvPr id="2" name="Title 1"/>
+          <p:cNvSpPr>
+            <a:spLocks noGrp="1"/>
+          </p:cNvSpPr>
+          <p:nvPr>
+            <p:ph type="title"/>
+          </p:nvPr>
+        </p:nvSpPr>
+        <p:spPr/>
+        <p:txBody>
           <a:bodyPr/>
           <a:lstStyle/>
           <a:p>
@@ -4311,7 +4614,7 @@
           <a:p>
             <a:fld id="{5A209D72-2E9D-49B0-8977-41DCCC66C0BB}" type="slidenum">
               <a:rPr lang="nl-BE" smtClean="0"/>
-              <a:t>10</a:t>
+              <a:t>11</a:t>
             </a:fld>
             <a:endParaRPr lang="nl-BE"/>
           </a:p>
@@ -4408,7 +4711,7 @@
 </p:sld>
 </file>
 
-<file path=ppt/slides/slide11.xml><?xml version="1.0" encoding="utf-8"?>
+<file path=ppt/slides/slide12.xml><?xml version="1.0" encoding="utf-8"?>
 <p:sld xmlns:a="http://schemas.openxmlformats.org/drawingml/2006/main" xmlns:r="http://schemas.openxmlformats.org/officeDocument/2006/relationships" xmlns:p="http://schemas.openxmlformats.org/presentationml/2006/main">
   <p:cSld>
     <p:spTree>
@@ -4850,7 +5153,7 @@
           <a:p>
             <a:fld id="{5A209D72-2E9D-49B0-8977-41DCCC66C0BB}" type="slidenum">
               <a:rPr lang="nl-BE" smtClean="0"/>
-              <a:t>11</a:t>
+              <a:t>12</a:t>
             </a:fld>
             <a:endParaRPr lang="nl-BE"/>
           </a:p>
@@ -5127,7 +5430,7 @@
 </p:sld>
 </file>
 
-<file path=ppt/slides/slide12.xml><?xml version="1.0" encoding="utf-8"?>
+<file path=ppt/slides/slide13.xml><?xml version="1.0" encoding="utf-8"?>
 <p:sld xmlns:a="http://schemas.openxmlformats.org/drawingml/2006/main" xmlns:r="http://schemas.openxmlformats.org/officeDocument/2006/relationships" xmlns:p="http://schemas.openxmlformats.org/presentationml/2006/main">
   <p:cSld>
     <p:spTree>
@@ -5554,7 +5857,7 @@
           <a:p>
             <a:fld id="{5A209D72-2E9D-49B0-8977-41DCCC66C0BB}" type="slidenum">
               <a:rPr lang="nl-BE" smtClean="0"/>
-              <a:t>12</a:t>
+              <a:t>13</a:t>
             </a:fld>
             <a:endParaRPr lang="nl-BE"/>
           </a:p>
@@ -5876,477 +6179,6 @@
 </p:sld>
 </file>
 
-<file path=ppt/slides/slide13.xml><?xml version="1.0" encoding="utf-8"?>
-<p:sld xmlns:a="http://schemas.openxmlformats.org/drawingml/2006/main" xmlns:r="http://schemas.openxmlformats.org/officeDocument/2006/relationships" xmlns:p="http://schemas.openxmlformats.org/presentationml/2006/main">
-  <p:cSld>
-    <p:spTree>
-      <p:nvGrpSpPr>
-        <p:cNvPr id="1" name=""/>
-        <p:cNvGrpSpPr/>
-        <p:nvPr/>
-      </p:nvGrpSpPr>
-      <p:grpSpPr>
-        <a:xfrm>
-          <a:off x="0" y="0"/>
-          <a:ext cx="0" cy="0"/>
-          <a:chOff x="0" y="0"/>
-          <a:chExt cx="0" cy="0"/>
-        </a:xfrm>
-      </p:grpSpPr>
-      <p:sp>
-        <p:nvSpPr>
-          <p:cNvPr id="2" name="Title 1"/>
-          <p:cNvSpPr>
-            <a:spLocks noGrp="1"/>
-          </p:cNvSpPr>
-          <p:nvPr>
-            <p:ph type="title"/>
-          </p:nvPr>
-        </p:nvSpPr>
-        <p:spPr/>
-        <p:txBody>
-          <a:bodyPr/>
-          <a:lstStyle/>
-          <a:p>
-            <a:r>
-              <a:rPr lang="en-US" dirty="0" smtClean="0"/>
-              <a:t>Raw strings</a:t>
-            </a:r>
-            <a:endParaRPr lang="en-US" dirty="0"/>
-          </a:p>
-        </p:txBody>
-      </p:sp>
-      <p:sp>
-        <p:nvSpPr>
-          <p:cNvPr id="3" name="Content Placeholder 2"/>
-          <p:cNvSpPr>
-            <a:spLocks noGrp="1"/>
-          </p:cNvSpPr>
-          <p:nvPr>
-            <p:ph idx="1"/>
-          </p:nvPr>
-        </p:nvSpPr>
-        <p:spPr/>
-        <p:txBody>
-          <a:bodyPr/>
-          <a:lstStyle/>
-          <a:p>
-            <a:r>
-              <a:rPr lang="en-US" dirty="0" smtClean="0"/>
-              <a:t>Regular expressions contain many </a:t>
-            </a:r>
-            <a:r>
-              <a:rPr lang="en-US" dirty="0" smtClean="0">
-                <a:latin typeface="Courier New" panose="02070309020205020404" pitchFamily="49" charset="0"/>
-                <a:cs typeface="Courier New" panose="02070309020205020404" pitchFamily="49" charset="0"/>
-              </a:rPr>
-              <a:t>\</a:t>
-            </a:r>
-            <a:r>
-              <a:rPr lang="en-US" dirty="0" smtClean="0"/>
-              <a:t>: pain</a:t>
-            </a:r>
-          </a:p>
-          <a:p>
-            <a:pPr lvl="1"/>
-            <a:r>
-              <a:rPr lang="en-US" dirty="0" smtClean="0">
-                <a:cs typeface="Courier New" pitchFamily="49" charset="0"/>
-              </a:rPr>
-              <a:t>regular expression:</a:t>
-            </a:r>
-            <a:r>
-              <a:rPr lang="en-US" dirty="0" smtClean="0">
-                <a:latin typeface="Courier New" pitchFamily="49" charset="0"/>
-                <a:cs typeface="Courier New" pitchFamily="49" charset="0"/>
-              </a:rPr>
-              <a:t/>
-            </a:r>
-            <a:br>
-              <a:rPr lang="en-US" dirty="0" smtClean="0">
-                <a:latin typeface="Courier New" pitchFamily="49" charset="0"/>
-                <a:cs typeface="Courier New" pitchFamily="49" charset="0"/>
-              </a:rPr>
-            </a:br>
-            <a:r>
-              <a:rPr lang="en-US" dirty="0" smtClean="0">
-                <a:latin typeface="Courier New" pitchFamily="49" charset="0"/>
-                <a:cs typeface="Courier New" pitchFamily="49" charset="0"/>
-              </a:rPr>
-              <a:t>\w</a:t>
-            </a:r>
-            <a:r>
-              <a:rPr lang="en-US" dirty="0">
-                <a:latin typeface="Courier New" pitchFamily="49" charset="0"/>
-                <a:cs typeface="Courier New" pitchFamily="49" charset="0"/>
-              </a:rPr>
-              <a:t>+(?:\.\w+)?</a:t>
-            </a:r>
-            <a:r>
-              <a:rPr lang="en-US" b="1" dirty="0">
-                <a:latin typeface="Courier New" pitchFamily="49" charset="0"/>
-                <a:cs typeface="Courier New" pitchFamily="49" charset="0"/>
-              </a:rPr>
-              <a:t>@</a:t>
-            </a:r>
-            <a:r>
-              <a:rPr lang="en-US" dirty="0">
-                <a:latin typeface="Courier New" pitchFamily="49" charset="0"/>
-                <a:cs typeface="Courier New" pitchFamily="49" charset="0"/>
-              </a:rPr>
-              <a:t>\w+(?:\.\w</a:t>
-            </a:r>
-            <a:r>
-              <a:rPr lang="en-US" dirty="0" smtClean="0">
-                <a:latin typeface="Courier New" pitchFamily="49" charset="0"/>
-                <a:cs typeface="Courier New" pitchFamily="49" charset="0"/>
-              </a:rPr>
-              <a:t>+)+</a:t>
-            </a:r>
-          </a:p>
-          <a:p>
-            <a:pPr lvl="1"/>
-            <a:r>
-              <a:rPr lang="en-US" dirty="0" smtClean="0">
-                <a:cs typeface="Courier New" pitchFamily="49" charset="0"/>
-              </a:rPr>
-              <a:t>string representation:</a:t>
-            </a:r>
-            <a:r>
-              <a:rPr lang="en-US" dirty="0" smtClean="0">
-                <a:latin typeface="Courier New" pitchFamily="49" charset="0"/>
-                <a:cs typeface="Courier New" pitchFamily="49" charset="0"/>
-              </a:rPr>
-              <a:t/>
-            </a:r>
-            <a:br>
-              <a:rPr lang="en-US" dirty="0" smtClean="0">
-                <a:latin typeface="Courier New" pitchFamily="49" charset="0"/>
-                <a:cs typeface="Courier New" pitchFamily="49" charset="0"/>
-              </a:rPr>
-            </a:br>
-            <a:r>
-              <a:rPr lang="en-US" dirty="0" smtClean="0">
-                <a:latin typeface="Courier New" pitchFamily="49" charset="0"/>
-                <a:cs typeface="Courier New" pitchFamily="49" charset="0"/>
-              </a:rPr>
-              <a:t>"</a:t>
-            </a:r>
-            <a:r>
-              <a:rPr lang="en-US" b="1" dirty="0" smtClean="0">
-                <a:solidFill>
-                  <a:srgbClr val="C00000"/>
-                </a:solidFill>
-                <a:latin typeface="Courier New" pitchFamily="49" charset="0"/>
-                <a:cs typeface="Courier New" pitchFamily="49" charset="0"/>
-              </a:rPr>
-              <a:t>\</a:t>
-            </a:r>
-            <a:r>
-              <a:rPr lang="en-US" dirty="0" smtClean="0">
-                <a:latin typeface="Courier New" pitchFamily="49" charset="0"/>
-                <a:cs typeface="Courier New" pitchFamily="49" charset="0"/>
-              </a:rPr>
-              <a:t>\</a:t>
-            </a:r>
-            <a:r>
-              <a:rPr lang="en-US" dirty="0">
-                <a:latin typeface="Courier New" pitchFamily="49" charset="0"/>
-                <a:cs typeface="Courier New" pitchFamily="49" charset="0"/>
-              </a:rPr>
-              <a:t>w</a:t>
-            </a:r>
-            <a:r>
-              <a:rPr lang="en-US" dirty="0" smtClean="0">
-                <a:latin typeface="Courier New" pitchFamily="49" charset="0"/>
-                <a:cs typeface="Courier New" pitchFamily="49" charset="0"/>
-              </a:rPr>
-              <a:t>+(?:</a:t>
-            </a:r>
-            <a:r>
-              <a:rPr lang="en-US" b="1" dirty="0" smtClean="0">
-                <a:solidFill>
-                  <a:srgbClr val="C00000"/>
-                </a:solidFill>
-                <a:latin typeface="Courier New" pitchFamily="49" charset="0"/>
-                <a:cs typeface="Courier New" pitchFamily="49" charset="0"/>
-              </a:rPr>
-              <a:t>\</a:t>
-            </a:r>
-            <a:r>
-              <a:rPr lang="en-US" dirty="0" smtClean="0">
-                <a:latin typeface="Courier New" pitchFamily="49" charset="0"/>
-                <a:cs typeface="Courier New" pitchFamily="49" charset="0"/>
-              </a:rPr>
-              <a:t>\.</a:t>
-            </a:r>
-            <a:r>
-              <a:rPr lang="en-US" b="1" dirty="0" smtClean="0">
-                <a:solidFill>
-                  <a:srgbClr val="C00000"/>
-                </a:solidFill>
-                <a:latin typeface="Courier New" pitchFamily="49" charset="0"/>
-                <a:cs typeface="Courier New" pitchFamily="49" charset="0"/>
-              </a:rPr>
-              <a:t>\</a:t>
-            </a:r>
-            <a:r>
-              <a:rPr lang="en-US" dirty="0" smtClean="0">
-                <a:latin typeface="Courier New" pitchFamily="49" charset="0"/>
-                <a:cs typeface="Courier New" pitchFamily="49" charset="0"/>
-              </a:rPr>
-              <a:t>\</a:t>
-            </a:r>
-            <a:r>
-              <a:rPr lang="en-US" dirty="0">
-                <a:latin typeface="Courier New" pitchFamily="49" charset="0"/>
-                <a:cs typeface="Courier New" pitchFamily="49" charset="0"/>
-              </a:rPr>
-              <a:t>w</a:t>
-            </a:r>
-            <a:r>
-              <a:rPr lang="en-US" dirty="0" smtClean="0">
-                <a:latin typeface="Courier New" pitchFamily="49" charset="0"/>
-                <a:cs typeface="Courier New" pitchFamily="49" charset="0"/>
-              </a:rPr>
-              <a:t>+)?@</a:t>
-            </a:r>
-            <a:r>
-              <a:rPr lang="en-US" b="1" dirty="0" smtClean="0">
-                <a:solidFill>
-                  <a:srgbClr val="C00000"/>
-                </a:solidFill>
-                <a:latin typeface="Courier New" pitchFamily="49" charset="0"/>
-                <a:cs typeface="Courier New" pitchFamily="49" charset="0"/>
-              </a:rPr>
-              <a:t>\</a:t>
-            </a:r>
-            <a:r>
-              <a:rPr lang="en-US" dirty="0" smtClean="0">
-                <a:latin typeface="Courier New" pitchFamily="49" charset="0"/>
-                <a:cs typeface="Courier New" pitchFamily="49" charset="0"/>
-              </a:rPr>
-              <a:t>\</a:t>
-            </a:r>
-            <a:r>
-              <a:rPr lang="en-US" dirty="0">
-                <a:latin typeface="Courier New" pitchFamily="49" charset="0"/>
-                <a:cs typeface="Courier New" pitchFamily="49" charset="0"/>
-              </a:rPr>
-              <a:t>w</a:t>
-            </a:r>
-            <a:r>
-              <a:rPr lang="en-US" dirty="0" smtClean="0">
-                <a:latin typeface="Courier New" pitchFamily="49" charset="0"/>
-                <a:cs typeface="Courier New" pitchFamily="49" charset="0"/>
-              </a:rPr>
-              <a:t>+(?:</a:t>
-            </a:r>
-            <a:r>
-              <a:rPr lang="en-US" b="1" dirty="0" smtClean="0">
-                <a:solidFill>
-                  <a:srgbClr val="C00000"/>
-                </a:solidFill>
-                <a:latin typeface="Courier New" pitchFamily="49" charset="0"/>
-                <a:cs typeface="Courier New" pitchFamily="49" charset="0"/>
-              </a:rPr>
-              <a:t>\</a:t>
-            </a:r>
-            <a:r>
-              <a:rPr lang="en-US" dirty="0" smtClean="0">
-                <a:latin typeface="Courier New" pitchFamily="49" charset="0"/>
-                <a:cs typeface="Courier New" pitchFamily="49" charset="0"/>
-              </a:rPr>
-              <a:t>\.</a:t>
-            </a:r>
-            <a:r>
-              <a:rPr lang="en-US" b="1" dirty="0" smtClean="0">
-                <a:solidFill>
-                  <a:srgbClr val="C00000"/>
-                </a:solidFill>
-                <a:latin typeface="Courier New" pitchFamily="49" charset="0"/>
-                <a:cs typeface="Courier New" pitchFamily="49" charset="0"/>
-              </a:rPr>
-              <a:t>\</a:t>
-            </a:r>
-            <a:r>
-              <a:rPr lang="en-US" dirty="0" smtClean="0">
-                <a:latin typeface="Courier New" pitchFamily="49" charset="0"/>
-                <a:cs typeface="Courier New" pitchFamily="49" charset="0"/>
-              </a:rPr>
-              <a:t>\</a:t>
-            </a:r>
-            <a:r>
-              <a:rPr lang="en-US" dirty="0">
-                <a:latin typeface="Courier New" pitchFamily="49" charset="0"/>
-                <a:cs typeface="Courier New" pitchFamily="49" charset="0"/>
-              </a:rPr>
-              <a:t>w</a:t>
-            </a:r>
-            <a:r>
-              <a:rPr lang="en-US" dirty="0" smtClean="0">
-                <a:latin typeface="Courier New" pitchFamily="49" charset="0"/>
-                <a:cs typeface="Courier New" pitchFamily="49" charset="0"/>
-              </a:rPr>
-              <a:t>+)+"</a:t>
-            </a:r>
-          </a:p>
-          <a:p>
-            <a:r>
-              <a:rPr lang="en-US" dirty="0" smtClean="0">
-                <a:cs typeface="Courier New" pitchFamily="49" charset="0"/>
-              </a:rPr>
-              <a:t>Raw strings: </a:t>
-            </a:r>
-            <a:r>
-              <a:rPr lang="en-US" dirty="0" smtClean="0">
-                <a:latin typeface="Courier New" pitchFamily="49" charset="0"/>
-                <a:cs typeface="Courier New" pitchFamily="49" charset="0"/>
-              </a:rPr>
-              <a:t>\</a:t>
-            </a:r>
-            <a:r>
-              <a:rPr lang="en-US" dirty="0" smtClean="0">
-                <a:cs typeface="Courier New" pitchFamily="49" charset="0"/>
-              </a:rPr>
-              <a:t> has no special semantics</a:t>
-            </a:r>
-          </a:p>
-          <a:p>
-            <a:pPr lvl="1"/>
-            <a:r>
-              <a:rPr lang="en-US" dirty="0" smtClean="0">
-                <a:cs typeface="Courier New" pitchFamily="49" charset="0"/>
-              </a:rPr>
-              <a:t>raw string representation</a:t>
-            </a:r>
-            <a:r>
-              <a:rPr lang="en-US" dirty="0">
-                <a:cs typeface="Courier New" pitchFamily="49" charset="0"/>
-              </a:rPr>
-              <a:t>:</a:t>
-            </a:r>
-            <a:r>
-              <a:rPr lang="en-US" dirty="0">
-                <a:latin typeface="Courier New" pitchFamily="49" charset="0"/>
-                <a:cs typeface="Courier New" pitchFamily="49" charset="0"/>
-              </a:rPr>
-              <a:t/>
-            </a:r>
-            <a:br>
-              <a:rPr lang="en-US" dirty="0">
-                <a:latin typeface="Courier New" pitchFamily="49" charset="0"/>
-                <a:cs typeface="Courier New" pitchFamily="49" charset="0"/>
-              </a:rPr>
-            </a:br>
-            <a:r>
-              <a:rPr lang="en-US" b="1" dirty="0" smtClean="0">
-                <a:solidFill>
-                  <a:srgbClr val="C00000"/>
-                </a:solidFill>
-                <a:latin typeface="Courier New" pitchFamily="49" charset="0"/>
-                <a:cs typeface="Courier New" pitchFamily="49" charset="0"/>
-              </a:rPr>
-              <a:t>R"(</a:t>
-            </a:r>
-            <a:r>
-              <a:rPr lang="en-US" dirty="0" smtClean="0">
-                <a:latin typeface="Courier New" pitchFamily="49" charset="0"/>
-                <a:cs typeface="Courier New" pitchFamily="49" charset="0"/>
-              </a:rPr>
-              <a:t>\w</a:t>
-            </a:r>
-            <a:r>
-              <a:rPr lang="en-US" dirty="0">
-                <a:latin typeface="Courier New" pitchFamily="49" charset="0"/>
-                <a:cs typeface="Courier New" pitchFamily="49" charset="0"/>
-              </a:rPr>
-              <a:t>+(?:\.\w+)?</a:t>
-            </a:r>
-            <a:r>
-              <a:rPr lang="en-US" b="1" dirty="0">
-                <a:latin typeface="Courier New" pitchFamily="49" charset="0"/>
-                <a:cs typeface="Courier New" pitchFamily="49" charset="0"/>
-              </a:rPr>
-              <a:t>@</a:t>
-            </a:r>
-            <a:r>
-              <a:rPr lang="en-US" dirty="0">
-                <a:latin typeface="Courier New" pitchFamily="49" charset="0"/>
-                <a:cs typeface="Courier New" pitchFamily="49" charset="0"/>
-              </a:rPr>
-              <a:t>\w+(?:\.\w</a:t>
-            </a:r>
-            <a:r>
-              <a:rPr lang="en-US" dirty="0" smtClean="0">
-                <a:latin typeface="Courier New" pitchFamily="49" charset="0"/>
-                <a:cs typeface="Courier New" pitchFamily="49" charset="0"/>
-              </a:rPr>
-              <a:t>+)+</a:t>
-            </a:r>
-            <a:r>
-              <a:rPr lang="en-US" b="1" dirty="0" smtClean="0">
-                <a:solidFill>
-                  <a:srgbClr val="C00000"/>
-                </a:solidFill>
-                <a:latin typeface="Courier New" pitchFamily="49" charset="0"/>
-                <a:cs typeface="Courier New" pitchFamily="49" charset="0"/>
-              </a:rPr>
-              <a:t>)"</a:t>
-            </a:r>
-            <a:endParaRPr lang="en-US" b="1" dirty="0">
-              <a:solidFill>
-                <a:srgbClr val="C00000"/>
-              </a:solidFill>
-              <a:latin typeface="Courier New" pitchFamily="49" charset="0"/>
-              <a:cs typeface="Courier New" pitchFamily="49" charset="0"/>
-            </a:endParaRPr>
-          </a:p>
-        </p:txBody>
-      </p:sp>
-      <p:sp>
-        <p:nvSpPr>
-          <p:cNvPr id="4" name="Slide Number Placeholder 3"/>
-          <p:cNvSpPr>
-            <a:spLocks noGrp="1"/>
-          </p:cNvSpPr>
-          <p:nvPr>
-            <p:ph type="sldNum" sz="quarter" idx="12"/>
-          </p:nvPr>
-        </p:nvSpPr>
-        <p:spPr/>
-        <p:txBody>
-          <a:bodyPr/>
-          <a:lstStyle/>
-          <a:p>
-            <a:fld id="{9CEF4966-5219-4577-B301-14467D565841}" type="slidenum">
-              <a:rPr lang="en-US" smtClean="0"/>
-              <a:t>13</a:t>
-            </a:fld>
-            <a:endParaRPr lang="en-US"/>
-          </a:p>
-        </p:txBody>
-      </p:sp>
-    </p:spTree>
-    <p:extLst>
-      <p:ext uri="{BB962C8B-B14F-4D97-AF65-F5344CB8AC3E}">
-        <p14:creationId xmlns:p14="http://schemas.microsoft.com/office/powerpoint/2010/main" val="2111092520"/>
-      </p:ext>
-    </p:extLst>
-  </p:cSld>
-  <p:clrMapOvr>
-    <a:masterClrMapping/>
-  </p:clrMapOvr>
-  <p:timing>
-    <p:tnLst>
-      <p:par>
-        <p:cTn id="1" dur="indefinite" restart="never" nodeType="tmRoot"/>
-      </p:par>
-    </p:tnLst>
-  </p:timing>
-</p:sld>
-</file>
-
 <file path=ppt/slides/slide14.xml><?xml version="1.0" encoding="utf-8"?>
 <p:sld xmlns:a="http://schemas.openxmlformats.org/drawingml/2006/main" xmlns:r="http://schemas.openxmlformats.org/officeDocument/2006/relationships" xmlns:p="http://schemas.openxmlformats.org/presentationml/2006/main">
   <p:cSld>
@@ -6381,7 +6213,7 @@
           <a:p>
             <a:r>
               <a:rPr lang="en-US" dirty="0" smtClean="0"/>
-              <a:t>Searching matches</a:t>
+              <a:t>Raw strings</a:t>
             </a:r>
             <a:endParaRPr lang="en-US" dirty="0"/>
           </a:p>
@@ -6404,27 +6236,374 @@
           <a:p>
             <a:r>
               <a:rPr lang="en-US" dirty="0" smtClean="0"/>
-              <a:t>Checking occurrence</a:t>
-            </a:r>
-          </a:p>
-          <a:p>
-            <a:endParaRPr lang="en-US" dirty="0"/>
-          </a:p>
-          <a:p>
-            <a:endParaRPr lang="en-US" dirty="0" smtClean="0"/>
-          </a:p>
-          <a:p>
-            <a:endParaRPr lang="en-US" dirty="0"/>
-          </a:p>
-          <a:p>
-            <a:endParaRPr lang="en-US" dirty="0" smtClean="0"/>
-          </a:p>
-          <a:p>
+              <a:t>Regular expressions contain many </a:t>
+            </a:r>
+            <a:r>
+              <a:rPr lang="en-US" dirty="0" smtClean="0">
+                <a:latin typeface="Courier New" panose="02070309020205020404" pitchFamily="49" charset="0"/>
+                <a:cs typeface="Courier New" panose="02070309020205020404" pitchFamily="49" charset="0"/>
+              </a:rPr>
+              <a:t>\</a:t>
+            </a:r>
             <a:r>
               <a:rPr lang="en-US" dirty="0" smtClean="0"/>
-              <a:t>Getting matched string</a:t>
-            </a:r>
-            <a:endParaRPr lang="en-US" dirty="0"/>
+              <a:t>: pain</a:t>
+            </a:r>
+          </a:p>
+          <a:p>
+            <a:pPr lvl="1"/>
+            <a:r>
+              <a:rPr lang="en-US" dirty="0" smtClean="0">
+                <a:cs typeface="Courier New" pitchFamily="49" charset="0"/>
+              </a:rPr>
+              <a:t>regular expression:</a:t>
+            </a:r>
+            <a:r>
+              <a:rPr lang="en-US" dirty="0" smtClean="0">
+                <a:latin typeface="Courier New" pitchFamily="49" charset="0"/>
+                <a:cs typeface="Courier New" pitchFamily="49" charset="0"/>
+              </a:rPr>
+              <a:t/>
+            </a:r>
+            <a:br>
+              <a:rPr lang="en-US" dirty="0" smtClean="0">
+                <a:latin typeface="Courier New" pitchFamily="49" charset="0"/>
+                <a:cs typeface="Courier New" pitchFamily="49" charset="0"/>
+              </a:rPr>
+            </a:br>
+            <a:r>
+              <a:rPr lang="en-US" dirty="0" smtClean="0">
+                <a:latin typeface="Courier New" pitchFamily="49" charset="0"/>
+                <a:cs typeface="Courier New" pitchFamily="49" charset="0"/>
+              </a:rPr>
+              <a:t>\w</a:t>
+            </a:r>
+            <a:r>
+              <a:rPr lang="en-US" dirty="0">
+                <a:latin typeface="Courier New" pitchFamily="49" charset="0"/>
+                <a:cs typeface="Courier New" pitchFamily="49" charset="0"/>
+              </a:rPr>
+              <a:t>+(?:\.\w+)?</a:t>
+            </a:r>
+            <a:r>
+              <a:rPr lang="en-US" b="1" dirty="0">
+                <a:latin typeface="Courier New" pitchFamily="49" charset="0"/>
+                <a:cs typeface="Courier New" pitchFamily="49" charset="0"/>
+              </a:rPr>
+              <a:t>@</a:t>
+            </a:r>
+            <a:r>
+              <a:rPr lang="en-US" dirty="0">
+                <a:latin typeface="Courier New" pitchFamily="49" charset="0"/>
+                <a:cs typeface="Courier New" pitchFamily="49" charset="0"/>
+              </a:rPr>
+              <a:t>\w+(?:\.\w</a:t>
+            </a:r>
+            <a:r>
+              <a:rPr lang="en-US" dirty="0" smtClean="0">
+                <a:latin typeface="Courier New" pitchFamily="49" charset="0"/>
+                <a:cs typeface="Courier New" pitchFamily="49" charset="0"/>
+              </a:rPr>
+              <a:t>+)+</a:t>
+            </a:r>
+          </a:p>
+          <a:p>
+            <a:pPr lvl="1"/>
+            <a:r>
+              <a:rPr lang="en-US" dirty="0" smtClean="0">
+                <a:cs typeface="Courier New" pitchFamily="49" charset="0"/>
+              </a:rPr>
+              <a:t>string representation:</a:t>
+            </a:r>
+            <a:r>
+              <a:rPr lang="en-US" dirty="0" smtClean="0">
+                <a:latin typeface="Courier New" pitchFamily="49" charset="0"/>
+                <a:cs typeface="Courier New" pitchFamily="49" charset="0"/>
+              </a:rPr>
+              <a:t/>
+            </a:r>
+            <a:br>
+              <a:rPr lang="en-US" dirty="0" smtClean="0">
+                <a:latin typeface="Courier New" pitchFamily="49" charset="0"/>
+                <a:cs typeface="Courier New" pitchFamily="49" charset="0"/>
+              </a:rPr>
+            </a:br>
+            <a:r>
+              <a:rPr lang="en-US" dirty="0" smtClean="0">
+                <a:latin typeface="Courier New" pitchFamily="49" charset="0"/>
+                <a:cs typeface="Courier New" pitchFamily="49" charset="0"/>
+              </a:rPr>
+              <a:t>"</a:t>
+            </a:r>
+            <a:r>
+              <a:rPr lang="en-US" b="1" dirty="0" smtClean="0">
+                <a:solidFill>
+                  <a:srgbClr val="C00000"/>
+                </a:solidFill>
+                <a:latin typeface="Courier New" pitchFamily="49" charset="0"/>
+                <a:cs typeface="Courier New" pitchFamily="49" charset="0"/>
+              </a:rPr>
+              <a:t>\</a:t>
+            </a:r>
+            <a:r>
+              <a:rPr lang="en-US" dirty="0" smtClean="0">
+                <a:latin typeface="Courier New" pitchFamily="49" charset="0"/>
+                <a:cs typeface="Courier New" pitchFamily="49" charset="0"/>
+              </a:rPr>
+              <a:t>\</a:t>
+            </a:r>
+            <a:r>
+              <a:rPr lang="en-US" dirty="0">
+                <a:latin typeface="Courier New" pitchFamily="49" charset="0"/>
+                <a:cs typeface="Courier New" pitchFamily="49" charset="0"/>
+              </a:rPr>
+              <a:t>w</a:t>
+            </a:r>
+            <a:r>
+              <a:rPr lang="en-US" dirty="0" smtClean="0">
+                <a:latin typeface="Courier New" pitchFamily="49" charset="0"/>
+                <a:cs typeface="Courier New" pitchFamily="49" charset="0"/>
+              </a:rPr>
+              <a:t>+(?:</a:t>
+            </a:r>
+            <a:r>
+              <a:rPr lang="en-US" b="1" dirty="0" smtClean="0">
+                <a:solidFill>
+                  <a:srgbClr val="C00000"/>
+                </a:solidFill>
+                <a:latin typeface="Courier New" pitchFamily="49" charset="0"/>
+                <a:cs typeface="Courier New" pitchFamily="49" charset="0"/>
+              </a:rPr>
+              <a:t>\</a:t>
+            </a:r>
+            <a:r>
+              <a:rPr lang="en-US" dirty="0" smtClean="0">
+                <a:latin typeface="Courier New" pitchFamily="49" charset="0"/>
+                <a:cs typeface="Courier New" pitchFamily="49" charset="0"/>
+              </a:rPr>
+              <a:t>\.</a:t>
+            </a:r>
+            <a:r>
+              <a:rPr lang="en-US" b="1" dirty="0" smtClean="0">
+                <a:solidFill>
+                  <a:srgbClr val="C00000"/>
+                </a:solidFill>
+                <a:latin typeface="Courier New" pitchFamily="49" charset="0"/>
+                <a:cs typeface="Courier New" pitchFamily="49" charset="0"/>
+              </a:rPr>
+              <a:t>\</a:t>
+            </a:r>
+            <a:r>
+              <a:rPr lang="en-US" dirty="0" smtClean="0">
+                <a:latin typeface="Courier New" pitchFamily="49" charset="0"/>
+                <a:cs typeface="Courier New" pitchFamily="49" charset="0"/>
+              </a:rPr>
+              <a:t>\</a:t>
+            </a:r>
+            <a:r>
+              <a:rPr lang="en-US" dirty="0">
+                <a:latin typeface="Courier New" pitchFamily="49" charset="0"/>
+                <a:cs typeface="Courier New" pitchFamily="49" charset="0"/>
+              </a:rPr>
+              <a:t>w</a:t>
+            </a:r>
+            <a:r>
+              <a:rPr lang="en-US" dirty="0" smtClean="0">
+                <a:latin typeface="Courier New" pitchFamily="49" charset="0"/>
+                <a:cs typeface="Courier New" pitchFamily="49" charset="0"/>
+              </a:rPr>
+              <a:t>+)?@</a:t>
+            </a:r>
+            <a:r>
+              <a:rPr lang="en-US" b="1" dirty="0" smtClean="0">
+                <a:solidFill>
+                  <a:srgbClr val="C00000"/>
+                </a:solidFill>
+                <a:latin typeface="Courier New" pitchFamily="49" charset="0"/>
+                <a:cs typeface="Courier New" pitchFamily="49" charset="0"/>
+              </a:rPr>
+              <a:t>\</a:t>
+            </a:r>
+            <a:r>
+              <a:rPr lang="en-US" dirty="0" smtClean="0">
+                <a:latin typeface="Courier New" pitchFamily="49" charset="0"/>
+                <a:cs typeface="Courier New" pitchFamily="49" charset="0"/>
+              </a:rPr>
+              <a:t>\</a:t>
+            </a:r>
+            <a:r>
+              <a:rPr lang="en-US" dirty="0">
+                <a:latin typeface="Courier New" pitchFamily="49" charset="0"/>
+                <a:cs typeface="Courier New" pitchFamily="49" charset="0"/>
+              </a:rPr>
+              <a:t>w</a:t>
+            </a:r>
+            <a:r>
+              <a:rPr lang="en-US" dirty="0" smtClean="0">
+                <a:latin typeface="Courier New" pitchFamily="49" charset="0"/>
+                <a:cs typeface="Courier New" pitchFamily="49" charset="0"/>
+              </a:rPr>
+              <a:t>+(?:</a:t>
+            </a:r>
+            <a:r>
+              <a:rPr lang="en-US" b="1" dirty="0" smtClean="0">
+                <a:solidFill>
+                  <a:srgbClr val="C00000"/>
+                </a:solidFill>
+                <a:latin typeface="Courier New" pitchFamily="49" charset="0"/>
+                <a:cs typeface="Courier New" pitchFamily="49" charset="0"/>
+              </a:rPr>
+              <a:t>\</a:t>
+            </a:r>
+            <a:r>
+              <a:rPr lang="en-US" dirty="0" smtClean="0">
+                <a:latin typeface="Courier New" pitchFamily="49" charset="0"/>
+                <a:cs typeface="Courier New" pitchFamily="49" charset="0"/>
+              </a:rPr>
+              <a:t>\.</a:t>
+            </a:r>
+            <a:r>
+              <a:rPr lang="en-US" b="1" dirty="0" smtClean="0">
+                <a:solidFill>
+                  <a:srgbClr val="C00000"/>
+                </a:solidFill>
+                <a:latin typeface="Courier New" pitchFamily="49" charset="0"/>
+                <a:cs typeface="Courier New" pitchFamily="49" charset="0"/>
+              </a:rPr>
+              <a:t>\</a:t>
+            </a:r>
+            <a:r>
+              <a:rPr lang="en-US" dirty="0" smtClean="0">
+                <a:latin typeface="Courier New" pitchFamily="49" charset="0"/>
+                <a:cs typeface="Courier New" pitchFamily="49" charset="0"/>
+              </a:rPr>
+              <a:t>\</a:t>
+            </a:r>
+            <a:r>
+              <a:rPr lang="en-US" dirty="0">
+                <a:latin typeface="Courier New" pitchFamily="49" charset="0"/>
+                <a:cs typeface="Courier New" pitchFamily="49" charset="0"/>
+              </a:rPr>
+              <a:t>w</a:t>
+            </a:r>
+            <a:r>
+              <a:rPr lang="en-US" dirty="0" smtClean="0">
+                <a:latin typeface="Courier New" pitchFamily="49" charset="0"/>
+                <a:cs typeface="Courier New" pitchFamily="49" charset="0"/>
+              </a:rPr>
+              <a:t>+)+"</a:t>
+            </a:r>
+          </a:p>
+          <a:p>
+            <a:r>
+              <a:rPr lang="en-US" dirty="0" smtClean="0">
+                <a:cs typeface="Courier New" pitchFamily="49" charset="0"/>
+              </a:rPr>
+              <a:t>Raw strings: </a:t>
+            </a:r>
+            <a:r>
+              <a:rPr lang="en-US" dirty="0" smtClean="0">
+                <a:latin typeface="Courier New" pitchFamily="49" charset="0"/>
+                <a:cs typeface="Courier New" pitchFamily="49" charset="0"/>
+              </a:rPr>
+              <a:t>\</a:t>
+            </a:r>
+            <a:r>
+              <a:rPr lang="en-US" dirty="0" smtClean="0">
+                <a:cs typeface="Courier New" pitchFamily="49" charset="0"/>
+              </a:rPr>
+              <a:t> has no special semantics</a:t>
+            </a:r>
+          </a:p>
+          <a:p>
+            <a:pPr lvl="1"/>
+            <a:r>
+              <a:rPr lang="en-US" dirty="0" smtClean="0">
+                <a:cs typeface="Courier New" pitchFamily="49" charset="0"/>
+              </a:rPr>
+              <a:t>raw string representation</a:t>
+            </a:r>
+            <a:r>
+              <a:rPr lang="en-US" dirty="0">
+                <a:cs typeface="Courier New" pitchFamily="49" charset="0"/>
+              </a:rPr>
+              <a:t>:</a:t>
+            </a:r>
+            <a:r>
+              <a:rPr lang="en-US" dirty="0">
+                <a:latin typeface="Courier New" pitchFamily="49" charset="0"/>
+                <a:cs typeface="Courier New" pitchFamily="49" charset="0"/>
+              </a:rPr>
+              <a:t/>
+            </a:r>
+            <a:br>
+              <a:rPr lang="en-US" dirty="0">
+                <a:latin typeface="Courier New" pitchFamily="49" charset="0"/>
+                <a:cs typeface="Courier New" pitchFamily="49" charset="0"/>
+              </a:rPr>
+            </a:br>
+            <a:r>
+              <a:rPr lang="en-US" b="1" dirty="0" smtClean="0">
+                <a:solidFill>
+                  <a:srgbClr val="C00000"/>
+                </a:solidFill>
+                <a:latin typeface="Courier New" pitchFamily="49" charset="0"/>
+                <a:cs typeface="Courier New" pitchFamily="49" charset="0"/>
+              </a:rPr>
+              <a:t>R"(</a:t>
+            </a:r>
+            <a:r>
+              <a:rPr lang="en-US" dirty="0" smtClean="0">
+                <a:latin typeface="Courier New" pitchFamily="49" charset="0"/>
+                <a:cs typeface="Courier New" pitchFamily="49" charset="0"/>
+              </a:rPr>
+              <a:t>\w</a:t>
+            </a:r>
+            <a:r>
+              <a:rPr lang="en-US" dirty="0">
+                <a:latin typeface="Courier New" pitchFamily="49" charset="0"/>
+                <a:cs typeface="Courier New" pitchFamily="49" charset="0"/>
+              </a:rPr>
+              <a:t>+(?:\.\w+)?</a:t>
+            </a:r>
+            <a:r>
+              <a:rPr lang="en-US" b="1" dirty="0">
+                <a:latin typeface="Courier New" pitchFamily="49" charset="0"/>
+                <a:cs typeface="Courier New" pitchFamily="49" charset="0"/>
+              </a:rPr>
+              <a:t>@</a:t>
+            </a:r>
+            <a:r>
+              <a:rPr lang="en-US" dirty="0">
+                <a:latin typeface="Courier New" pitchFamily="49" charset="0"/>
+                <a:cs typeface="Courier New" pitchFamily="49" charset="0"/>
+              </a:rPr>
+              <a:t>\w+(?:\.\w</a:t>
+            </a:r>
+            <a:r>
+              <a:rPr lang="en-US" dirty="0" smtClean="0">
+                <a:latin typeface="Courier New" pitchFamily="49" charset="0"/>
+                <a:cs typeface="Courier New" pitchFamily="49" charset="0"/>
+              </a:rPr>
+              <a:t>+)+</a:t>
+            </a:r>
+            <a:r>
+              <a:rPr lang="en-US" b="1" dirty="0" smtClean="0">
+                <a:solidFill>
+                  <a:srgbClr val="C00000"/>
+                </a:solidFill>
+                <a:latin typeface="Courier New" pitchFamily="49" charset="0"/>
+                <a:cs typeface="Courier New" pitchFamily="49" charset="0"/>
+              </a:rPr>
+              <a:t>)"</a:t>
+            </a:r>
+            <a:endParaRPr lang="en-US" b="1" dirty="0">
+              <a:solidFill>
+                <a:srgbClr val="C00000"/>
+              </a:solidFill>
+              <a:latin typeface="Courier New" pitchFamily="49" charset="0"/>
+              <a:cs typeface="Courier New" pitchFamily="49" charset="0"/>
+            </a:endParaRPr>
           </a:p>
         </p:txBody>
       </p:sp>
@@ -6446,6 +6625,130 @@
             <a:fld id="{9CEF4966-5219-4577-B301-14467D565841}" type="slidenum">
               <a:rPr lang="en-US" smtClean="0"/>
               <a:t>14</a:t>
+            </a:fld>
+            <a:endParaRPr lang="en-US"/>
+          </a:p>
+        </p:txBody>
+      </p:sp>
+    </p:spTree>
+    <p:extLst>
+      <p:ext uri="{BB962C8B-B14F-4D97-AF65-F5344CB8AC3E}">
+        <p14:creationId xmlns:p14="http://schemas.microsoft.com/office/powerpoint/2010/main" val="2111092520"/>
+      </p:ext>
+    </p:extLst>
+  </p:cSld>
+  <p:clrMapOvr>
+    <a:masterClrMapping/>
+  </p:clrMapOvr>
+  <p:timing>
+    <p:tnLst>
+      <p:par>
+        <p:cTn id="1" dur="indefinite" restart="never" nodeType="tmRoot"/>
+      </p:par>
+    </p:tnLst>
+  </p:timing>
+</p:sld>
+</file>
+
+<file path=ppt/slides/slide15.xml><?xml version="1.0" encoding="utf-8"?>
+<p:sld xmlns:a="http://schemas.openxmlformats.org/drawingml/2006/main" xmlns:r="http://schemas.openxmlformats.org/officeDocument/2006/relationships" xmlns:p="http://schemas.openxmlformats.org/presentationml/2006/main">
+  <p:cSld>
+    <p:spTree>
+      <p:nvGrpSpPr>
+        <p:cNvPr id="1" name=""/>
+        <p:cNvGrpSpPr/>
+        <p:nvPr/>
+      </p:nvGrpSpPr>
+      <p:grpSpPr>
+        <a:xfrm>
+          <a:off x="0" y="0"/>
+          <a:ext cx="0" cy="0"/>
+          <a:chOff x="0" y="0"/>
+          <a:chExt cx="0" cy="0"/>
+        </a:xfrm>
+      </p:grpSpPr>
+      <p:sp>
+        <p:nvSpPr>
+          <p:cNvPr id="2" name="Title 1"/>
+          <p:cNvSpPr>
+            <a:spLocks noGrp="1"/>
+          </p:cNvSpPr>
+          <p:nvPr>
+            <p:ph type="title"/>
+          </p:nvPr>
+        </p:nvSpPr>
+        <p:spPr/>
+        <p:txBody>
+          <a:bodyPr/>
+          <a:lstStyle/>
+          <a:p>
+            <a:r>
+              <a:rPr lang="en-US" dirty="0" smtClean="0"/>
+              <a:t>Searching matches</a:t>
+            </a:r>
+            <a:endParaRPr lang="en-US" dirty="0"/>
+          </a:p>
+        </p:txBody>
+      </p:sp>
+      <p:sp>
+        <p:nvSpPr>
+          <p:cNvPr id="3" name="Content Placeholder 2"/>
+          <p:cNvSpPr>
+            <a:spLocks noGrp="1"/>
+          </p:cNvSpPr>
+          <p:nvPr>
+            <p:ph idx="1"/>
+          </p:nvPr>
+        </p:nvSpPr>
+        <p:spPr/>
+        <p:txBody>
+          <a:bodyPr/>
+          <a:lstStyle/>
+          <a:p>
+            <a:r>
+              <a:rPr lang="en-US" dirty="0" smtClean="0"/>
+              <a:t>Checking occurrence</a:t>
+            </a:r>
+          </a:p>
+          <a:p>
+            <a:endParaRPr lang="en-US" dirty="0"/>
+          </a:p>
+          <a:p>
+            <a:endParaRPr lang="en-US" dirty="0" smtClean="0"/>
+          </a:p>
+          <a:p>
+            <a:endParaRPr lang="en-US" dirty="0"/>
+          </a:p>
+          <a:p>
+            <a:endParaRPr lang="en-US" dirty="0" smtClean="0"/>
+          </a:p>
+          <a:p>
+            <a:r>
+              <a:rPr lang="en-US" dirty="0" smtClean="0"/>
+              <a:t>Getting matched string</a:t>
+            </a:r>
+            <a:endParaRPr lang="en-US" dirty="0"/>
+          </a:p>
+        </p:txBody>
+      </p:sp>
+      <p:sp>
+        <p:nvSpPr>
+          <p:cNvPr id="4" name="Slide Number Placeholder 3"/>
+          <p:cNvSpPr>
+            <a:spLocks noGrp="1"/>
+          </p:cNvSpPr>
+          <p:nvPr>
+            <p:ph type="sldNum" sz="quarter" idx="12"/>
+          </p:nvPr>
+        </p:nvSpPr>
+        <p:spPr/>
+        <p:txBody>
+          <a:bodyPr/>
+          <a:lstStyle/>
+          <a:p>
+            <a:fld id="{9CEF4966-5219-4577-B301-14467D565841}" type="slidenum">
+              <a:rPr lang="en-US" smtClean="0"/>
+              <a:t>15</a:t>
             </a:fld>
             <a:endParaRPr lang="en-US"/>
           </a:p>
@@ -6970,7 +7273,7 @@
 </p:sld>
 </file>
 
-<file path=ppt/slides/slide15.xml><?xml version="1.0" encoding="utf-8"?>
+<file path=ppt/slides/slide16.xml><?xml version="1.0" encoding="utf-8"?>
 <p:sld xmlns:a="http://schemas.openxmlformats.org/drawingml/2006/main" xmlns:r="http://schemas.openxmlformats.org/officeDocument/2006/relationships" xmlns:p="http://schemas.openxmlformats.org/presentationml/2006/main">
   <p:cSld>
     <p:spTree>
@@ -7073,7 +7376,7 @@
           <a:p>
             <a:fld id="{9CEF4966-5219-4577-B301-14467D565841}" type="slidenum">
               <a:rPr lang="en-US" smtClean="0"/>
-              <a:t>15</a:t>
+              <a:t>16</a:t>
             </a:fld>
             <a:endParaRPr lang="en-US"/>
           </a:p>
@@ -7628,7 +7931,7 @@
 </p:sld>
 </file>
 
-<file path=ppt/slides/slide16.xml><?xml version="1.0" encoding="utf-8"?>
+<file path=ppt/slides/slide17.xml><?xml version="1.0" encoding="utf-8"?>
 <p:sld xmlns:a="http://schemas.openxmlformats.org/drawingml/2006/main" xmlns:r="http://schemas.openxmlformats.org/officeDocument/2006/relationships" xmlns:p="http://schemas.openxmlformats.org/presentationml/2006/main">
   <p:cSld>
     <p:spTree>
@@ -7764,7 +8067,7 @@
           <a:p>
             <a:fld id="{9CEF4966-5219-4577-B301-14467D565841}" type="slidenum">
               <a:rPr lang="en-US" smtClean="0"/>
-              <a:t>16</a:t>
+              <a:t>17</a:t>
             </a:fld>
             <a:endParaRPr lang="en-US"/>
           </a:p>
@@ -8184,7 +8487,7 @@
 </p:sld>
 </file>
 
-<file path=ppt/slides/slide17.xml><?xml version="1.0" encoding="utf-8"?>
+<file path=ppt/slides/slide18.xml><?xml version="1.0" encoding="utf-8"?>
 <p:sld xmlns:a="http://schemas.openxmlformats.org/drawingml/2006/main" xmlns:r="http://schemas.openxmlformats.org/officeDocument/2006/relationships" xmlns:p="http://schemas.openxmlformats.org/presentationml/2006/main">
   <p:cSld>
     <p:spTree>
@@ -8274,7 +8577,7 @@
           <a:p>
             <a:fld id="{9CEF4966-5219-4577-B301-14467D565841}" type="slidenum">
               <a:rPr lang="en-US" smtClean="0"/>
-              <a:t>17</a:t>
+              <a:t>18</a:t>
             </a:fld>
             <a:endParaRPr lang="en-US"/>
           </a:p>
@@ -9873,6 +10176,589 @@
           <a:lstStyle/>
           <a:p>
             <a:r>
+              <a:rPr lang="en-US" dirty="0" err="1" smtClean="0"/>
+              <a:t>std</a:t>
+            </a:r>
+            <a:r>
+              <a:rPr lang="en-US" dirty="0" smtClean="0"/>
+              <a:t>::string versus C-style</a:t>
+            </a:r>
+            <a:endParaRPr lang="en-US" dirty="0"/>
+          </a:p>
+        </p:txBody>
+      </p:sp>
+      <p:sp>
+        <p:nvSpPr>
+          <p:cNvPr id="3" name="Content Placeholder 2"/>
+          <p:cNvSpPr>
+            <a:spLocks noGrp="1"/>
+          </p:cNvSpPr>
+          <p:nvPr>
+            <p:ph idx="1"/>
+          </p:nvPr>
+        </p:nvSpPr>
+        <p:spPr/>
+        <p:txBody>
+          <a:bodyPr/>
+          <a:lstStyle/>
+          <a:p>
+            <a:r>
+              <a:rPr lang="en-US" dirty="0" smtClean="0"/>
+              <a:t>C-style string</a:t>
+            </a:r>
+          </a:p>
+          <a:p>
+            <a:pPr lvl="1"/>
+            <a:r>
+              <a:rPr lang="en-US" dirty="0" smtClean="0"/>
+              <a:t>array of </a:t>
+            </a:r>
+            <a:r>
+              <a:rPr lang="en-US" dirty="0" smtClean="0">
+                <a:latin typeface="Courier New" panose="02070309020205020404" pitchFamily="49" charset="0"/>
+                <a:cs typeface="Courier New" panose="02070309020205020404" pitchFamily="49" charset="0"/>
+              </a:rPr>
+              <a:t>cha</a:t>
+            </a:r>
+            <a:r>
+              <a:rPr lang="en-US" dirty="0" smtClean="0"/>
+              <a:t>r</a:t>
+            </a:r>
+          </a:p>
+          <a:p>
+            <a:pPr lvl="1"/>
+            <a:r>
+              <a:rPr lang="en-US" dirty="0" smtClean="0"/>
+              <a:t>last element </a:t>
+            </a:r>
+            <a:r>
+              <a:rPr lang="en-US" dirty="0" smtClean="0">
+                <a:latin typeface="Courier New" panose="02070309020205020404" pitchFamily="49" charset="0"/>
+                <a:cs typeface="Courier New" panose="02070309020205020404" pitchFamily="49" charset="0"/>
+              </a:rPr>
+              <a:t>'\0'</a:t>
+            </a:r>
+          </a:p>
+          <a:p>
+            <a:pPr lvl="1"/>
+            <a:r>
+              <a:rPr lang="en-US" dirty="0" smtClean="0">
+                <a:cs typeface="Courier New" panose="02070309020205020404" pitchFamily="49" charset="0"/>
+              </a:rPr>
+              <a:t>functions declared in </a:t>
+            </a:r>
+            <a:r>
+              <a:rPr lang="en-US" dirty="0" err="1" smtClean="0">
+                <a:latin typeface="Courier New" panose="02070309020205020404" pitchFamily="49" charset="0"/>
+                <a:cs typeface="Courier New" panose="02070309020205020404" pitchFamily="49" charset="0"/>
+              </a:rPr>
+              <a:t>string.h</a:t>
+            </a:r>
+            <a:endParaRPr lang="en-US" dirty="0" smtClean="0">
+              <a:latin typeface="Courier New" panose="02070309020205020404" pitchFamily="49" charset="0"/>
+              <a:cs typeface="Courier New" panose="02070309020205020404" pitchFamily="49" charset="0"/>
+            </a:endParaRPr>
+          </a:p>
+          <a:p>
+            <a:r>
+              <a:rPr lang="en-US" dirty="0" smtClean="0"/>
+              <a:t>Useful for calling C functions</a:t>
+            </a:r>
+          </a:p>
+          <a:p>
+            <a:r>
+              <a:rPr lang="en-US" dirty="0" smtClean="0"/>
+              <a:t>Conversion</a:t>
+            </a:r>
+          </a:p>
+          <a:p>
+            <a:pPr lvl="1"/>
+            <a:r>
+              <a:rPr lang="en-US" dirty="0" err="1" smtClean="0"/>
+              <a:t>std</a:t>
+            </a:r>
+            <a:r>
+              <a:rPr lang="en-US" dirty="0" smtClean="0"/>
+              <a:t>::string </a:t>
+            </a:r>
+            <a:r>
+              <a:rPr lang="en-US" dirty="0" smtClean="0">
+                <a:sym typeface="Symbol" panose="05050102010706020507" pitchFamily="18" charset="2"/>
+              </a:rPr>
+              <a:t></a:t>
+            </a:r>
+            <a:r>
+              <a:rPr lang="en-US" dirty="0" smtClean="0"/>
+              <a:t> C-style: </a:t>
+            </a:r>
+            <a:r>
+              <a:rPr lang="en-US" dirty="0" err="1" smtClean="0">
+                <a:latin typeface="Courier New" panose="02070309020205020404" pitchFamily="49" charset="0"/>
+                <a:cs typeface="Courier New" panose="02070309020205020404" pitchFamily="49" charset="0"/>
+              </a:rPr>
+              <a:t>str.c_str</a:t>
+            </a:r>
+            <a:r>
+              <a:rPr lang="en-US" dirty="0" smtClean="0">
+                <a:latin typeface="Courier New" panose="02070309020205020404" pitchFamily="49" charset="0"/>
+                <a:cs typeface="Courier New" panose="02070309020205020404" pitchFamily="49" charset="0"/>
+              </a:rPr>
+              <a:t>()</a:t>
+            </a:r>
+          </a:p>
+          <a:p>
+            <a:pPr lvl="1"/>
+            <a:r>
+              <a:rPr lang="en-US" dirty="0" smtClean="0"/>
+              <a:t>C-style </a:t>
+            </a:r>
+            <a:r>
+              <a:rPr lang="en-US" dirty="0">
+                <a:sym typeface="Symbol" panose="05050102010706020507" pitchFamily="18" charset="2"/>
+              </a:rPr>
+              <a:t></a:t>
+            </a:r>
+            <a:r>
+              <a:rPr lang="en-US" dirty="0" smtClean="0"/>
+              <a:t> </a:t>
+            </a:r>
+            <a:r>
+              <a:rPr lang="en-US" dirty="0" err="1" smtClean="0"/>
+              <a:t>std</a:t>
+            </a:r>
+            <a:r>
+              <a:rPr lang="en-US" dirty="0" smtClean="0"/>
+              <a:t>::string: </a:t>
+            </a:r>
+            <a:r>
+              <a:rPr lang="en-US" dirty="0" err="1" smtClean="0">
+                <a:latin typeface="Courier New" panose="02070309020205020404" pitchFamily="49" charset="0"/>
+                <a:cs typeface="Courier New" panose="02070309020205020404" pitchFamily="49" charset="0"/>
+              </a:rPr>
+              <a:t>std</a:t>
+            </a:r>
+            <a:r>
+              <a:rPr lang="en-US" dirty="0" smtClean="0">
+                <a:latin typeface="Courier New" panose="02070309020205020404" pitchFamily="49" charset="0"/>
+                <a:cs typeface="Courier New" panose="02070309020205020404" pitchFamily="49" charset="0"/>
+              </a:rPr>
+              <a:t>::string</a:t>
+            </a:r>
+            <a:r>
+              <a:rPr lang="en-US" dirty="0" smtClean="0"/>
+              <a:t> constructor</a:t>
+            </a:r>
+            <a:endParaRPr lang="en-US" dirty="0"/>
+          </a:p>
+        </p:txBody>
+      </p:sp>
+      <p:sp>
+        <p:nvSpPr>
+          <p:cNvPr id="4" name="Slide Number Placeholder 3"/>
+          <p:cNvSpPr>
+            <a:spLocks noGrp="1"/>
+          </p:cNvSpPr>
+          <p:nvPr>
+            <p:ph type="sldNum" sz="quarter" idx="12"/>
+          </p:nvPr>
+        </p:nvSpPr>
+        <p:spPr/>
+        <p:txBody>
+          <a:bodyPr/>
+          <a:lstStyle/>
+          <a:p>
+            <a:fld id="{9CEF4966-5219-4577-B301-14467D565841}" type="slidenum">
+              <a:rPr lang="en-US" smtClean="0"/>
+              <a:t>4</a:t>
+            </a:fld>
+            <a:endParaRPr lang="en-US"/>
+          </a:p>
+        </p:txBody>
+      </p:sp>
+    </p:spTree>
+    <p:extLst>
+      <p:ext uri="{BB962C8B-B14F-4D97-AF65-F5344CB8AC3E}">
+        <p14:creationId xmlns:p14="http://schemas.microsoft.com/office/powerpoint/2010/main" val="2626103437"/>
+      </p:ext>
+    </p:extLst>
+  </p:cSld>
+  <p:clrMapOvr>
+    <a:masterClrMapping/>
+  </p:clrMapOvr>
+  <p:timing>
+    <p:tnLst>
+      <p:par>
+        <p:cTn id="1" dur="indefinite" restart="never" nodeType="tmRoot">
+          <p:childTnLst>
+            <p:seq concurrent="1" nextAc="seek">
+              <p:cTn id="2" dur="indefinite" nodeType="mainSeq">
+                <p:childTnLst>
+                  <p:par>
+                    <p:cTn id="3" fill="hold">
+                      <p:stCondLst>
+                        <p:cond delay="indefinite"/>
+                        <p:cond evt="onBegin" delay="0">
+                          <p:tn val="2"/>
+                        </p:cond>
+                      </p:stCondLst>
+                      <p:childTnLst>
+                        <p:par>
+                          <p:cTn id="4" fill="hold">
+                            <p:stCondLst>
+                              <p:cond delay="0"/>
+                            </p:stCondLst>
+                            <p:childTnLst>
+                              <p:par>
+                                <p:cTn id="5" presetID="1" presetClass="entr" presetSubtype="0" fill="hold" grpId="0" nodeType="withEffect">
+                                  <p:stCondLst>
+                                    <p:cond delay="0"/>
+                                  </p:stCondLst>
+                                  <p:childTnLst>
+                                    <p:set>
+                                      <p:cBhvr>
+                                        <p:cTn id="6" dur="1" fill="hold">
+                                          <p:stCondLst>
+                                            <p:cond delay="0"/>
+                                          </p:stCondLst>
+                                        </p:cTn>
+                                        <p:tgtEl>
+                                          <p:spTgt spid="3">
+                                            <p:txEl>
+                                              <p:pRg st="0" end="0"/>
+                                            </p:txEl>
+                                          </p:spTgt>
+                                        </p:tgtEl>
+                                        <p:attrNameLst>
+                                          <p:attrName>style.visibility</p:attrName>
+                                        </p:attrNameLst>
+                                      </p:cBhvr>
+                                      <p:to>
+                                        <p:strVal val="visible"/>
+                                      </p:to>
+                                    </p:set>
+                                  </p:childTnLst>
+                                </p:cTn>
+                              </p:par>
+                              <p:par>
+                                <p:cTn id="7" presetID="1" presetClass="entr" presetSubtype="0" fill="hold" grpId="0" nodeType="withEffect">
+                                  <p:stCondLst>
+                                    <p:cond delay="0"/>
+                                  </p:stCondLst>
+                                  <p:childTnLst>
+                                    <p:set>
+                                      <p:cBhvr>
+                                        <p:cTn id="8" dur="1" fill="hold">
+                                          <p:stCondLst>
+                                            <p:cond delay="0"/>
+                                          </p:stCondLst>
+                                        </p:cTn>
+                                        <p:tgtEl>
+                                          <p:spTgt spid="3">
+                                            <p:txEl>
+                                              <p:pRg st="1" end="1"/>
+                                            </p:txEl>
+                                          </p:spTgt>
+                                        </p:tgtEl>
+                                        <p:attrNameLst>
+                                          <p:attrName>style.visibility</p:attrName>
+                                        </p:attrNameLst>
+                                      </p:cBhvr>
+                                      <p:to>
+                                        <p:strVal val="visible"/>
+                                      </p:to>
+                                    </p:set>
+                                  </p:childTnLst>
+                                </p:cTn>
+                              </p:par>
+                              <p:par>
+                                <p:cTn id="9" presetID="1" presetClass="entr" presetSubtype="0" fill="hold" grpId="0" nodeType="withEffect">
+                                  <p:stCondLst>
+                                    <p:cond delay="0"/>
+                                  </p:stCondLst>
+                                  <p:childTnLst>
+                                    <p:set>
+                                      <p:cBhvr>
+                                        <p:cTn id="10" dur="1" fill="hold">
+                                          <p:stCondLst>
+                                            <p:cond delay="0"/>
+                                          </p:stCondLst>
+                                        </p:cTn>
+                                        <p:tgtEl>
+                                          <p:spTgt spid="3">
+                                            <p:txEl>
+                                              <p:pRg st="2" end="2"/>
+                                            </p:txEl>
+                                          </p:spTgt>
+                                        </p:tgtEl>
+                                        <p:attrNameLst>
+                                          <p:attrName>style.visibility</p:attrName>
+                                        </p:attrNameLst>
+                                      </p:cBhvr>
+                                      <p:to>
+                                        <p:strVal val="visible"/>
+                                      </p:to>
+                                    </p:set>
+                                  </p:childTnLst>
+                                </p:cTn>
+                              </p:par>
+                              <p:par>
+                                <p:cTn id="11" presetID="1" presetClass="entr" presetSubtype="0" fill="hold" grpId="0" nodeType="withEffect">
+                                  <p:stCondLst>
+                                    <p:cond delay="0"/>
+                                  </p:stCondLst>
+                                  <p:childTnLst>
+                                    <p:set>
+                                      <p:cBhvr>
+                                        <p:cTn id="12" dur="1" fill="hold">
+                                          <p:stCondLst>
+                                            <p:cond delay="0"/>
+                                          </p:stCondLst>
+                                        </p:cTn>
+                                        <p:tgtEl>
+                                          <p:spTgt spid="3">
+                                            <p:txEl>
+                                              <p:pRg st="3" end="3"/>
+                                            </p:txEl>
+                                          </p:spTgt>
+                                        </p:tgtEl>
+                                        <p:attrNameLst>
+                                          <p:attrName>style.visibility</p:attrName>
+                                        </p:attrNameLst>
+                                      </p:cBhvr>
+                                      <p:to>
+                                        <p:strVal val="visible"/>
+                                      </p:to>
+                                    </p:set>
+                                  </p:childTnLst>
+                                </p:cTn>
+                              </p:par>
+                            </p:childTnLst>
+                          </p:cTn>
+                        </p:par>
+                      </p:childTnLst>
+                    </p:cTn>
+                  </p:par>
+                  <p:par>
+                    <p:cTn id="13" fill="hold">
+                      <p:stCondLst>
+                        <p:cond delay="indefinite"/>
+                      </p:stCondLst>
+                      <p:childTnLst>
+                        <p:par>
+                          <p:cTn id="14" fill="hold">
+                            <p:stCondLst>
+                              <p:cond delay="0"/>
+                            </p:stCondLst>
+                            <p:childTnLst>
+                              <p:par>
+                                <p:cTn id="15" presetID="1" presetClass="entr" presetSubtype="0" fill="hold" grpId="0" nodeType="clickEffect">
+                                  <p:stCondLst>
+                                    <p:cond delay="0"/>
+                                  </p:stCondLst>
+                                  <p:childTnLst>
+                                    <p:set>
+                                      <p:cBhvr>
+                                        <p:cTn id="16" dur="1" fill="hold">
+                                          <p:stCondLst>
+                                            <p:cond delay="0"/>
+                                          </p:stCondLst>
+                                        </p:cTn>
+                                        <p:tgtEl>
+                                          <p:spTgt spid="3">
+                                            <p:txEl>
+                                              <p:pRg st="4" end="4"/>
+                                            </p:txEl>
+                                          </p:spTgt>
+                                        </p:tgtEl>
+                                        <p:attrNameLst>
+                                          <p:attrName>style.visibility</p:attrName>
+                                        </p:attrNameLst>
+                                      </p:cBhvr>
+                                      <p:to>
+                                        <p:strVal val="visible"/>
+                                      </p:to>
+                                    </p:set>
+                                  </p:childTnLst>
+                                </p:cTn>
+                              </p:par>
+                            </p:childTnLst>
+                          </p:cTn>
+                        </p:par>
+                      </p:childTnLst>
+                    </p:cTn>
+                  </p:par>
+                  <p:par>
+                    <p:cTn id="17" fill="hold">
+                      <p:stCondLst>
+                        <p:cond delay="indefinite"/>
+                      </p:stCondLst>
+                      <p:childTnLst>
+                        <p:par>
+                          <p:cTn id="18" fill="hold">
+                            <p:stCondLst>
+                              <p:cond delay="0"/>
+                            </p:stCondLst>
+                            <p:childTnLst>
+                              <p:par>
+                                <p:cTn id="19" presetID="1" presetClass="entr" presetSubtype="0" fill="hold" grpId="0" nodeType="clickEffect">
+                                  <p:stCondLst>
+                                    <p:cond delay="0"/>
+                                  </p:stCondLst>
+                                  <p:childTnLst>
+                                    <p:set>
+                                      <p:cBhvr>
+                                        <p:cTn id="20" dur="1" fill="hold">
+                                          <p:stCondLst>
+                                            <p:cond delay="0"/>
+                                          </p:stCondLst>
+                                        </p:cTn>
+                                        <p:tgtEl>
+                                          <p:spTgt spid="3">
+                                            <p:txEl>
+                                              <p:pRg st="5" end="5"/>
+                                            </p:txEl>
+                                          </p:spTgt>
+                                        </p:tgtEl>
+                                        <p:attrNameLst>
+                                          <p:attrName>style.visibility</p:attrName>
+                                        </p:attrNameLst>
+                                      </p:cBhvr>
+                                      <p:to>
+                                        <p:strVal val="visible"/>
+                                      </p:to>
+                                    </p:set>
+                                  </p:childTnLst>
+                                </p:cTn>
+                              </p:par>
+                              <p:par>
+                                <p:cTn id="21" presetID="1" presetClass="entr" presetSubtype="0" fill="hold" grpId="0" nodeType="withEffect">
+                                  <p:stCondLst>
+                                    <p:cond delay="0"/>
+                                  </p:stCondLst>
+                                  <p:childTnLst>
+                                    <p:set>
+                                      <p:cBhvr>
+                                        <p:cTn id="22" dur="1" fill="hold">
+                                          <p:stCondLst>
+                                            <p:cond delay="0"/>
+                                          </p:stCondLst>
+                                        </p:cTn>
+                                        <p:tgtEl>
+                                          <p:spTgt spid="3">
+                                            <p:txEl>
+                                              <p:pRg st="6" end="6"/>
+                                            </p:txEl>
+                                          </p:spTgt>
+                                        </p:tgtEl>
+                                        <p:attrNameLst>
+                                          <p:attrName>style.visibility</p:attrName>
+                                        </p:attrNameLst>
+                                      </p:cBhvr>
+                                      <p:to>
+                                        <p:strVal val="visible"/>
+                                      </p:to>
+                                    </p:set>
+                                  </p:childTnLst>
+                                </p:cTn>
+                              </p:par>
+                              <p:par>
+                                <p:cTn id="23" presetID="1" presetClass="entr" presetSubtype="0" fill="hold" grpId="0" nodeType="withEffect">
+                                  <p:stCondLst>
+                                    <p:cond delay="0"/>
+                                  </p:stCondLst>
+                                  <p:childTnLst>
+                                    <p:set>
+                                      <p:cBhvr>
+                                        <p:cTn id="24" dur="1" fill="hold">
+                                          <p:stCondLst>
+                                            <p:cond delay="0"/>
+                                          </p:stCondLst>
+                                        </p:cTn>
+                                        <p:tgtEl>
+                                          <p:spTgt spid="3">
+                                            <p:txEl>
+                                              <p:pRg st="7" end="7"/>
+                                            </p:txEl>
+                                          </p:spTgt>
+                                        </p:tgtEl>
+                                        <p:attrNameLst>
+                                          <p:attrName>style.visibility</p:attrName>
+                                        </p:attrNameLst>
+                                      </p:cBhvr>
+                                      <p:to>
+                                        <p:strVal val="visible"/>
+                                      </p:to>
+                                    </p:set>
+                                  </p:childTnLst>
+                                </p:cTn>
+                              </p:par>
+                            </p:childTnLst>
+                          </p:cTn>
+                        </p:par>
+                      </p:childTnLst>
+                    </p:cTn>
+                  </p:par>
+                </p:childTnLst>
+              </p:cTn>
+              <p:prevCondLst>
+                <p:cond evt="onPrev" delay="0">
+                  <p:tgtEl>
+                    <p:sldTgt/>
+                  </p:tgtEl>
+                </p:cond>
+              </p:prevCondLst>
+              <p:nextCondLst>
+                <p:cond evt="onNext" delay="0">
+                  <p:tgtEl>
+                    <p:sldTgt/>
+                  </p:tgtEl>
+                </p:cond>
+              </p:nextCondLst>
+            </p:seq>
+          </p:childTnLst>
+        </p:cTn>
+      </p:par>
+    </p:tnLst>
+    <p:bldLst>
+      <p:bldP spid="3" grpId="0" uiExpand="1" build="p"/>
+    </p:bldLst>
+  </p:timing>
+</p:sld>
+</file>
+
+<file path=ppt/slides/slide5.xml><?xml version="1.0" encoding="utf-8"?>
+<p:sld xmlns:a="http://schemas.openxmlformats.org/drawingml/2006/main" xmlns:r="http://schemas.openxmlformats.org/officeDocument/2006/relationships" xmlns:p="http://schemas.openxmlformats.org/presentationml/2006/main">
+  <p:cSld>
+    <p:spTree>
+      <p:nvGrpSpPr>
+        <p:cNvPr id="1" name=""/>
+        <p:cNvGrpSpPr/>
+        <p:nvPr/>
+      </p:nvGrpSpPr>
+      <p:grpSpPr>
+        <a:xfrm>
+          <a:off x="0" y="0"/>
+          <a:ext cx="0" cy="0"/>
+          <a:chOff x="0" y="0"/>
+          <a:chExt cx="0" cy="0"/>
+        </a:xfrm>
+      </p:grpSpPr>
+      <p:sp>
+        <p:nvSpPr>
+          <p:cNvPr id="2" name="Title 1"/>
+          <p:cNvSpPr>
+            <a:spLocks noGrp="1"/>
+          </p:cNvSpPr>
+          <p:nvPr>
+            <p:ph type="title"/>
+          </p:nvPr>
+        </p:nvSpPr>
+        <p:spPr/>
+        <p:txBody>
+          <a:bodyPr/>
+          <a:lstStyle/>
+          <a:p>
+            <a:r>
               <a:rPr lang="en-US" dirty="0" smtClean="0"/>
               <a:t>Regular expressions: definition</a:t>
             </a:r>
@@ -10076,7 +10962,7 @@
           <a:p>
             <a:fld id="{5A209D72-2E9D-49B0-8977-41DCCC66C0BB}" type="slidenum">
               <a:rPr lang="nl-BE" smtClean="0"/>
-              <a:t>4</a:t>
+              <a:t>5</a:t>
             </a:fld>
             <a:endParaRPr lang="nl-BE"/>
           </a:p>
@@ -10448,7 +11334,7 @@
 </p:sld>
 </file>
 
-<file path=ppt/slides/slide5.xml><?xml version="1.0" encoding="utf-8"?>
+<file path=ppt/slides/slide6.xml><?xml version="1.0" encoding="utf-8"?>
 <p:sld xmlns:a="http://schemas.openxmlformats.org/drawingml/2006/main" xmlns:r="http://schemas.openxmlformats.org/officeDocument/2006/relationships" xmlns:p="http://schemas.openxmlformats.org/presentationml/2006/main">
   <p:cSld>
     <p:spTree>
@@ -10618,7 +11504,7 @@
           <a:p>
             <a:fld id="{5A209D72-2E9D-49B0-8977-41DCCC66C0BB}" type="slidenum">
               <a:rPr lang="nl-BE" smtClean="0"/>
-              <a:t>5</a:t>
+              <a:t>6</a:t>
             </a:fld>
             <a:endParaRPr lang="nl-BE"/>
           </a:p>
@@ -10944,7 +11830,7 @@
 </p:sld>
 </file>
 
-<file path=ppt/slides/slide6.xml><?xml version="1.0" encoding="utf-8"?>
+<file path=ppt/slides/slide7.xml><?xml version="1.0" encoding="utf-8"?>
 <p:sld xmlns:a="http://schemas.openxmlformats.org/drawingml/2006/main" xmlns:r="http://schemas.openxmlformats.org/officeDocument/2006/relationships" xmlns:p="http://schemas.openxmlformats.org/presentationml/2006/main">
   <p:cSld>
     <p:spTree>
@@ -11417,7 +12303,7 @@
           <a:p>
             <a:fld id="{5A209D72-2E9D-49B0-8977-41DCCC66C0BB}" type="slidenum">
               <a:rPr lang="nl-BE" smtClean="0"/>
-              <a:t>6</a:t>
+              <a:t>7</a:t>
             </a:fld>
             <a:endParaRPr lang="nl-BE"/>
           </a:p>
@@ -11774,7 +12660,7 @@
 </p:sld>
 </file>
 
-<file path=ppt/slides/slide7.xml><?xml version="1.0" encoding="utf-8"?>
+<file path=ppt/slides/slide8.xml><?xml version="1.0" encoding="utf-8"?>
 <p:sld xmlns:a="http://schemas.openxmlformats.org/drawingml/2006/main" xmlns:r="http://schemas.openxmlformats.org/officeDocument/2006/relationships" xmlns:p="http://schemas.openxmlformats.org/presentationml/2006/main">
   <p:cSld>
     <p:spTree>
@@ -12495,7 +13381,7 @@
           <a:p>
             <a:fld id="{5A209D72-2E9D-49B0-8977-41DCCC66C0BB}" type="slidenum">
               <a:rPr lang="nl-BE" smtClean="0"/>
-              <a:t>7</a:t>
+              <a:t>8</a:t>
             </a:fld>
             <a:endParaRPr lang="nl-BE"/>
           </a:p>
@@ -13036,7 +13922,7 @@
 </p:sld>
 </file>
 
-<file path=ppt/slides/slide8.xml><?xml version="1.0" encoding="utf-8"?>
+<file path=ppt/slides/slide9.xml><?xml version="1.0" encoding="utf-8"?>
 <p:sld xmlns:a="http://schemas.openxmlformats.org/drawingml/2006/main" xmlns:r="http://schemas.openxmlformats.org/officeDocument/2006/relationships" xmlns:p="http://schemas.openxmlformats.org/presentationml/2006/main">
   <p:cSld>
     <p:spTree>
@@ -13328,7 +14214,7 @@
           <a:p>
             <a:fld id="{5A209D72-2E9D-49B0-8977-41DCCC66C0BB}" type="slidenum">
               <a:rPr lang="nl-BE" smtClean="0"/>
-              <a:t>8</a:t>
+              <a:t>9</a:t>
             </a:fld>
             <a:endParaRPr lang="nl-BE"/>
           </a:p>
@@ -13338,308 +14224,6 @@
     <p:extLst>
       <p:ext uri="{BB962C8B-B14F-4D97-AF65-F5344CB8AC3E}">
         <p14:creationId xmlns:p14="http://schemas.microsoft.com/office/powerpoint/2010/main" val="4090625260"/>
-      </p:ext>
-    </p:extLst>
-  </p:cSld>
-  <p:clrMapOvr>
-    <a:masterClrMapping/>
-  </p:clrMapOvr>
-  <p:timing>
-    <p:tnLst>
-      <p:par>
-        <p:cTn id="1" dur="indefinite" restart="never" nodeType="tmRoot"/>
-      </p:par>
-    </p:tnLst>
-  </p:timing>
-</p:sld>
-</file>
-
-<file path=ppt/slides/slide9.xml><?xml version="1.0" encoding="utf-8"?>
-<p:sld xmlns:a="http://schemas.openxmlformats.org/drawingml/2006/main" xmlns:r="http://schemas.openxmlformats.org/officeDocument/2006/relationships" xmlns:p="http://schemas.openxmlformats.org/presentationml/2006/main">
-  <p:cSld>
-    <p:spTree>
-      <p:nvGrpSpPr>
-        <p:cNvPr id="1" name=""/>
-        <p:cNvGrpSpPr/>
-        <p:nvPr/>
-      </p:nvGrpSpPr>
-      <p:grpSpPr>
-        <a:xfrm>
-          <a:off x="0" y="0"/>
-          <a:ext cx="0" cy="0"/>
-          <a:chOff x="0" y="0"/>
-          <a:chExt cx="0" cy="0"/>
-        </a:xfrm>
-      </p:grpSpPr>
-      <p:sp>
-        <p:nvSpPr>
-          <p:cNvPr id="2" name="Title 1"/>
-          <p:cNvSpPr>
-            <a:spLocks noGrp="1"/>
-          </p:cNvSpPr>
-          <p:nvPr>
-            <p:ph type="title"/>
-          </p:nvPr>
-        </p:nvSpPr>
-        <p:spPr/>
-        <p:txBody>
-          <a:bodyPr>
-            <a:normAutofit/>
-          </a:bodyPr>
-          <a:lstStyle/>
-          <a:p>
-            <a:r>
-              <a:rPr lang="en-US" dirty="0" smtClean="0"/>
-              <a:t>Regular expressions: character classes</a:t>
-            </a:r>
-            <a:endParaRPr lang="en-US" dirty="0"/>
-          </a:p>
-        </p:txBody>
-      </p:sp>
-      <p:sp>
-        <p:nvSpPr>
-          <p:cNvPr id="3" name="Content Placeholder 2"/>
-          <p:cNvSpPr>
-            <a:spLocks noGrp="1"/>
-          </p:cNvSpPr>
-          <p:nvPr>
-            <p:ph idx="1"/>
-          </p:nvPr>
-        </p:nvSpPr>
-        <p:spPr/>
-        <p:txBody>
-          <a:bodyPr>
-            <a:normAutofit fontScale="85000" lnSpcReduction="20000"/>
-          </a:bodyPr>
-          <a:lstStyle/>
-          <a:p>
-            <a:r>
-              <a:rPr lang="en-US">
-                <a:latin typeface="Courier New" panose="02070309020205020404" pitchFamily="49" charset="0"/>
-                <a:cs typeface="Courier New" panose="02070309020205020404" pitchFamily="49" charset="0"/>
-              </a:rPr>
-              <a:t>x</a:t>
-            </a:r>
-            <a:r>
-              <a:rPr lang="en-US" smtClean="0"/>
-              <a:t>                =  </a:t>
-            </a:r>
-            <a:r>
-              <a:rPr lang="en-US" dirty="0" smtClean="0"/>
-              <a:t>{'x'}</a:t>
-            </a:r>
-          </a:p>
-          <a:p>
-            <a:r>
-              <a:rPr lang="en-US" dirty="0" smtClean="0">
-                <a:latin typeface="Courier New" pitchFamily="49" charset="0"/>
-                <a:cs typeface="Courier New" pitchFamily="49" charset="0"/>
-              </a:rPr>
-              <a:t>[xyz]  </a:t>
-            </a:r>
-            <a:r>
-              <a:rPr lang="en-US" dirty="0" smtClean="0"/>
-              <a:t>=  {'x', 'y', 'z'}</a:t>
-            </a:r>
-            <a:endParaRPr lang="en-US" dirty="0" smtClean="0">
-              <a:latin typeface="Courier New" pitchFamily="49" charset="0"/>
-              <a:cs typeface="Courier New" pitchFamily="49" charset="0"/>
-            </a:endParaRPr>
-          </a:p>
-          <a:p>
-            <a:r>
-              <a:rPr lang="en-US" dirty="0" smtClean="0">
-                <a:latin typeface="Courier New" pitchFamily="49" charset="0"/>
-                <a:cs typeface="Courier New" pitchFamily="49" charset="0"/>
-              </a:rPr>
-              <a:t>[x-z]</a:t>
-            </a:r>
-            <a:r>
-              <a:rPr lang="en-US" dirty="0" smtClean="0"/>
-              <a:t>     =  {c | 'x' </a:t>
-            </a:r>
-            <a:r>
-              <a:rPr lang="en-US" dirty="0" smtClean="0">
-                <a:sym typeface="Symbol"/>
-              </a:rPr>
-              <a:t></a:t>
-            </a:r>
-            <a:r>
-              <a:rPr lang="en-US" dirty="0" smtClean="0"/>
-              <a:t> c </a:t>
-            </a:r>
-            <a:r>
-              <a:rPr lang="en-US" dirty="0">
-                <a:sym typeface="Symbol"/>
-              </a:rPr>
-              <a:t></a:t>
-            </a:r>
-            <a:r>
-              <a:rPr lang="en-US" dirty="0" smtClean="0"/>
-              <a:t> 'z'}</a:t>
-            </a:r>
-          </a:p>
-          <a:p>
-            <a:r>
-              <a:rPr lang="en-US" dirty="0" smtClean="0">
-                <a:latin typeface="Courier New" pitchFamily="49" charset="0"/>
-                <a:cs typeface="Courier New" pitchFamily="49" charset="0"/>
-              </a:rPr>
-              <a:t>[^xyz] </a:t>
-            </a:r>
-            <a:r>
-              <a:rPr lang="en-US" dirty="0" smtClean="0"/>
-              <a:t>=  {any} \ {'x', 'y', 'z'}</a:t>
-            </a:r>
-          </a:p>
-          <a:p>
-            <a:r>
-              <a:rPr lang="en-US" dirty="0" smtClean="0">
-                <a:latin typeface="Courier New" pitchFamily="49" charset="0"/>
-                <a:cs typeface="Courier New" pitchFamily="49" charset="0"/>
-              </a:rPr>
-              <a:t>\w</a:t>
-            </a:r>
-            <a:r>
-              <a:rPr lang="en-US" dirty="0" smtClean="0"/>
-              <a:t>             =  {'A',…,'Z', 'a',…,'z', '0',…,'9', '_'}</a:t>
-            </a:r>
-          </a:p>
-          <a:p>
-            <a:r>
-              <a:rPr lang="en-US" dirty="0" smtClean="0">
-                <a:latin typeface="Courier New" pitchFamily="49" charset="0"/>
-                <a:cs typeface="Courier New" pitchFamily="49" charset="0"/>
-              </a:rPr>
-              <a:t>\W</a:t>
-            </a:r>
-            <a:r>
-              <a:rPr lang="en-US" dirty="0" smtClean="0"/>
-              <a:t>             =  {any} \ </a:t>
-            </a:r>
-            <a:r>
-              <a:rPr lang="en-US" dirty="0"/>
-              <a:t>{'A',…,'Z', 'a',…,'z', '0',…,'9', '_'}</a:t>
-            </a:r>
-          </a:p>
-          <a:p>
-            <a:r>
-              <a:rPr lang="en-US" dirty="0" smtClean="0">
-                <a:latin typeface="Courier New" pitchFamily="49" charset="0"/>
-                <a:cs typeface="Courier New" pitchFamily="49" charset="0"/>
-              </a:rPr>
-              <a:t>\d</a:t>
-            </a:r>
-            <a:r>
-              <a:rPr lang="en-US" dirty="0" smtClean="0"/>
-              <a:t>             =  {'0',…,'9'}</a:t>
-            </a:r>
-          </a:p>
-          <a:p>
-            <a:r>
-              <a:rPr lang="en-US" dirty="0" smtClean="0">
-                <a:latin typeface="Courier New" pitchFamily="49" charset="0"/>
-                <a:cs typeface="Courier New" pitchFamily="49" charset="0"/>
-              </a:rPr>
-              <a:t>\D</a:t>
-            </a:r>
-            <a:r>
-              <a:rPr lang="en-US" dirty="0" smtClean="0"/>
-              <a:t>             =  {any} </a:t>
-            </a:r>
-            <a:r>
-              <a:rPr lang="en-US" dirty="0"/>
-              <a:t>\</a:t>
-            </a:r>
-            <a:r>
-              <a:rPr lang="en-US" dirty="0" smtClean="0"/>
-              <a:t> {'0',…,'9'}</a:t>
-            </a:r>
-          </a:p>
-          <a:p>
-            <a:r>
-              <a:rPr lang="en-US" dirty="0" smtClean="0">
-                <a:latin typeface="Courier New" pitchFamily="49" charset="0"/>
-                <a:cs typeface="Courier New" pitchFamily="49" charset="0"/>
-              </a:rPr>
-              <a:t>\s     </a:t>
-            </a:r>
-            <a:r>
-              <a:rPr lang="en-US" dirty="0" smtClean="0"/>
-              <a:t>=  {' ', '\t', '\f', '\r', '\n', '\v'}         (white space)</a:t>
-            </a:r>
-          </a:p>
-          <a:p>
-            <a:r>
-              <a:rPr lang="en-US" dirty="0" smtClean="0">
-                <a:latin typeface="Courier New" pitchFamily="49" charset="0"/>
-                <a:cs typeface="Courier New" pitchFamily="49" charset="0"/>
-              </a:rPr>
-              <a:t>\S</a:t>
-            </a:r>
-            <a:r>
-              <a:rPr lang="en-US" dirty="0" smtClean="0"/>
-              <a:t>             =  {any} </a:t>
-            </a:r>
-            <a:r>
-              <a:rPr lang="en-US" dirty="0"/>
-              <a:t>\</a:t>
-            </a:r>
-            <a:r>
-              <a:rPr lang="en-US" dirty="0" smtClean="0"/>
-              <a:t> {' </a:t>
-            </a:r>
-            <a:r>
-              <a:rPr lang="en-US" dirty="0"/>
-              <a:t>', '\t', '\f', '\r', '\</a:t>
-            </a:r>
-            <a:r>
-              <a:rPr lang="en-US" dirty="0" smtClean="0"/>
-              <a:t>n', '\v'}</a:t>
-            </a:r>
-          </a:p>
-          <a:p>
-            <a:r>
-              <a:rPr lang="en-US" dirty="0">
-                <a:latin typeface="Courier New" pitchFamily="49" charset="0"/>
-                <a:cs typeface="Courier New" pitchFamily="49" charset="0"/>
-              </a:rPr>
-              <a:t>.</a:t>
-            </a:r>
-            <a:r>
-              <a:rPr lang="en-US" dirty="0"/>
-              <a:t>                =  {any} \ {'\n'}</a:t>
-            </a:r>
-          </a:p>
-        </p:txBody>
-      </p:sp>
-      <p:sp>
-        <p:nvSpPr>
-          <p:cNvPr id="4" name="Slide Number Placeholder 3"/>
-          <p:cNvSpPr>
-            <a:spLocks noGrp="1"/>
-          </p:cNvSpPr>
-          <p:nvPr>
-            <p:ph type="sldNum" sz="quarter" idx="12"/>
-          </p:nvPr>
-        </p:nvSpPr>
-        <p:spPr/>
-        <p:txBody>
-          <a:bodyPr/>
-          <a:lstStyle/>
-          <a:p>
-            <a:fld id="{5A209D72-2E9D-49B0-8977-41DCCC66C0BB}" type="slidenum">
-              <a:rPr lang="nl-BE" smtClean="0"/>
-              <a:t>9</a:t>
-            </a:fld>
-            <a:endParaRPr lang="nl-BE"/>
-          </a:p>
-        </p:txBody>
-      </p:sp>
-    </p:spTree>
-    <p:extLst>
-      <p:ext uri="{BB962C8B-B14F-4D97-AF65-F5344CB8AC3E}">
-        <p14:creationId xmlns:p14="http://schemas.microsoft.com/office/powerpoint/2010/main" val="1467190624"/>
       </p:ext>
     </p:extLst>
   </p:cSld>

</xml_diff>

<commit_message>
Added remarks on regex use
</commit_message>
<xml_diff>
--- a/CPlusPlus/06_essential_cpp_regex.pptx
+++ b/CPlusPlus/06_essential_cpp_regex.pptx
@@ -5,7 +5,7 @@
     <p:sldMasterId id="2147483660" r:id="rId1"/>
   </p:sldMasterIdLst>
   <p:notesMasterIdLst>
-    <p:notesMasterId r:id="rId20"/>
+    <p:notesMasterId r:id="rId21"/>
   </p:notesMasterIdLst>
   <p:sldIdLst>
     <p:sldId id="257" r:id="rId2"/>
@@ -25,7 +25,8 @@
     <p:sldId id="271" r:id="rId16"/>
     <p:sldId id="272" r:id="rId17"/>
     <p:sldId id="273" r:id="rId18"/>
-    <p:sldId id="260" r:id="rId19"/>
+    <p:sldId id="275" r:id="rId19"/>
+    <p:sldId id="260" r:id="rId20"/>
   </p:sldIdLst>
   <p:sldSz cx="9144000" cy="6858000" type="screen4x3"/>
   <p:notesSz cx="6858000" cy="9144000"/>
@@ -8521,6 +8522,674 @@
           <a:p>
             <a:r>
               <a:rPr lang="en-US" dirty="0" smtClean="0"/>
+              <a:t>Miscellaneous remarks</a:t>
+            </a:r>
+            <a:endParaRPr lang="en-US" dirty="0"/>
+          </a:p>
+        </p:txBody>
+      </p:sp>
+      <p:sp>
+        <p:nvSpPr>
+          <p:cNvPr id="3" name="Content Placeholder 2"/>
+          <p:cNvSpPr>
+            <a:spLocks noGrp="1"/>
+          </p:cNvSpPr>
+          <p:nvPr>
+            <p:ph idx="1"/>
+          </p:nvPr>
+        </p:nvSpPr>
+        <p:spPr/>
+        <p:txBody>
+          <a:bodyPr/>
+          <a:lstStyle/>
+          <a:p>
+            <a:r>
+              <a:rPr lang="en-US" dirty="0" smtClean="0"/>
+              <a:t>Regular expressions are</a:t>
+            </a:r>
+          </a:p>
+          <a:p>
+            <a:pPr lvl="1"/>
+            <a:r>
+              <a:rPr lang="en-US" dirty="0" smtClean="0"/>
+              <a:t>powerful</a:t>
+            </a:r>
+          </a:p>
+          <a:p>
+            <a:pPr lvl="1"/>
+            <a:r>
+              <a:rPr lang="en-US" dirty="0" smtClean="0"/>
+              <a:t>somewhat slow</a:t>
+            </a:r>
+          </a:p>
+          <a:p>
+            <a:r>
+              <a:rPr lang="en-US" dirty="0" smtClean="0"/>
+              <a:t>Two functions</a:t>
+            </a:r>
+          </a:p>
+          <a:p>
+            <a:pPr lvl="1"/>
+            <a:r>
+              <a:rPr lang="en-US" dirty="0" err="1" smtClean="0"/>
+              <a:t>regex_search</a:t>
+            </a:r>
+            <a:r>
+              <a:rPr lang="en-US" dirty="0" smtClean="0"/>
+              <a:t>: works on streams </a:t>
+            </a:r>
+            <a:r>
+              <a:rPr lang="en-US" dirty="0" smtClean="0">
+                <a:sym typeface="Symbol" panose="05050102010706020507" pitchFamily="18" charset="2"/>
+              </a:rPr>
+              <a:t> more versatile</a:t>
+            </a:r>
+            <a:endParaRPr lang="en-US" dirty="0" smtClean="0"/>
+          </a:p>
+          <a:p>
+            <a:pPr lvl="1"/>
+            <a:r>
+              <a:rPr lang="en-US" dirty="0" err="1" smtClean="0"/>
+              <a:t>regex_match</a:t>
+            </a:r>
+            <a:r>
+              <a:rPr lang="en-US" dirty="0" smtClean="0"/>
+              <a:t>: works on strings only </a:t>
+            </a:r>
+            <a:r>
+              <a:rPr lang="en-US" dirty="0" smtClean="0">
+                <a:sym typeface="Symbol" panose="05050102010706020507" pitchFamily="18" charset="2"/>
+              </a:rPr>
+              <a:t> better performance</a:t>
+            </a:r>
+          </a:p>
+          <a:p>
+            <a:r>
+              <a:rPr lang="en-US" dirty="0" smtClean="0">
+                <a:sym typeface="Symbol" panose="05050102010706020507" pitchFamily="18" charset="2"/>
+              </a:rPr>
+              <a:t>Modifiers</a:t>
+            </a:r>
+          </a:p>
+          <a:p>
+            <a:pPr lvl="1"/>
+            <a:r>
+              <a:rPr lang="en-US" dirty="0" smtClean="0">
+                <a:sym typeface="Symbol" panose="05050102010706020507" pitchFamily="18" charset="2"/>
+              </a:rPr>
+              <a:t>case insensitive: </a:t>
+            </a:r>
+            <a:r>
+              <a:rPr lang="en-US" dirty="0" smtClean="0">
+                <a:latin typeface="Courier New" panose="02070309020205020404" pitchFamily="49" charset="0"/>
+                <a:cs typeface="Courier New" panose="02070309020205020404" pitchFamily="49" charset="0"/>
+                <a:sym typeface="Symbol" panose="05050102010706020507" pitchFamily="18" charset="2"/>
+              </a:rPr>
+              <a:t>regex expr(…, </a:t>
+            </a:r>
+            <a:r>
+              <a:rPr lang="en-US" b="1" dirty="0" smtClean="0">
+                <a:solidFill>
+                  <a:srgbClr val="C00000"/>
+                </a:solidFill>
+                <a:latin typeface="Courier New" panose="02070309020205020404" pitchFamily="49" charset="0"/>
+                <a:cs typeface="Courier New" panose="02070309020205020404" pitchFamily="49" charset="0"/>
+                <a:sym typeface="Symbol" panose="05050102010706020507" pitchFamily="18" charset="2"/>
+              </a:rPr>
+              <a:t>regex::</a:t>
+            </a:r>
+            <a:r>
+              <a:rPr lang="en-US" b="1" dirty="0" err="1" smtClean="0">
+                <a:solidFill>
+                  <a:srgbClr val="C00000"/>
+                </a:solidFill>
+                <a:latin typeface="Courier New" panose="02070309020205020404" pitchFamily="49" charset="0"/>
+                <a:cs typeface="Courier New" panose="02070309020205020404" pitchFamily="49" charset="0"/>
+                <a:sym typeface="Symbol" panose="05050102010706020507" pitchFamily="18" charset="2"/>
+              </a:rPr>
+              <a:t>icase</a:t>
+            </a:r>
+            <a:r>
+              <a:rPr lang="en-US" dirty="0" smtClean="0">
+                <a:latin typeface="Courier New" panose="02070309020205020404" pitchFamily="49" charset="0"/>
+                <a:cs typeface="Courier New" panose="02070309020205020404" pitchFamily="49" charset="0"/>
+                <a:sym typeface="Symbol" panose="05050102010706020507" pitchFamily="18" charset="2"/>
+              </a:rPr>
+              <a:t>)</a:t>
+            </a:r>
+          </a:p>
+          <a:p>
+            <a:pPr lvl="1"/>
+            <a:r>
+              <a:rPr lang="en-US" dirty="0" smtClean="0">
+                <a:sym typeface="Symbol" panose="05050102010706020507" pitchFamily="18" charset="2"/>
+              </a:rPr>
+              <a:t>more to come in C++17</a:t>
+            </a:r>
+          </a:p>
+        </p:txBody>
+      </p:sp>
+      <p:sp>
+        <p:nvSpPr>
+          <p:cNvPr id="4" name="Slide Number Placeholder 3"/>
+          <p:cNvSpPr>
+            <a:spLocks noGrp="1"/>
+          </p:cNvSpPr>
+          <p:nvPr>
+            <p:ph type="sldNum" sz="quarter" idx="12"/>
+          </p:nvPr>
+        </p:nvSpPr>
+        <p:spPr/>
+        <p:txBody>
+          <a:bodyPr/>
+          <a:lstStyle/>
+          <a:p>
+            <a:fld id="{9CEF4966-5219-4577-B301-14467D565841}" type="slidenum">
+              <a:rPr lang="en-US" smtClean="0"/>
+              <a:t>18</a:t>
+            </a:fld>
+            <a:endParaRPr lang="en-US"/>
+          </a:p>
+        </p:txBody>
+      </p:sp>
+      <p:sp>
+        <p:nvSpPr>
+          <p:cNvPr id="5" name="TextBox 4"/>
+          <p:cNvSpPr txBox="1"/>
+          <p:nvPr/>
+        </p:nvSpPr>
+        <p:spPr>
+          <a:xfrm>
+            <a:off x="4701008" y="2378218"/>
+            <a:ext cx="2383986" cy="461665"/>
+          </a:xfrm>
+          <a:prstGeom prst="rect">
+            <a:avLst/>
+          </a:prstGeom>
+          <a:noFill/>
+        </p:spPr>
+        <p:txBody>
+          <a:bodyPr wrap="none" rtlCol="0">
+            <a:spAutoFit/>
+          </a:bodyPr>
+          <a:lstStyle/>
+          <a:p>
+            <a:r>
+              <a:rPr lang="en-US" sz="2400" dirty="0" smtClean="0">
+                <a:sym typeface="Symbol" panose="05050102010706020507" pitchFamily="18" charset="2"/>
+              </a:rPr>
+              <a:t> </a:t>
+            </a:r>
+            <a:r>
+              <a:rPr lang="en-US" sz="2400" dirty="0" smtClean="0"/>
+              <a:t>use judiciously</a:t>
+            </a:r>
+            <a:endParaRPr lang="en-US" sz="2400" dirty="0"/>
+          </a:p>
+        </p:txBody>
+      </p:sp>
+    </p:spTree>
+    <p:extLst>
+      <p:ext uri="{BB962C8B-B14F-4D97-AF65-F5344CB8AC3E}">
+        <p14:creationId xmlns:p14="http://schemas.microsoft.com/office/powerpoint/2010/main" val="2049304776"/>
+      </p:ext>
+    </p:extLst>
+  </p:cSld>
+  <p:clrMapOvr>
+    <a:masterClrMapping/>
+  </p:clrMapOvr>
+  <p:timing>
+    <p:tnLst>
+      <p:par>
+        <p:cTn id="1" dur="indefinite" restart="never" nodeType="tmRoot">
+          <p:childTnLst>
+            <p:seq concurrent="1" nextAc="seek">
+              <p:cTn id="2" dur="indefinite" nodeType="mainSeq">
+                <p:childTnLst>
+                  <p:par>
+                    <p:cTn id="3" fill="hold">
+                      <p:stCondLst>
+                        <p:cond delay="indefinite"/>
+                        <p:cond evt="onBegin" delay="0">
+                          <p:tn val="2"/>
+                        </p:cond>
+                      </p:stCondLst>
+                      <p:childTnLst>
+                        <p:par>
+                          <p:cTn id="4" fill="hold">
+                            <p:stCondLst>
+                              <p:cond delay="0"/>
+                            </p:stCondLst>
+                            <p:childTnLst>
+                              <p:par>
+                                <p:cTn id="5" presetID="1" presetClass="entr" presetSubtype="0" fill="hold" grpId="0" nodeType="withEffect">
+                                  <p:stCondLst>
+                                    <p:cond delay="0"/>
+                                  </p:stCondLst>
+                                  <p:childTnLst>
+                                    <p:set>
+                                      <p:cBhvr>
+                                        <p:cTn id="6" dur="1" fill="hold">
+                                          <p:stCondLst>
+                                            <p:cond delay="0"/>
+                                          </p:stCondLst>
+                                        </p:cTn>
+                                        <p:tgtEl>
+                                          <p:spTgt spid="3">
+                                            <p:txEl>
+                                              <p:pRg st="0" end="0"/>
+                                            </p:txEl>
+                                          </p:spTgt>
+                                        </p:tgtEl>
+                                        <p:attrNameLst>
+                                          <p:attrName>style.visibility</p:attrName>
+                                        </p:attrNameLst>
+                                      </p:cBhvr>
+                                      <p:to>
+                                        <p:strVal val="visible"/>
+                                      </p:to>
+                                    </p:set>
+                                  </p:childTnLst>
+                                </p:cTn>
+                              </p:par>
+                              <p:par>
+                                <p:cTn id="7" presetID="1" presetClass="entr" presetSubtype="0" fill="hold" grpId="0" nodeType="withEffect">
+                                  <p:stCondLst>
+                                    <p:cond delay="0"/>
+                                  </p:stCondLst>
+                                  <p:childTnLst>
+                                    <p:set>
+                                      <p:cBhvr>
+                                        <p:cTn id="8" dur="1" fill="hold">
+                                          <p:stCondLst>
+                                            <p:cond delay="0"/>
+                                          </p:stCondLst>
+                                        </p:cTn>
+                                        <p:tgtEl>
+                                          <p:spTgt spid="3">
+                                            <p:txEl>
+                                              <p:pRg st="1" end="1"/>
+                                            </p:txEl>
+                                          </p:spTgt>
+                                        </p:tgtEl>
+                                        <p:attrNameLst>
+                                          <p:attrName>style.visibility</p:attrName>
+                                        </p:attrNameLst>
+                                      </p:cBhvr>
+                                      <p:to>
+                                        <p:strVal val="visible"/>
+                                      </p:to>
+                                    </p:set>
+                                  </p:childTnLst>
+                                </p:cTn>
+                              </p:par>
+                              <p:par>
+                                <p:cTn id="9" presetID="1" presetClass="entr" presetSubtype="0" fill="hold" grpId="0" nodeType="withEffect">
+                                  <p:stCondLst>
+                                    <p:cond delay="0"/>
+                                  </p:stCondLst>
+                                  <p:childTnLst>
+                                    <p:set>
+                                      <p:cBhvr>
+                                        <p:cTn id="10" dur="1" fill="hold">
+                                          <p:stCondLst>
+                                            <p:cond delay="0"/>
+                                          </p:stCondLst>
+                                        </p:cTn>
+                                        <p:tgtEl>
+                                          <p:spTgt spid="3">
+                                            <p:txEl>
+                                              <p:pRg st="2" end="2"/>
+                                            </p:txEl>
+                                          </p:spTgt>
+                                        </p:tgtEl>
+                                        <p:attrNameLst>
+                                          <p:attrName>style.visibility</p:attrName>
+                                        </p:attrNameLst>
+                                      </p:cBhvr>
+                                      <p:to>
+                                        <p:strVal val="visible"/>
+                                      </p:to>
+                                    </p:set>
+                                  </p:childTnLst>
+                                </p:cTn>
+                              </p:par>
+                            </p:childTnLst>
+                          </p:cTn>
+                        </p:par>
+                      </p:childTnLst>
+                    </p:cTn>
+                  </p:par>
+                  <p:par>
+                    <p:cTn id="11" fill="hold">
+                      <p:stCondLst>
+                        <p:cond delay="indefinite"/>
+                      </p:stCondLst>
+                      <p:childTnLst>
+                        <p:par>
+                          <p:cTn id="12" fill="hold">
+                            <p:stCondLst>
+                              <p:cond delay="0"/>
+                            </p:stCondLst>
+                            <p:childTnLst>
+                              <p:par>
+                                <p:cTn id="13" presetID="1" presetClass="entr" presetSubtype="0" fill="hold" grpId="0" nodeType="clickEffect">
+                                  <p:stCondLst>
+                                    <p:cond delay="0"/>
+                                  </p:stCondLst>
+                                  <p:childTnLst>
+                                    <p:set>
+                                      <p:cBhvr>
+                                        <p:cTn id="14" dur="1" fill="hold">
+                                          <p:stCondLst>
+                                            <p:cond delay="0"/>
+                                          </p:stCondLst>
+                                        </p:cTn>
+                                        <p:tgtEl>
+                                          <p:spTgt spid="5"/>
+                                        </p:tgtEl>
+                                        <p:attrNameLst>
+                                          <p:attrName>style.visibility</p:attrName>
+                                        </p:attrNameLst>
+                                      </p:cBhvr>
+                                      <p:to>
+                                        <p:strVal val="visible"/>
+                                      </p:to>
+                                    </p:set>
+                                  </p:childTnLst>
+                                </p:cTn>
+                              </p:par>
+                            </p:childTnLst>
+                          </p:cTn>
+                        </p:par>
+                      </p:childTnLst>
+                    </p:cTn>
+                  </p:par>
+                  <p:par>
+                    <p:cTn id="15" fill="hold">
+                      <p:stCondLst>
+                        <p:cond delay="indefinite"/>
+                      </p:stCondLst>
+                      <p:childTnLst>
+                        <p:par>
+                          <p:cTn id="16" fill="hold">
+                            <p:stCondLst>
+                              <p:cond delay="0"/>
+                            </p:stCondLst>
+                            <p:childTnLst>
+                              <p:par>
+                                <p:cTn id="17" presetID="1" presetClass="entr" presetSubtype="0" fill="hold" grpId="0" nodeType="clickEffect">
+                                  <p:stCondLst>
+                                    <p:cond delay="0"/>
+                                  </p:stCondLst>
+                                  <p:childTnLst>
+                                    <p:set>
+                                      <p:cBhvr>
+                                        <p:cTn id="18" dur="1" fill="hold">
+                                          <p:stCondLst>
+                                            <p:cond delay="0"/>
+                                          </p:stCondLst>
+                                        </p:cTn>
+                                        <p:tgtEl>
+                                          <p:spTgt spid="3">
+                                            <p:txEl>
+                                              <p:pRg st="3" end="3"/>
+                                            </p:txEl>
+                                          </p:spTgt>
+                                        </p:tgtEl>
+                                        <p:attrNameLst>
+                                          <p:attrName>style.visibility</p:attrName>
+                                        </p:attrNameLst>
+                                      </p:cBhvr>
+                                      <p:to>
+                                        <p:strVal val="visible"/>
+                                      </p:to>
+                                    </p:set>
+                                  </p:childTnLst>
+                                </p:cTn>
+                              </p:par>
+                              <p:par>
+                                <p:cTn id="19" presetID="1" presetClass="entr" presetSubtype="0" fill="hold" grpId="0" nodeType="withEffect">
+                                  <p:stCondLst>
+                                    <p:cond delay="0"/>
+                                  </p:stCondLst>
+                                  <p:childTnLst>
+                                    <p:set>
+                                      <p:cBhvr>
+                                        <p:cTn id="20" dur="1" fill="hold">
+                                          <p:stCondLst>
+                                            <p:cond delay="0"/>
+                                          </p:stCondLst>
+                                        </p:cTn>
+                                        <p:tgtEl>
+                                          <p:spTgt spid="3">
+                                            <p:txEl>
+                                              <p:pRg st="4" end="4"/>
+                                            </p:txEl>
+                                          </p:spTgt>
+                                        </p:tgtEl>
+                                        <p:attrNameLst>
+                                          <p:attrName>style.visibility</p:attrName>
+                                        </p:attrNameLst>
+                                      </p:cBhvr>
+                                      <p:to>
+                                        <p:strVal val="visible"/>
+                                      </p:to>
+                                    </p:set>
+                                  </p:childTnLst>
+                                </p:cTn>
+                              </p:par>
+                              <p:par>
+                                <p:cTn id="21" presetID="1" presetClass="entr" presetSubtype="0" fill="hold" grpId="0" nodeType="withEffect">
+                                  <p:stCondLst>
+                                    <p:cond delay="0"/>
+                                  </p:stCondLst>
+                                  <p:childTnLst>
+                                    <p:set>
+                                      <p:cBhvr>
+                                        <p:cTn id="22" dur="1" fill="hold">
+                                          <p:stCondLst>
+                                            <p:cond delay="0"/>
+                                          </p:stCondLst>
+                                        </p:cTn>
+                                        <p:tgtEl>
+                                          <p:spTgt spid="3">
+                                            <p:txEl>
+                                              <p:pRg st="5" end="5"/>
+                                            </p:txEl>
+                                          </p:spTgt>
+                                        </p:tgtEl>
+                                        <p:attrNameLst>
+                                          <p:attrName>style.visibility</p:attrName>
+                                        </p:attrNameLst>
+                                      </p:cBhvr>
+                                      <p:to>
+                                        <p:strVal val="visible"/>
+                                      </p:to>
+                                    </p:set>
+                                  </p:childTnLst>
+                                </p:cTn>
+                              </p:par>
+                            </p:childTnLst>
+                          </p:cTn>
+                        </p:par>
+                      </p:childTnLst>
+                    </p:cTn>
+                  </p:par>
+                  <p:par>
+                    <p:cTn id="23" fill="hold">
+                      <p:stCondLst>
+                        <p:cond delay="indefinite"/>
+                      </p:stCondLst>
+                      <p:childTnLst>
+                        <p:par>
+                          <p:cTn id="24" fill="hold">
+                            <p:stCondLst>
+                              <p:cond delay="0"/>
+                            </p:stCondLst>
+                            <p:childTnLst>
+                              <p:par>
+                                <p:cTn id="25" presetID="1" presetClass="entr" presetSubtype="0" fill="hold" grpId="0" nodeType="clickEffect">
+                                  <p:stCondLst>
+                                    <p:cond delay="0"/>
+                                  </p:stCondLst>
+                                  <p:childTnLst>
+                                    <p:set>
+                                      <p:cBhvr>
+                                        <p:cTn id="26" dur="1" fill="hold">
+                                          <p:stCondLst>
+                                            <p:cond delay="0"/>
+                                          </p:stCondLst>
+                                        </p:cTn>
+                                        <p:tgtEl>
+                                          <p:spTgt spid="3">
+                                            <p:txEl>
+                                              <p:pRg st="6" end="6"/>
+                                            </p:txEl>
+                                          </p:spTgt>
+                                        </p:tgtEl>
+                                        <p:attrNameLst>
+                                          <p:attrName>style.visibility</p:attrName>
+                                        </p:attrNameLst>
+                                      </p:cBhvr>
+                                      <p:to>
+                                        <p:strVal val="visible"/>
+                                      </p:to>
+                                    </p:set>
+                                  </p:childTnLst>
+                                </p:cTn>
+                              </p:par>
+                              <p:par>
+                                <p:cTn id="27" presetID="1" presetClass="entr" presetSubtype="0" fill="hold" grpId="0" nodeType="withEffect">
+                                  <p:stCondLst>
+                                    <p:cond delay="0"/>
+                                  </p:stCondLst>
+                                  <p:childTnLst>
+                                    <p:set>
+                                      <p:cBhvr>
+                                        <p:cTn id="28" dur="1" fill="hold">
+                                          <p:stCondLst>
+                                            <p:cond delay="0"/>
+                                          </p:stCondLst>
+                                        </p:cTn>
+                                        <p:tgtEl>
+                                          <p:spTgt spid="3">
+                                            <p:txEl>
+                                              <p:pRg st="7" end="7"/>
+                                            </p:txEl>
+                                          </p:spTgt>
+                                        </p:tgtEl>
+                                        <p:attrNameLst>
+                                          <p:attrName>style.visibility</p:attrName>
+                                        </p:attrNameLst>
+                                      </p:cBhvr>
+                                      <p:to>
+                                        <p:strVal val="visible"/>
+                                      </p:to>
+                                    </p:set>
+                                  </p:childTnLst>
+                                </p:cTn>
+                              </p:par>
+                              <p:par>
+                                <p:cTn id="29" presetID="1" presetClass="entr" presetSubtype="0" fill="hold" grpId="0" nodeType="withEffect">
+                                  <p:stCondLst>
+                                    <p:cond delay="0"/>
+                                  </p:stCondLst>
+                                  <p:childTnLst>
+                                    <p:set>
+                                      <p:cBhvr>
+                                        <p:cTn id="30" dur="1" fill="hold">
+                                          <p:stCondLst>
+                                            <p:cond delay="0"/>
+                                          </p:stCondLst>
+                                        </p:cTn>
+                                        <p:tgtEl>
+                                          <p:spTgt spid="3">
+                                            <p:txEl>
+                                              <p:pRg st="8" end="8"/>
+                                            </p:txEl>
+                                          </p:spTgt>
+                                        </p:tgtEl>
+                                        <p:attrNameLst>
+                                          <p:attrName>style.visibility</p:attrName>
+                                        </p:attrNameLst>
+                                      </p:cBhvr>
+                                      <p:to>
+                                        <p:strVal val="visible"/>
+                                      </p:to>
+                                    </p:set>
+                                  </p:childTnLst>
+                                </p:cTn>
+                              </p:par>
+                            </p:childTnLst>
+                          </p:cTn>
+                        </p:par>
+                      </p:childTnLst>
+                    </p:cTn>
+                  </p:par>
+                </p:childTnLst>
+              </p:cTn>
+              <p:prevCondLst>
+                <p:cond evt="onPrev" delay="0">
+                  <p:tgtEl>
+                    <p:sldTgt/>
+                  </p:tgtEl>
+                </p:cond>
+              </p:prevCondLst>
+              <p:nextCondLst>
+                <p:cond evt="onNext" delay="0">
+                  <p:tgtEl>
+                    <p:sldTgt/>
+                  </p:tgtEl>
+                </p:cond>
+              </p:nextCondLst>
+            </p:seq>
+          </p:childTnLst>
+        </p:cTn>
+      </p:par>
+    </p:tnLst>
+    <p:bldLst>
+      <p:bldP spid="3" grpId="0" uiExpand="1" build="p"/>
+      <p:bldP spid="5" grpId="0"/>
+    </p:bldLst>
+  </p:timing>
+</p:sld>
+</file>
+
+<file path=ppt/slides/slide19.xml><?xml version="1.0" encoding="utf-8"?>
+<p:sld xmlns:a="http://schemas.openxmlformats.org/drawingml/2006/main" xmlns:r="http://schemas.openxmlformats.org/officeDocument/2006/relationships" xmlns:p="http://schemas.openxmlformats.org/presentationml/2006/main">
+  <p:cSld>
+    <p:spTree>
+      <p:nvGrpSpPr>
+        <p:cNvPr id="1" name=""/>
+        <p:cNvGrpSpPr/>
+        <p:nvPr/>
+      </p:nvGrpSpPr>
+      <p:grpSpPr>
+        <a:xfrm>
+          <a:off x="0" y="0"/>
+          <a:ext cx="0" cy="0"/>
+          <a:chOff x="0" y="0"/>
+          <a:chExt cx="0" cy="0"/>
+        </a:xfrm>
+      </p:grpSpPr>
+      <p:sp>
+        <p:nvSpPr>
+          <p:cNvPr id="2" name="Title 1"/>
+          <p:cNvSpPr>
+            <a:spLocks noGrp="1"/>
+          </p:cNvSpPr>
+          <p:nvPr>
+            <p:ph type="title"/>
+          </p:nvPr>
+        </p:nvSpPr>
+        <p:spPr/>
+        <p:txBody>
+          <a:bodyPr/>
+          <a:lstStyle/>
+          <a:p>
+            <a:r>
+              <a:rPr lang="en-US" dirty="0" smtClean="0"/>
               <a:t>What was left out/added?</a:t>
             </a:r>
             <a:endParaRPr lang="en-US" dirty="0"/>
@@ -8577,7 +9246,7 @@
           <a:p>
             <a:fld id="{9CEF4966-5219-4577-B301-14467D565841}" type="slidenum">
               <a:rPr lang="en-US" smtClean="0"/>
-              <a:t>18</a:t>
+              <a:t>19</a:t>
             </a:fld>
             <a:endParaRPr lang="en-US"/>
           </a:p>

</xml_diff>

<commit_message>
Added slide on regular expression iterators
</commit_message>
<xml_diff>
--- a/CPlusPlus/06_essential_cpp_regex.pptx
+++ b/CPlusPlus/06_essential_cpp_regex.pptx
@@ -5,7 +5,7 @@
     <p:sldMasterId id="2147483660" r:id="rId1"/>
   </p:sldMasterIdLst>
   <p:notesMasterIdLst>
-    <p:notesMasterId r:id="rId21"/>
+    <p:notesMasterId r:id="rId22"/>
   </p:notesMasterIdLst>
   <p:sldIdLst>
     <p:sldId id="257" r:id="rId2"/>
@@ -25,8 +25,9 @@
     <p:sldId id="271" r:id="rId16"/>
     <p:sldId id="272" r:id="rId17"/>
     <p:sldId id="273" r:id="rId18"/>
-    <p:sldId id="275" r:id="rId19"/>
-    <p:sldId id="260" r:id="rId20"/>
+    <p:sldId id="276" r:id="rId19"/>
+    <p:sldId id="275" r:id="rId20"/>
+    <p:sldId id="260" r:id="rId21"/>
   </p:sldIdLst>
   <p:sldSz cx="9144000" cy="6858000" type="screen4x3"/>
   <p:notesSz cx="6858000" cy="9144000"/>
@@ -8522,6 +8523,644 @@
           <a:p>
             <a:r>
               <a:rPr lang="en-US" dirty="0" smtClean="0"/>
+              <a:t>Iterating matches</a:t>
+            </a:r>
+            <a:endParaRPr lang="en-US" dirty="0"/>
+          </a:p>
+        </p:txBody>
+      </p:sp>
+      <p:sp>
+        <p:nvSpPr>
+          <p:cNvPr id="4" name="Slide Number Placeholder 3"/>
+          <p:cNvSpPr>
+            <a:spLocks noGrp="1"/>
+          </p:cNvSpPr>
+          <p:nvPr>
+            <p:ph type="sldNum" sz="quarter" idx="12"/>
+          </p:nvPr>
+        </p:nvSpPr>
+        <p:spPr/>
+        <p:txBody>
+          <a:bodyPr/>
+          <a:lstStyle/>
+          <a:p>
+            <a:fld id="{9CEF4966-5219-4577-B301-14467D565841}" type="slidenum">
+              <a:rPr lang="en-US" smtClean="0"/>
+              <a:t>18</a:t>
+            </a:fld>
+            <a:endParaRPr lang="en-US"/>
+          </a:p>
+        </p:txBody>
+      </p:sp>
+      <p:sp>
+        <p:nvSpPr>
+          <p:cNvPr id="5" name="TextBox 4"/>
+          <p:cNvSpPr txBox="1"/>
+          <p:nvPr/>
+        </p:nvSpPr>
+        <p:spPr>
+          <a:xfrm>
+            <a:off x="628649" y="1869887"/>
+            <a:ext cx="8213899" cy="3293209"/>
+          </a:xfrm>
+          <a:prstGeom prst="rect">
+            <a:avLst/>
+          </a:prstGeom>
+          <a:solidFill>
+            <a:schemeClr val="bg1">
+              <a:lumMod val="75000"/>
+            </a:schemeClr>
+          </a:solidFill>
+          <a:ln>
+            <a:solidFill>
+              <a:schemeClr val="tx1"/>
+            </a:solidFill>
+          </a:ln>
+        </p:spPr>
+        <p:txBody>
+          <a:bodyPr wrap="square" rtlCol="0">
+            <a:spAutoFit/>
+          </a:bodyPr>
+          <a:lstStyle/>
+          <a:p>
+            <a:r>
+              <a:rPr lang="en-US" sz="1600" dirty="0" smtClean="0">
+                <a:latin typeface="Courier New" pitchFamily="49" charset="0"/>
+                <a:cs typeface="Courier New" pitchFamily="49" charset="0"/>
+              </a:rPr>
+              <a:t>string </a:t>
+            </a:r>
+            <a:r>
+              <a:rPr lang="en-US" sz="1600" dirty="0">
+                <a:latin typeface="Courier New" pitchFamily="49" charset="0"/>
+                <a:cs typeface="Courier New" pitchFamily="49" charset="0"/>
+              </a:rPr>
+              <a:t>line;</a:t>
+            </a:r>
+          </a:p>
+          <a:p>
+            <a:r>
+              <a:rPr lang="en-US" sz="1600" dirty="0" smtClean="0">
+                <a:latin typeface="Courier New" pitchFamily="49" charset="0"/>
+                <a:cs typeface="Courier New" pitchFamily="49" charset="0"/>
+              </a:rPr>
+              <a:t>regex expr {R</a:t>
+            </a:r>
+            <a:r>
+              <a:rPr lang="en-US" sz="1600" dirty="0">
+                <a:latin typeface="Courier New" pitchFamily="49" charset="0"/>
+                <a:cs typeface="Courier New" pitchFamily="49" charset="0"/>
+              </a:rPr>
+              <a:t>"((\w+))"};</a:t>
+            </a:r>
+          </a:p>
+          <a:p>
+            <a:r>
+              <a:rPr lang="en-US" sz="1600" dirty="0" err="1" smtClean="0">
+                <a:latin typeface="Courier New" pitchFamily="49" charset="0"/>
+                <a:cs typeface="Courier New" pitchFamily="49" charset="0"/>
+              </a:rPr>
+              <a:t>unordered_map</a:t>
+            </a:r>
+            <a:r>
+              <a:rPr lang="en-US" sz="1600" dirty="0" smtClean="0">
+                <a:latin typeface="Courier New" pitchFamily="49" charset="0"/>
+                <a:cs typeface="Courier New" pitchFamily="49" charset="0"/>
+              </a:rPr>
+              <a:t>&lt;string</a:t>
+            </a:r>
+            <a:r>
+              <a:rPr lang="en-US" sz="1600" dirty="0">
+                <a:latin typeface="Courier New" pitchFamily="49" charset="0"/>
+                <a:cs typeface="Courier New" pitchFamily="49" charset="0"/>
+              </a:rPr>
+              <a:t>, </a:t>
+            </a:r>
+            <a:r>
+              <a:rPr lang="en-US" sz="1600" dirty="0" err="1">
+                <a:latin typeface="Courier New" pitchFamily="49" charset="0"/>
+                <a:cs typeface="Courier New" pitchFamily="49" charset="0"/>
+              </a:rPr>
+              <a:t>int</a:t>
+            </a:r>
+            <a:r>
+              <a:rPr lang="en-US" sz="1600" dirty="0">
+                <a:latin typeface="Courier New" pitchFamily="49" charset="0"/>
+                <a:cs typeface="Courier New" pitchFamily="49" charset="0"/>
+              </a:rPr>
+              <a:t>&gt; counter;</a:t>
+            </a:r>
+          </a:p>
+          <a:p>
+            <a:r>
+              <a:rPr lang="en-US" sz="1600" dirty="0" smtClean="0">
+                <a:latin typeface="Courier New" pitchFamily="49" charset="0"/>
+                <a:cs typeface="Courier New" pitchFamily="49" charset="0"/>
+              </a:rPr>
+              <a:t>while </a:t>
+            </a:r>
+            <a:r>
+              <a:rPr lang="en-US" sz="1600" dirty="0">
+                <a:latin typeface="Courier New" pitchFamily="49" charset="0"/>
+                <a:cs typeface="Courier New" pitchFamily="49" charset="0"/>
+              </a:rPr>
+              <a:t>(</a:t>
+            </a:r>
+            <a:r>
+              <a:rPr lang="en-US" sz="1600" dirty="0" err="1">
+                <a:latin typeface="Courier New" pitchFamily="49" charset="0"/>
+                <a:cs typeface="Courier New" pitchFamily="49" charset="0"/>
+              </a:rPr>
+              <a:t>getline</a:t>
+            </a:r>
+            <a:r>
+              <a:rPr lang="en-US" sz="1600" dirty="0">
+                <a:latin typeface="Courier New" pitchFamily="49" charset="0"/>
+                <a:cs typeface="Courier New" pitchFamily="49" charset="0"/>
+              </a:rPr>
+              <a:t>(</a:t>
+            </a:r>
+            <a:r>
+              <a:rPr lang="en-US" sz="1600" dirty="0" err="1">
+                <a:latin typeface="Courier New" pitchFamily="49" charset="0"/>
+                <a:cs typeface="Courier New" pitchFamily="49" charset="0"/>
+              </a:rPr>
+              <a:t>cin</a:t>
+            </a:r>
+            <a:r>
+              <a:rPr lang="en-US" sz="1600" dirty="0">
+                <a:latin typeface="Courier New" pitchFamily="49" charset="0"/>
+                <a:cs typeface="Courier New" pitchFamily="49" charset="0"/>
+              </a:rPr>
+              <a:t>, line)) {</a:t>
+            </a:r>
+          </a:p>
+          <a:p>
+            <a:r>
+              <a:rPr lang="en-US" sz="1600" dirty="0" smtClean="0">
+                <a:latin typeface="Courier New" pitchFamily="49" charset="0"/>
+                <a:cs typeface="Courier New" pitchFamily="49" charset="0"/>
+              </a:rPr>
+              <a:t>    </a:t>
+            </a:r>
+            <a:r>
+              <a:rPr lang="en-US" sz="1600" dirty="0">
+                <a:latin typeface="Courier New" pitchFamily="49" charset="0"/>
+                <a:cs typeface="Courier New" pitchFamily="49" charset="0"/>
+              </a:rPr>
+              <a:t>for (</a:t>
+            </a:r>
+            <a:r>
+              <a:rPr lang="en-US" sz="1600" dirty="0" err="1">
+                <a:latin typeface="Courier New" pitchFamily="49" charset="0"/>
+                <a:cs typeface="Courier New" pitchFamily="49" charset="0"/>
+              </a:rPr>
+              <a:t>sregex_iterator</a:t>
+            </a:r>
+            <a:r>
+              <a:rPr lang="en-US" sz="1600" dirty="0">
+                <a:latin typeface="Courier New" pitchFamily="49" charset="0"/>
+                <a:cs typeface="Courier New" pitchFamily="49" charset="0"/>
+              </a:rPr>
+              <a:t> token(</a:t>
+            </a:r>
+            <a:r>
+              <a:rPr lang="en-US" sz="1600" dirty="0" err="1">
+                <a:latin typeface="Courier New" pitchFamily="49" charset="0"/>
+                <a:cs typeface="Courier New" pitchFamily="49" charset="0"/>
+              </a:rPr>
+              <a:t>line.begin</a:t>
+            </a:r>
+            <a:r>
+              <a:rPr lang="en-US" sz="1600" dirty="0">
+                <a:latin typeface="Courier New" pitchFamily="49" charset="0"/>
+                <a:cs typeface="Courier New" pitchFamily="49" charset="0"/>
+              </a:rPr>
+              <a:t>(), </a:t>
+            </a:r>
+            <a:r>
+              <a:rPr lang="en-US" sz="1600" dirty="0" err="1">
+                <a:latin typeface="Courier New" pitchFamily="49" charset="0"/>
+                <a:cs typeface="Courier New" pitchFamily="49" charset="0"/>
+              </a:rPr>
+              <a:t>line.end</a:t>
+            </a:r>
+            <a:r>
+              <a:rPr lang="en-US" sz="1600" dirty="0">
+                <a:latin typeface="Courier New" pitchFamily="49" charset="0"/>
+                <a:cs typeface="Courier New" pitchFamily="49" charset="0"/>
+              </a:rPr>
+              <a:t>(), </a:t>
+            </a:r>
+            <a:r>
+              <a:rPr lang="en-US" sz="1600" dirty="0" smtClean="0">
+                <a:latin typeface="Courier New" pitchFamily="49" charset="0"/>
+                <a:cs typeface="Courier New" pitchFamily="49" charset="0"/>
+              </a:rPr>
+              <a:t>expr);</a:t>
+            </a:r>
+            <a:endParaRPr lang="en-US" sz="1600" dirty="0">
+              <a:latin typeface="Courier New" pitchFamily="49" charset="0"/>
+              <a:cs typeface="Courier New" pitchFamily="49" charset="0"/>
+            </a:endParaRPr>
+          </a:p>
+          <a:p>
+            <a:r>
+              <a:rPr lang="en-US" sz="1600" dirty="0">
+                <a:latin typeface="Courier New" pitchFamily="49" charset="0"/>
+                <a:cs typeface="Courier New" pitchFamily="49" charset="0"/>
+              </a:rPr>
+              <a:t>                token != </a:t>
+            </a:r>
+            <a:r>
+              <a:rPr lang="en-US" sz="1600" dirty="0" err="1">
+                <a:latin typeface="Courier New" pitchFamily="49" charset="0"/>
+                <a:cs typeface="Courier New" pitchFamily="49" charset="0"/>
+              </a:rPr>
+              <a:t>sregex_iterator</a:t>
+            </a:r>
+            <a:r>
+              <a:rPr lang="en-US" sz="1600" dirty="0">
+                <a:latin typeface="Courier New" pitchFamily="49" charset="0"/>
+                <a:cs typeface="Courier New" pitchFamily="49" charset="0"/>
+              </a:rPr>
+              <a:t> {}; token++) {</a:t>
+            </a:r>
+          </a:p>
+          <a:p>
+            <a:r>
+              <a:rPr lang="en-US" sz="1600" dirty="0">
+                <a:latin typeface="Courier New" pitchFamily="49" charset="0"/>
+                <a:cs typeface="Courier New" pitchFamily="49" charset="0"/>
+              </a:rPr>
+              <a:t>        </a:t>
+            </a:r>
+            <a:r>
+              <a:rPr lang="en-US" sz="1600" dirty="0" smtClean="0">
+                <a:latin typeface="Courier New" pitchFamily="49" charset="0"/>
+                <a:cs typeface="Courier New" pitchFamily="49" charset="0"/>
+              </a:rPr>
+              <a:t>string </a:t>
+            </a:r>
+            <a:r>
+              <a:rPr lang="en-US" sz="1600" dirty="0">
+                <a:latin typeface="Courier New" pitchFamily="49" charset="0"/>
+                <a:cs typeface="Courier New" pitchFamily="49" charset="0"/>
+              </a:rPr>
+              <a:t>word = (*token)[1];</a:t>
+            </a:r>
+          </a:p>
+          <a:p>
+            <a:r>
+              <a:rPr lang="en-US" sz="1600" dirty="0">
+                <a:latin typeface="Courier New" pitchFamily="49" charset="0"/>
+                <a:cs typeface="Courier New" pitchFamily="49" charset="0"/>
+              </a:rPr>
+              <a:t>        </a:t>
+            </a:r>
+            <a:r>
+              <a:rPr lang="en-US" sz="1600" dirty="0" smtClean="0">
+                <a:latin typeface="Courier New" pitchFamily="49" charset="0"/>
+                <a:cs typeface="Courier New" pitchFamily="49" charset="0"/>
+              </a:rPr>
+              <a:t>if </a:t>
+            </a:r>
+            <a:r>
+              <a:rPr lang="en-US" sz="1600" dirty="0">
+                <a:latin typeface="Courier New" pitchFamily="49" charset="0"/>
+                <a:cs typeface="Courier New" pitchFamily="49" charset="0"/>
+              </a:rPr>
+              <a:t>(</a:t>
+            </a:r>
+            <a:r>
+              <a:rPr lang="en-US" sz="1600" dirty="0" err="1">
+                <a:latin typeface="Courier New" pitchFamily="49" charset="0"/>
+                <a:cs typeface="Courier New" pitchFamily="49" charset="0"/>
+              </a:rPr>
+              <a:t>counter.find</a:t>
+            </a:r>
+            <a:r>
+              <a:rPr lang="en-US" sz="1600" dirty="0">
+                <a:latin typeface="Courier New" pitchFamily="49" charset="0"/>
+                <a:cs typeface="Courier New" pitchFamily="49" charset="0"/>
+              </a:rPr>
+              <a:t>(word) == </a:t>
+            </a:r>
+            <a:r>
+              <a:rPr lang="en-US" sz="1600" dirty="0" err="1">
+                <a:latin typeface="Courier New" pitchFamily="49" charset="0"/>
+                <a:cs typeface="Courier New" pitchFamily="49" charset="0"/>
+              </a:rPr>
+              <a:t>counter.end</a:t>
+            </a:r>
+            <a:r>
+              <a:rPr lang="en-US" sz="1600" dirty="0">
+                <a:latin typeface="Courier New" pitchFamily="49" charset="0"/>
+                <a:cs typeface="Courier New" pitchFamily="49" charset="0"/>
+              </a:rPr>
+              <a:t>())</a:t>
+            </a:r>
+          </a:p>
+          <a:p>
+            <a:r>
+              <a:rPr lang="en-US" sz="1600" dirty="0">
+                <a:latin typeface="Courier New" pitchFamily="49" charset="0"/>
+                <a:cs typeface="Courier New" pitchFamily="49" charset="0"/>
+              </a:rPr>
+              <a:t>        </a:t>
+            </a:r>
+            <a:r>
+              <a:rPr lang="en-US" sz="1600" dirty="0" smtClean="0">
+                <a:latin typeface="Courier New" pitchFamily="49" charset="0"/>
+                <a:cs typeface="Courier New" pitchFamily="49" charset="0"/>
+              </a:rPr>
+              <a:t>    </a:t>
+            </a:r>
+            <a:r>
+              <a:rPr lang="en-US" sz="1600" dirty="0">
+                <a:latin typeface="Courier New" pitchFamily="49" charset="0"/>
+                <a:cs typeface="Courier New" pitchFamily="49" charset="0"/>
+              </a:rPr>
+              <a:t>counter[word] = 0;</a:t>
+            </a:r>
+          </a:p>
+          <a:p>
+            <a:r>
+              <a:rPr lang="en-US" sz="1600" dirty="0">
+                <a:latin typeface="Courier New" pitchFamily="49" charset="0"/>
+                <a:cs typeface="Courier New" pitchFamily="49" charset="0"/>
+              </a:rPr>
+              <a:t>        </a:t>
+            </a:r>
+            <a:r>
+              <a:rPr lang="en-US" sz="1600" dirty="0" smtClean="0">
+                <a:latin typeface="Courier New" pitchFamily="49" charset="0"/>
+                <a:cs typeface="Courier New" pitchFamily="49" charset="0"/>
+              </a:rPr>
+              <a:t>counter[word</a:t>
+            </a:r>
+            <a:r>
+              <a:rPr lang="en-US" sz="1600" dirty="0">
+                <a:latin typeface="Courier New" pitchFamily="49" charset="0"/>
+                <a:cs typeface="Courier New" pitchFamily="49" charset="0"/>
+              </a:rPr>
+              <a:t>]++;</a:t>
+            </a:r>
+          </a:p>
+          <a:p>
+            <a:r>
+              <a:rPr lang="en-US" sz="1600" dirty="0">
+                <a:latin typeface="Courier New" pitchFamily="49" charset="0"/>
+                <a:cs typeface="Courier New" pitchFamily="49" charset="0"/>
+              </a:rPr>
+              <a:t>    </a:t>
+            </a:r>
+            <a:r>
+              <a:rPr lang="en-US" sz="1600" dirty="0" smtClean="0">
+                <a:latin typeface="Courier New" pitchFamily="49" charset="0"/>
+                <a:cs typeface="Courier New" pitchFamily="49" charset="0"/>
+              </a:rPr>
+              <a:t>}</a:t>
+            </a:r>
+            <a:endParaRPr lang="en-US" sz="1600" dirty="0">
+              <a:latin typeface="Courier New" pitchFamily="49" charset="0"/>
+              <a:cs typeface="Courier New" pitchFamily="49" charset="0"/>
+            </a:endParaRPr>
+          </a:p>
+          <a:p>
+            <a:r>
+              <a:rPr lang="en-US" sz="1600" dirty="0" smtClean="0">
+                <a:latin typeface="Courier New" pitchFamily="49" charset="0"/>
+                <a:cs typeface="Courier New" pitchFamily="49" charset="0"/>
+              </a:rPr>
+              <a:t>}</a:t>
+            </a:r>
+          </a:p>
+          <a:p>
+            <a:r>
+              <a:rPr lang="en-US" sz="1600" dirty="0" smtClean="0">
+                <a:latin typeface="Courier New" pitchFamily="49" charset="0"/>
+                <a:cs typeface="Courier New" pitchFamily="49" charset="0"/>
+              </a:rPr>
+              <a:t>…</a:t>
+            </a:r>
+            <a:endParaRPr lang="en-US" sz="1600" dirty="0" smtClean="0">
+              <a:latin typeface="Courier New" pitchFamily="49" charset="0"/>
+              <a:cs typeface="Courier New" pitchFamily="49" charset="0"/>
+            </a:endParaRPr>
+          </a:p>
+        </p:txBody>
+      </p:sp>
+      <p:sp>
+        <p:nvSpPr>
+          <p:cNvPr id="6" name="TextBox 5"/>
+          <p:cNvSpPr txBox="1"/>
+          <p:nvPr/>
+        </p:nvSpPr>
+        <p:spPr>
+          <a:xfrm>
+            <a:off x="942885" y="5342294"/>
+            <a:ext cx="7899663" cy="1200329"/>
+          </a:xfrm>
+          <a:prstGeom prst="rect">
+            <a:avLst/>
+          </a:prstGeom>
+          <a:noFill/>
+        </p:spPr>
+        <p:txBody>
+          <a:bodyPr wrap="none" rtlCol="0">
+            <a:spAutoFit/>
+          </a:bodyPr>
+          <a:lstStyle/>
+          <a:p>
+            <a:pPr marL="285750" indent="-285750">
+              <a:buFont typeface="Arial" panose="020B0604020202020204" pitchFamily="34" charset="0"/>
+              <a:buChar char="•"/>
+            </a:pPr>
+            <a:r>
+              <a:rPr lang="en-US" sz="2400" dirty="0" err="1" smtClean="0">
+                <a:latin typeface="Courier New" panose="02070309020205020404" pitchFamily="49" charset="0"/>
+                <a:cs typeface="Courier New" panose="02070309020205020404" pitchFamily="49" charset="0"/>
+              </a:rPr>
+              <a:t>sregex_iterator</a:t>
+            </a:r>
+            <a:r>
+              <a:rPr lang="en-US" sz="2400" dirty="0" smtClean="0"/>
+              <a:t> is bidirectional, hence stop condition</a:t>
+            </a:r>
+          </a:p>
+          <a:p>
+            <a:pPr marL="285750" indent="-285750">
+              <a:buFont typeface="Arial" panose="020B0604020202020204" pitchFamily="34" charset="0"/>
+              <a:buChar char="•"/>
+            </a:pPr>
+            <a:r>
+              <a:rPr lang="en-US" sz="2400" dirty="0" smtClean="0">
+                <a:latin typeface="Courier New" panose="02070309020205020404" pitchFamily="49" charset="0"/>
+                <a:cs typeface="Courier New" panose="02070309020205020404" pitchFamily="49" charset="0"/>
+              </a:rPr>
+              <a:t>token</a:t>
+            </a:r>
+            <a:r>
+              <a:rPr lang="en-US" sz="2400" dirty="0" smtClean="0"/>
+              <a:t> is address of matched substring, hence </a:t>
+            </a:r>
+            <a:r>
+              <a:rPr lang="en-US" sz="2400" dirty="0" smtClean="0">
+                <a:latin typeface="Courier New" panose="02070309020205020404" pitchFamily="49" charset="0"/>
+                <a:cs typeface="Courier New" panose="02070309020205020404" pitchFamily="49" charset="0"/>
+              </a:rPr>
+              <a:t>*token</a:t>
+            </a:r>
+          </a:p>
+          <a:p>
+            <a:pPr marL="285750" indent="-285750">
+              <a:buFont typeface="Arial" panose="020B0604020202020204" pitchFamily="34" charset="0"/>
+              <a:buChar char="•"/>
+            </a:pPr>
+            <a:r>
+              <a:rPr lang="en-US" sz="2400" dirty="0" smtClean="0"/>
+              <a:t>Match was capturing, hence </a:t>
+            </a:r>
+            <a:r>
+              <a:rPr lang="en-US" sz="2400" dirty="0" smtClean="0">
+                <a:latin typeface="Courier New" panose="02070309020205020404" pitchFamily="49" charset="0"/>
+                <a:cs typeface="Courier New" panose="02070309020205020404" pitchFamily="49" charset="0"/>
+              </a:rPr>
+              <a:t>(*token)[1]</a:t>
+            </a:r>
+            <a:endParaRPr lang="en-US" sz="2400" dirty="0">
+              <a:latin typeface="Courier New" panose="02070309020205020404" pitchFamily="49" charset="0"/>
+              <a:cs typeface="Courier New" panose="02070309020205020404" pitchFamily="49" charset="0"/>
+            </a:endParaRPr>
+          </a:p>
+        </p:txBody>
+      </p:sp>
+    </p:spTree>
+    <p:extLst>
+      <p:ext uri="{BB962C8B-B14F-4D97-AF65-F5344CB8AC3E}">
+        <p14:creationId xmlns:p14="http://schemas.microsoft.com/office/powerpoint/2010/main" val="3228667452"/>
+      </p:ext>
+    </p:extLst>
+  </p:cSld>
+  <p:clrMapOvr>
+    <a:masterClrMapping/>
+  </p:clrMapOvr>
+  <p:timing>
+    <p:tnLst>
+      <p:par>
+        <p:cTn id="1" dur="indefinite" restart="never" nodeType="tmRoot">
+          <p:childTnLst>
+            <p:seq concurrent="1" nextAc="seek">
+              <p:cTn id="2" dur="indefinite" nodeType="mainSeq">
+                <p:childTnLst>
+                  <p:par>
+                    <p:cTn id="3" fill="hold">
+                      <p:stCondLst>
+                        <p:cond delay="indefinite"/>
+                      </p:stCondLst>
+                      <p:childTnLst>
+                        <p:par>
+                          <p:cTn id="4" fill="hold">
+                            <p:stCondLst>
+                              <p:cond delay="0"/>
+                            </p:stCondLst>
+                            <p:childTnLst>
+                              <p:par>
+                                <p:cTn id="5" presetID="1" presetClass="entr" presetSubtype="0" fill="hold" grpId="0" nodeType="clickEffect">
+                                  <p:stCondLst>
+                                    <p:cond delay="0"/>
+                                  </p:stCondLst>
+                                  <p:childTnLst>
+                                    <p:set>
+                                      <p:cBhvr>
+                                        <p:cTn id="6" dur="1" fill="hold">
+                                          <p:stCondLst>
+                                            <p:cond delay="0"/>
+                                          </p:stCondLst>
+                                        </p:cTn>
+                                        <p:tgtEl>
+                                          <p:spTgt spid="6"/>
+                                        </p:tgtEl>
+                                        <p:attrNameLst>
+                                          <p:attrName>style.visibility</p:attrName>
+                                        </p:attrNameLst>
+                                      </p:cBhvr>
+                                      <p:to>
+                                        <p:strVal val="visible"/>
+                                      </p:to>
+                                    </p:set>
+                                  </p:childTnLst>
+                                </p:cTn>
+                              </p:par>
+                            </p:childTnLst>
+                          </p:cTn>
+                        </p:par>
+                      </p:childTnLst>
+                    </p:cTn>
+                  </p:par>
+                </p:childTnLst>
+              </p:cTn>
+              <p:prevCondLst>
+                <p:cond evt="onPrev" delay="0">
+                  <p:tgtEl>
+                    <p:sldTgt/>
+                  </p:tgtEl>
+                </p:cond>
+              </p:prevCondLst>
+              <p:nextCondLst>
+                <p:cond evt="onNext" delay="0">
+                  <p:tgtEl>
+                    <p:sldTgt/>
+                  </p:tgtEl>
+                </p:cond>
+              </p:nextCondLst>
+            </p:seq>
+          </p:childTnLst>
+        </p:cTn>
+      </p:par>
+    </p:tnLst>
+    <p:bldLst>
+      <p:bldP spid="6" grpId="0"/>
+    </p:bldLst>
+  </p:timing>
+</p:sld>
+</file>
+
+<file path=ppt/slides/slide19.xml><?xml version="1.0" encoding="utf-8"?>
+<p:sld xmlns:a="http://schemas.openxmlformats.org/drawingml/2006/main" xmlns:r="http://schemas.openxmlformats.org/officeDocument/2006/relationships" xmlns:p="http://schemas.openxmlformats.org/presentationml/2006/main">
+  <p:cSld>
+    <p:spTree>
+      <p:nvGrpSpPr>
+        <p:cNvPr id="1" name=""/>
+        <p:cNvGrpSpPr/>
+        <p:nvPr/>
+      </p:nvGrpSpPr>
+      <p:grpSpPr>
+        <a:xfrm>
+          <a:off x="0" y="0"/>
+          <a:ext cx="0" cy="0"/>
+          <a:chOff x="0" y="0"/>
+          <a:chExt cx="0" cy="0"/>
+        </a:xfrm>
+      </p:grpSpPr>
+      <p:sp>
+        <p:nvSpPr>
+          <p:cNvPr id="2" name="Title 1"/>
+          <p:cNvSpPr>
+            <a:spLocks noGrp="1"/>
+          </p:cNvSpPr>
+          <p:nvPr>
+            <p:ph type="title"/>
+          </p:nvPr>
+        </p:nvSpPr>
+        <p:spPr/>
+        <p:txBody>
+          <a:bodyPr/>
+          <a:lstStyle/>
+          <a:p>
+            <a:r>
+              <a:rPr lang="en-US" dirty="0" smtClean="0"/>
               <a:t>Miscellaneous remarks</a:t>
             </a:r>
             <a:endParaRPr lang="en-US" dirty="0"/>
@@ -8686,7 +9325,7 @@
           <a:p>
             <a:fld id="{9CEF4966-5219-4577-B301-14467D565841}" type="slidenum">
               <a:rPr lang="en-US" smtClean="0"/>
-              <a:t>18</a:t>
+              <a:t>19</a:t>
             </a:fld>
             <a:endParaRPr lang="en-US"/>
           </a:p>
@@ -9156,7 +9795,201 @@
 </p:sld>
 </file>
 
-<file path=ppt/slides/slide19.xml><?xml version="1.0" encoding="utf-8"?>
+<file path=ppt/slides/slide2.xml><?xml version="1.0" encoding="utf-8"?>
+<p:sld xmlns:a="http://schemas.openxmlformats.org/drawingml/2006/main" xmlns:r="http://schemas.openxmlformats.org/officeDocument/2006/relationships" xmlns:p="http://schemas.openxmlformats.org/presentationml/2006/main">
+  <p:cSld>
+    <p:spTree>
+      <p:nvGrpSpPr>
+        <p:cNvPr id="1" name=""/>
+        <p:cNvGrpSpPr/>
+        <p:nvPr/>
+      </p:nvGrpSpPr>
+      <p:grpSpPr>
+        <a:xfrm>
+          <a:off x="0" y="0"/>
+          <a:ext cx="0" cy="0"/>
+          <a:chOff x="0" y="0"/>
+          <a:chExt cx="0" cy="0"/>
+        </a:xfrm>
+      </p:grpSpPr>
+      <p:sp>
+        <p:nvSpPr>
+          <p:cNvPr id="2" name="Slide Number Placeholder 1"/>
+          <p:cNvSpPr>
+            <a:spLocks noGrp="1"/>
+          </p:cNvSpPr>
+          <p:nvPr>
+            <p:ph type="sldNum" sz="quarter" idx="12"/>
+          </p:nvPr>
+        </p:nvSpPr>
+        <p:spPr/>
+        <p:txBody>
+          <a:bodyPr/>
+          <a:lstStyle/>
+          <a:p>
+            <a:fld id="{033373DF-BCDA-4600-B448-AFBDB22F4A39}" type="slidenum">
+              <a:rPr lang="en-US" smtClean="0"/>
+              <a:t>2</a:t>
+            </a:fld>
+            <a:endParaRPr lang="en-US"/>
+          </a:p>
+        </p:txBody>
+      </p:sp>
+      <p:sp>
+        <p:nvSpPr>
+          <p:cNvPr id="3" name="TextBox 2"/>
+          <p:cNvSpPr txBox="1"/>
+          <p:nvPr/>
+        </p:nvSpPr>
+        <p:spPr>
+          <a:xfrm>
+            <a:off x="1193194" y="2423057"/>
+            <a:ext cx="3404137" cy="1692771"/>
+          </a:xfrm>
+          <a:prstGeom prst="rect">
+            <a:avLst/>
+          </a:prstGeom>
+          <a:noFill/>
+          <a:ln>
+            <a:solidFill>
+              <a:schemeClr val="tx1"/>
+            </a:solidFill>
+          </a:ln>
+        </p:spPr>
+        <p:txBody>
+          <a:bodyPr wrap="none" rtlCol="0">
+            <a:spAutoFit/>
+          </a:bodyPr>
+          <a:lstStyle/>
+          <a:p>
+            <a:r>
+              <a:rPr lang="en-US" dirty="0"/>
+              <a:t>Presentation based on:</a:t>
+            </a:r>
+            <a:br>
+              <a:rPr lang="en-US" dirty="0"/>
+            </a:br>
+            <a:r>
+              <a:rPr lang="en-US" sz="2800" i="1" dirty="0"/>
+              <a:t>A tour of C++</a:t>
+            </a:r>
+            <a:r>
+              <a:rPr lang="en-US" sz="2800" dirty="0"/>
+              <a:t/>
+            </a:r>
+            <a:br>
+              <a:rPr lang="en-US" sz="2800" dirty="0"/>
+            </a:br>
+            <a:r>
+              <a:rPr lang="en-US" sz="2800" dirty="0"/>
+              <a:t>Bjarne </a:t>
+            </a:r>
+            <a:r>
+              <a:rPr lang="en-US" sz="2800" dirty="0" err="1"/>
+              <a:t>Stroustrup</a:t>
+            </a:r>
+            <a:endParaRPr lang="en-US" sz="2800" dirty="0"/>
+          </a:p>
+          <a:p>
+            <a:r>
+              <a:rPr lang="en-US" sz="2800" dirty="0"/>
+              <a:t>Addison-Wesley, 2014</a:t>
+            </a:r>
+          </a:p>
+        </p:txBody>
+      </p:sp>
+    </p:spTree>
+    <p:extLst>
+      <p:ext uri="{BB962C8B-B14F-4D97-AF65-F5344CB8AC3E}">
+        <p14:creationId xmlns:p14="http://schemas.microsoft.com/office/powerpoint/2010/main" val="3800388444"/>
+      </p:ext>
+    </p:extLst>
+  </p:cSld>
+  <p:clrMapOvr>
+    <a:masterClrMapping/>
+  </p:clrMapOvr>
+  <p:timing>
+    <p:tnLst>
+      <p:par>
+        <p:cTn id="1" dur="indefinite" restart="never" nodeType="tmRoot">
+          <p:childTnLst>
+            <p:seq concurrent="1" nextAc="seek">
+              <p:cTn id="2" dur="indefinite" nodeType="mainSeq">
+                <p:childTnLst>
+                  <p:par>
+                    <p:cTn id="3" fill="hold">
+                      <p:stCondLst>
+                        <p:cond delay="indefinite"/>
+                      </p:stCondLst>
+                      <p:childTnLst>
+                        <p:par>
+                          <p:cTn id="4" fill="hold">
+                            <p:stCondLst>
+                              <p:cond delay="0"/>
+                            </p:stCondLst>
+                            <p:childTnLst>
+                              <p:par>
+                                <p:cTn id="5" presetID="1" presetClass="entr" presetSubtype="0" fill="hold" grpId="0" nodeType="clickEffect">
+                                  <p:stCondLst>
+                                    <p:cond delay="0"/>
+                                  </p:stCondLst>
+                                  <p:childTnLst>
+                                    <p:set>
+                                      <p:cBhvr>
+                                        <p:cTn id="6" dur="1" fill="hold">
+                                          <p:stCondLst>
+                                            <p:cond delay="0"/>
+                                          </p:stCondLst>
+                                        </p:cTn>
+                                        <p:tgtEl>
+                                          <p:spTgt spid="3"/>
+                                        </p:tgtEl>
+                                        <p:attrNameLst>
+                                          <p:attrName>style.visibility</p:attrName>
+                                        </p:attrNameLst>
+                                      </p:cBhvr>
+                                      <p:to>
+                                        <p:strVal val="visible"/>
+                                      </p:to>
+                                    </p:set>
+                                  </p:childTnLst>
+                                </p:cTn>
+                              </p:par>
+                            </p:childTnLst>
+                          </p:cTn>
+                        </p:par>
+                      </p:childTnLst>
+                    </p:cTn>
+                  </p:par>
+                </p:childTnLst>
+              </p:cTn>
+              <p:prevCondLst>
+                <p:cond evt="onPrev" delay="0">
+                  <p:tgtEl>
+                    <p:sldTgt/>
+                  </p:tgtEl>
+                </p:cond>
+              </p:prevCondLst>
+              <p:nextCondLst>
+                <p:cond evt="onNext" delay="0">
+                  <p:tgtEl>
+                    <p:sldTgt/>
+                  </p:tgtEl>
+                </p:cond>
+              </p:nextCondLst>
+            </p:seq>
+          </p:childTnLst>
+        </p:cTn>
+      </p:par>
+    </p:tnLst>
+    <p:bldLst>
+      <p:bldP spid="3" grpId="0" animBg="1"/>
+    </p:bldLst>
+  </p:timing>
+</p:sld>
+</file>
+
+<file path=ppt/slides/slide20.xml><?xml version="1.0" encoding="utf-8"?>
 <p:sld xmlns:a="http://schemas.openxmlformats.org/drawingml/2006/main" xmlns:r="http://schemas.openxmlformats.org/officeDocument/2006/relationships" xmlns:p="http://schemas.openxmlformats.org/presentationml/2006/main">
   <p:cSld>
     <p:spTree>
@@ -9246,7 +10079,7 @@
           <a:p>
             <a:fld id="{9CEF4966-5219-4577-B301-14467D565841}" type="slidenum">
               <a:rPr lang="en-US" smtClean="0"/>
-              <a:t>19</a:t>
+              <a:t>20</a:t>
             </a:fld>
             <a:endParaRPr lang="en-US"/>
           </a:p>
@@ -9376,200 +10209,6 @@
     </p:tnLst>
     <p:bldLst>
       <p:bldP spid="4" grpId="0" uiExpand="1" build="p"/>
-    </p:bldLst>
-  </p:timing>
-</p:sld>
-</file>
-
-<file path=ppt/slides/slide2.xml><?xml version="1.0" encoding="utf-8"?>
-<p:sld xmlns:a="http://schemas.openxmlformats.org/drawingml/2006/main" xmlns:r="http://schemas.openxmlformats.org/officeDocument/2006/relationships" xmlns:p="http://schemas.openxmlformats.org/presentationml/2006/main">
-  <p:cSld>
-    <p:spTree>
-      <p:nvGrpSpPr>
-        <p:cNvPr id="1" name=""/>
-        <p:cNvGrpSpPr/>
-        <p:nvPr/>
-      </p:nvGrpSpPr>
-      <p:grpSpPr>
-        <a:xfrm>
-          <a:off x="0" y="0"/>
-          <a:ext cx="0" cy="0"/>
-          <a:chOff x="0" y="0"/>
-          <a:chExt cx="0" cy="0"/>
-        </a:xfrm>
-      </p:grpSpPr>
-      <p:sp>
-        <p:nvSpPr>
-          <p:cNvPr id="2" name="Slide Number Placeholder 1"/>
-          <p:cNvSpPr>
-            <a:spLocks noGrp="1"/>
-          </p:cNvSpPr>
-          <p:nvPr>
-            <p:ph type="sldNum" sz="quarter" idx="12"/>
-          </p:nvPr>
-        </p:nvSpPr>
-        <p:spPr/>
-        <p:txBody>
-          <a:bodyPr/>
-          <a:lstStyle/>
-          <a:p>
-            <a:fld id="{033373DF-BCDA-4600-B448-AFBDB22F4A39}" type="slidenum">
-              <a:rPr lang="en-US" smtClean="0"/>
-              <a:t>2</a:t>
-            </a:fld>
-            <a:endParaRPr lang="en-US"/>
-          </a:p>
-        </p:txBody>
-      </p:sp>
-      <p:sp>
-        <p:nvSpPr>
-          <p:cNvPr id="3" name="TextBox 2"/>
-          <p:cNvSpPr txBox="1"/>
-          <p:nvPr/>
-        </p:nvSpPr>
-        <p:spPr>
-          <a:xfrm>
-            <a:off x="1193194" y="2423057"/>
-            <a:ext cx="3404137" cy="1692771"/>
-          </a:xfrm>
-          <a:prstGeom prst="rect">
-            <a:avLst/>
-          </a:prstGeom>
-          <a:noFill/>
-          <a:ln>
-            <a:solidFill>
-              <a:schemeClr val="tx1"/>
-            </a:solidFill>
-          </a:ln>
-        </p:spPr>
-        <p:txBody>
-          <a:bodyPr wrap="none" rtlCol="0">
-            <a:spAutoFit/>
-          </a:bodyPr>
-          <a:lstStyle/>
-          <a:p>
-            <a:r>
-              <a:rPr lang="en-US" dirty="0"/>
-              <a:t>Presentation based on:</a:t>
-            </a:r>
-            <a:br>
-              <a:rPr lang="en-US" dirty="0"/>
-            </a:br>
-            <a:r>
-              <a:rPr lang="en-US" sz="2800" i="1" dirty="0"/>
-              <a:t>A tour of C++</a:t>
-            </a:r>
-            <a:r>
-              <a:rPr lang="en-US" sz="2800" dirty="0"/>
-              <a:t/>
-            </a:r>
-            <a:br>
-              <a:rPr lang="en-US" sz="2800" dirty="0"/>
-            </a:br>
-            <a:r>
-              <a:rPr lang="en-US" sz="2800" dirty="0"/>
-              <a:t>Bjarne </a:t>
-            </a:r>
-            <a:r>
-              <a:rPr lang="en-US" sz="2800" dirty="0" err="1"/>
-              <a:t>Stroustrup</a:t>
-            </a:r>
-            <a:endParaRPr lang="en-US" sz="2800" dirty="0"/>
-          </a:p>
-          <a:p>
-            <a:r>
-              <a:rPr lang="en-US" sz="2800" dirty="0"/>
-              <a:t>Addison-Wesley, 2014</a:t>
-            </a:r>
-          </a:p>
-        </p:txBody>
-      </p:sp>
-    </p:spTree>
-    <p:extLst>
-      <p:ext uri="{BB962C8B-B14F-4D97-AF65-F5344CB8AC3E}">
-        <p14:creationId xmlns:p14="http://schemas.microsoft.com/office/powerpoint/2010/main" val="3800388444"/>
-      </p:ext>
-    </p:extLst>
-  </p:cSld>
-  <p:clrMapOvr>
-    <a:masterClrMapping/>
-  </p:clrMapOvr>
-  <p:timing>
-    <p:tnLst>
-      <p:par>
-        <p:cTn id="1" dur="indefinite" restart="never" nodeType="tmRoot">
-          <p:childTnLst>
-            <p:seq concurrent="1" nextAc="seek">
-              <p:cTn id="2" dur="indefinite" nodeType="mainSeq">
-                <p:childTnLst>
-                  <p:par>
-                    <p:cTn id="3" fill="hold">
-                      <p:stCondLst>
-                        <p:cond delay="indefinite"/>
-                      </p:stCondLst>
-                      <p:childTnLst>
-                        <p:par>
-                          <p:cTn id="4" fill="hold">
-                            <p:stCondLst>
-                              <p:cond delay="0"/>
-                            </p:stCondLst>
-                            <p:childTnLst>
-                              <p:par>
-                                <p:cTn id="5" presetID="1" presetClass="entr" presetSubtype="0" fill="hold" grpId="0" nodeType="clickEffect">
-                                  <p:stCondLst>
-                                    <p:cond delay="0"/>
-                                  </p:stCondLst>
-                                  <p:childTnLst>
-                                    <p:set>
-                                      <p:cBhvr>
-                                        <p:cTn id="6" dur="1" fill="hold">
-                                          <p:stCondLst>
-                                            <p:cond delay="0"/>
-                                          </p:stCondLst>
-                                        </p:cTn>
-                                        <p:tgtEl>
-                                          <p:spTgt spid="3"/>
-                                        </p:tgtEl>
-                                        <p:attrNameLst>
-                                          <p:attrName>style.visibility</p:attrName>
-                                        </p:attrNameLst>
-                                      </p:cBhvr>
-                                      <p:to>
-                                        <p:strVal val="visible"/>
-                                      </p:to>
-                                    </p:set>
-                                  </p:childTnLst>
-                                </p:cTn>
-                              </p:par>
-                            </p:childTnLst>
-                          </p:cTn>
-                        </p:par>
-                      </p:childTnLst>
-                    </p:cTn>
-                  </p:par>
-                </p:childTnLst>
-              </p:cTn>
-              <p:prevCondLst>
-                <p:cond evt="onPrev" delay="0">
-                  <p:tgtEl>
-                    <p:sldTgt/>
-                  </p:tgtEl>
-                </p:cond>
-              </p:prevCondLst>
-              <p:nextCondLst>
-                <p:cond evt="onNext" delay="0">
-                  <p:tgtEl>
-                    <p:sldTgt/>
-                  </p:tgtEl>
-                </p:cond>
-              </p:nextCondLst>
-            </p:seq>
-          </p:childTnLst>
-        </p:cTn>
-      </p:par>
-    </p:tnLst>
-    <p:bldLst>
-      <p:bldP spid="3" grpId="0" animBg="1"/>
     </p:bldLst>
   </p:timing>
 </p:sld>

</xml_diff>